<commit_message>
Proyecto Parque 1a parte
</commit_message>
<xml_diff>
--- a/Slides/POO/4 Relaciones entre clases.pptx
+++ b/Slides/POO/4 Relaciones entre clases.pptx
@@ -6,7 +6,7 @@
     <p:sldMasterId id="2147483660" r:id="rId2"/>
   </p:sldMasterIdLst>
   <p:notesMasterIdLst>
-    <p:notesMasterId r:id="rId15"/>
+    <p:notesMasterId r:id="rId13"/>
   </p:notesMasterIdLst>
   <p:sldIdLst>
     <p:sldId id="256" r:id="rId3"/>
@@ -16,11 +16,9 @@
     <p:sldId id="260" r:id="rId7"/>
     <p:sldId id="269" r:id="rId8"/>
     <p:sldId id="264" r:id="rId9"/>
-    <p:sldId id="268" r:id="rId10"/>
-    <p:sldId id="271" r:id="rId11"/>
-    <p:sldId id="265" r:id="rId12"/>
-    <p:sldId id="267" r:id="rId13"/>
-    <p:sldId id="270" r:id="rId14"/>
+    <p:sldId id="265" r:id="rId10"/>
+    <p:sldId id="267" r:id="rId11"/>
+    <p:sldId id="271" r:id="rId12"/>
   </p:sldIdLst>
   <p:sldSz cx="12192000" cy="6858000"/>
   <p:notesSz cx="6858000" cy="9144000"/>
@@ -215,6 +213,83 @@
     </pc:docChg>
   </pc:docChgLst>
   <pc:docChgLst>
+    <pc:chgData name="Cesar Augusto Lopez Gallego" userId="0dfa9112-9251-4882-b472-cf2dfcee09d1" providerId="ADAL" clId="{FF06ED2D-CA6C-4B35-AE32-AE5052DC3AF5}"/>
+    <pc:docChg chg="undo custSel addSld delSld modSld">
+      <pc:chgData name="Cesar Augusto Lopez Gallego" userId="0dfa9112-9251-4882-b472-cf2dfcee09d1" providerId="ADAL" clId="{FF06ED2D-CA6C-4B35-AE32-AE5052DC3AF5}" dt="2024-08-14T19:49:53.567" v="306" actId="20577"/>
+      <pc:docMkLst>
+        <pc:docMk/>
+      </pc:docMkLst>
+      <pc:sldChg chg="del">
+        <pc:chgData name="Cesar Augusto Lopez Gallego" userId="0dfa9112-9251-4882-b472-cf2dfcee09d1" providerId="ADAL" clId="{FF06ED2D-CA6C-4B35-AE32-AE5052DC3AF5}" dt="2024-08-14T18:45:23.182" v="1" actId="47"/>
+        <pc:sldMkLst>
+          <pc:docMk/>
+          <pc:sldMk cId="2597893151" sldId="268"/>
+        </pc:sldMkLst>
+      </pc:sldChg>
+      <pc:sldChg chg="del">
+        <pc:chgData name="Cesar Augusto Lopez Gallego" userId="0dfa9112-9251-4882-b472-cf2dfcee09d1" providerId="ADAL" clId="{FF06ED2D-CA6C-4B35-AE32-AE5052DC3AF5}" dt="2024-08-14T18:45:13.361" v="0" actId="47"/>
+        <pc:sldMkLst>
+          <pc:docMk/>
+          <pc:sldMk cId="197080040" sldId="270"/>
+        </pc:sldMkLst>
+      </pc:sldChg>
+      <pc:sldChg chg="modSp del mod">
+        <pc:chgData name="Cesar Augusto Lopez Gallego" userId="0dfa9112-9251-4882-b472-cf2dfcee09d1" providerId="ADAL" clId="{FF06ED2D-CA6C-4B35-AE32-AE5052DC3AF5}" dt="2024-08-14T18:46:59.960" v="200" actId="2696"/>
+        <pc:sldMkLst>
+          <pc:docMk/>
+          <pc:sldMk cId="3229102556" sldId="271"/>
+        </pc:sldMkLst>
+        <pc:spChg chg="mod">
+          <ac:chgData name="Cesar Augusto Lopez Gallego" userId="0dfa9112-9251-4882-b472-cf2dfcee09d1" providerId="ADAL" clId="{FF06ED2D-CA6C-4B35-AE32-AE5052DC3AF5}" dt="2024-08-14T18:45:45.265" v="11" actId="20577"/>
+          <ac:spMkLst>
+            <pc:docMk/>
+            <pc:sldMk cId="3229102556" sldId="271"/>
+            <ac:spMk id="2" creationId="{00000000-0000-0000-0000-000000000000}"/>
+          </ac:spMkLst>
+        </pc:spChg>
+        <pc:spChg chg="mod">
+          <ac:chgData name="Cesar Augusto Lopez Gallego" userId="0dfa9112-9251-4882-b472-cf2dfcee09d1" providerId="ADAL" clId="{FF06ED2D-CA6C-4B35-AE32-AE5052DC3AF5}" dt="2024-08-14T18:46:56.425" v="199" actId="20577"/>
+          <ac:spMkLst>
+            <pc:docMk/>
+            <pc:sldMk cId="3229102556" sldId="271"/>
+            <ac:spMk id="3" creationId="{00000000-0000-0000-0000-000000000000}"/>
+          </ac:spMkLst>
+        </pc:spChg>
+        <pc:picChg chg="mod">
+          <ac:chgData name="Cesar Augusto Lopez Gallego" userId="0dfa9112-9251-4882-b472-cf2dfcee09d1" providerId="ADAL" clId="{FF06ED2D-CA6C-4B35-AE32-AE5052DC3AF5}" dt="2024-08-14T18:46:40.075" v="183" actId="1076"/>
+          <ac:picMkLst>
+            <pc:docMk/>
+            <pc:sldMk cId="3229102556" sldId="271"/>
+            <ac:picMk id="4" creationId="{00000000-0000-0000-0000-000000000000}"/>
+          </ac:picMkLst>
+        </pc:picChg>
+      </pc:sldChg>
+      <pc:sldChg chg="modSp add mod">
+        <pc:chgData name="Cesar Augusto Lopez Gallego" userId="0dfa9112-9251-4882-b472-cf2dfcee09d1" providerId="ADAL" clId="{FF06ED2D-CA6C-4B35-AE32-AE5052DC3AF5}" dt="2024-08-14T19:49:53.567" v="306" actId="20577"/>
+        <pc:sldMkLst>
+          <pc:docMk/>
+          <pc:sldMk cId="3641373641" sldId="271"/>
+        </pc:sldMkLst>
+        <pc:spChg chg="mod">
+          <ac:chgData name="Cesar Augusto Lopez Gallego" userId="0dfa9112-9251-4882-b472-cf2dfcee09d1" providerId="ADAL" clId="{FF06ED2D-CA6C-4B35-AE32-AE5052DC3AF5}" dt="2024-08-14T19:49:53.567" v="306" actId="20577"/>
+          <ac:spMkLst>
+            <pc:docMk/>
+            <pc:sldMk cId="3641373641" sldId="271"/>
+            <ac:spMk id="3" creationId="{00000000-0000-0000-0000-000000000000}"/>
+          </ac:spMkLst>
+        </pc:spChg>
+        <pc:picChg chg="mod">
+          <ac:chgData name="Cesar Augusto Lopez Gallego" userId="0dfa9112-9251-4882-b472-cf2dfcee09d1" providerId="ADAL" clId="{FF06ED2D-CA6C-4B35-AE32-AE5052DC3AF5}" dt="2024-08-14T19:13:30.650" v="202" actId="1076"/>
+          <ac:picMkLst>
+            <pc:docMk/>
+            <pc:sldMk cId="3641373641" sldId="271"/>
+            <ac:picMk id="4" creationId="{00000000-0000-0000-0000-000000000000}"/>
+          </ac:picMkLst>
+        </pc:picChg>
+      </pc:sldChg>
+    </pc:docChg>
+  </pc:docChgLst>
+  <pc:docChgLst>
     <pc:chgData name="Cesar Augusto Lopez Gallego" userId="0dfa9112-9251-4882-b472-cf2dfcee09d1" providerId="ADAL" clId="{A183200B-E2D9-463E-9F21-A331CB0E062A}"/>
     <pc:docChg chg="modSld sldOrd">
       <pc:chgData name="Cesar Augusto Lopez Gallego" userId="0dfa9112-9251-4882-b472-cf2dfcee09d1" providerId="ADAL" clId="{A183200B-E2D9-463E-9F21-A331CB0E062A}" dt="2023-02-01T12:43:53.279" v="30" actId="20577"/>
@@ -345,7 +420,7 @@
           <a:p>
             <a:fld id="{686137FE-060A-406C-8256-1024B28B91EB}" type="datetimeFigureOut">
               <a:rPr lang="es-CO" smtClean="0"/>
-              <a:t>8/02/2024</a:t>
+              <a:t>14/08/2024</a:t>
             </a:fld>
             <a:endParaRPr lang="es-CO"/>
           </a:p>
@@ -726,232 +801,6 @@
 </p:notes>
 </file>
 
-<file path=ppt/notesSlides/notesSlide10.xml><?xml version="1.0" encoding="utf-8"?>
-<p:notes xmlns:a="http://schemas.openxmlformats.org/drawingml/2006/main" xmlns:r="http://schemas.openxmlformats.org/officeDocument/2006/relationships" xmlns:p="http://schemas.openxmlformats.org/presentationml/2006/main" showMasterSp="0" showMasterPhAnim="0">
-  <p:cSld>
-    <p:spTree>
-      <p:nvGrpSpPr>
-        <p:cNvPr id="1" name="Shape 238"/>
-        <p:cNvGrpSpPr/>
-        <p:nvPr/>
-      </p:nvGrpSpPr>
-      <p:grpSpPr>
-        <a:xfrm>
-          <a:off x="0" y="0"/>
-          <a:ext cx="0" cy="0"/>
-          <a:chOff x="0" y="0"/>
-          <a:chExt cx="0" cy="0"/>
-        </a:xfrm>
-      </p:grpSpPr>
-      <p:sp>
-        <p:nvSpPr>
-          <p:cNvPr id="239" name="Google Shape;239;p15:notes"/>
-          <p:cNvSpPr txBox="1">
-            <a:spLocks noGrp="1"/>
-          </p:cNvSpPr>
-          <p:nvPr>
-            <p:ph type="body" idx="1"/>
-          </p:nvPr>
-        </p:nvSpPr>
-        <p:spPr>
-          <a:xfrm>
-            <a:off x="685800" y="4400550"/>
-            <a:ext cx="5486400" cy="3600600"/>
-          </a:xfrm>
-          <a:prstGeom prst="rect">
-            <a:avLst/>
-          </a:prstGeom>
-          <a:noFill/>
-          <a:ln>
-            <a:noFill/>
-          </a:ln>
-        </p:spPr>
-        <p:txBody>
-          <a:bodyPr spcFirstLastPara="1" wrap="square" lIns="91425" tIns="91425" rIns="91425" bIns="91425" anchor="ctr" anchorCtr="0">
-            <a:noAutofit/>
-          </a:bodyPr>
-          <a:lstStyle/>
-          <a:p>
-            <a:pPr marL="0" lvl="0" indent="0" algn="l" rtl="0">
-              <a:spcBef>
-                <a:spcPts val="0"/>
-              </a:spcBef>
-              <a:spcAft>
-                <a:spcPts val="0"/>
-              </a:spcAft>
-              <a:buNone/>
-            </a:pPr>
-            <a:endParaRPr/>
-          </a:p>
-        </p:txBody>
-      </p:sp>
-      <p:sp>
-        <p:nvSpPr>
-          <p:cNvPr id="240" name="Google Shape;240;p15:notes"/>
-          <p:cNvSpPr>
-            <a:spLocks noGrp="1" noRot="1" noChangeAspect="1"/>
-          </p:cNvSpPr>
-          <p:nvPr>
-            <p:ph type="sldImg" idx="2"/>
-          </p:nvPr>
-        </p:nvSpPr>
-        <p:spPr>
-          <a:xfrm>
-            <a:off x="685800" y="1143000"/>
-            <a:ext cx="5486400" cy="3086100"/>
-          </a:xfrm>
-          <a:custGeom>
-            <a:avLst/>
-            <a:gdLst/>
-            <a:ahLst/>
-            <a:cxnLst/>
-            <a:rect l="l" t="t" r="r" b="b"/>
-            <a:pathLst>
-              <a:path w="120000" h="120000" extrusionOk="0">
-                <a:moveTo>
-                  <a:pt x="0" y="0"/>
-                </a:moveTo>
-                <a:lnTo>
-                  <a:pt x="120000" y="0"/>
-                </a:lnTo>
-                <a:lnTo>
-                  <a:pt x="120000" y="120000"/>
-                </a:lnTo>
-                <a:lnTo>
-                  <a:pt x="0" y="120000"/>
-                </a:lnTo>
-                <a:close/>
-              </a:path>
-            </a:pathLst>
-          </a:custGeom>
-        </p:spPr>
-      </p:sp>
-    </p:spTree>
-    <p:extLst>
-      <p:ext uri="{BB962C8B-B14F-4D97-AF65-F5344CB8AC3E}">
-        <p14:creationId xmlns:p14="http://schemas.microsoft.com/office/powerpoint/2010/main" val="418874140"/>
-      </p:ext>
-    </p:extLst>
-  </p:cSld>
-  <p:clrMapOvr>
-    <a:masterClrMapping/>
-  </p:clrMapOvr>
-</p:notes>
-</file>
-
-<file path=ppt/notesSlides/notesSlide11.xml><?xml version="1.0" encoding="utf-8"?>
-<p:notes xmlns:a="http://schemas.openxmlformats.org/drawingml/2006/main" xmlns:r="http://schemas.openxmlformats.org/officeDocument/2006/relationships" xmlns:p="http://schemas.openxmlformats.org/presentationml/2006/main" showMasterSp="0" showMasterPhAnim="0">
-  <p:cSld>
-    <p:spTree>
-      <p:nvGrpSpPr>
-        <p:cNvPr id="1" name="Shape 232"/>
-        <p:cNvGrpSpPr/>
-        <p:nvPr/>
-      </p:nvGrpSpPr>
-      <p:grpSpPr>
-        <a:xfrm>
-          <a:off x="0" y="0"/>
-          <a:ext cx="0" cy="0"/>
-          <a:chOff x="0" y="0"/>
-          <a:chExt cx="0" cy="0"/>
-        </a:xfrm>
-      </p:grpSpPr>
-      <p:sp>
-        <p:nvSpPr>
-          <p:cNvPr id="233" name="Google Shape;233;p14:notes"/>
-          <p:cNvSpPr txBox="1">
-            <a:spLocks noGrp="1"/>
-          </p:cNvSpPr>
-          <p:nvPr>
-            <p:ph type="body" idx="1"/>
-          </p:nvPr>
-        </p:nvSpPr>
-        <p:spPr>
-          <a:xfrm>
-            <a:off x="685800" y="4400550"/>
-            <a:ext cx="5486400" cy="3600600"/>
-          </a:xfrm>
-          <a:prstGeom prst="rect">
-            <a:avLst/>
-          </a:prstGeom>
-          <a:noFill/>
-          <a:ln>
-            <a:noFill/>
-          </a:ln>
-        </p:spPr>
-        <p:txBody>
-          <a:bodyPr spcFirstLastPara="1" wrap="square" lIns="91425" tIns="91425" rIns="91425" bIns="91425" anchor="ctr" anchorCtr="0">
-            <a:noAutofit/>
-          </a:bodyPr>
-          <a:lstStyle/>
-          <a:p>
-            <a:pPr marL="0" lvl="0" indent="0" algn="l" rtl="0">
-              <a:spcBef>
-                <a:spcPts val="0"/>
-              </a:spcBef>
-              <a:spcAft>
-                <a:spcPts val="0"/>
-              </a:spcAft>
-              <a:buNone/>
-            </a:pPr>
-            <a:endParaRPr/>
-          </a:p>
-        </p:txBody>
-      </p:sp>
-      <p:sp>
-        <p:nvSpPr>
-          <p:cNvPr id="234" name="Google Shape;234;p14:notes"/>
-          <p:cNvSpPr>
-            <a:spLocks noGrp="1" noRot="1" noChangeAspect="1"/>
-          </p:cNvSpPr>
-          <p:nvPr>
-            <p:ph type="sldImg" idx="2"/>
-          </p:nvPr>
-        </p:nvSpPr>
-        <p:spPr>
-          <a:xfrm>
-            <a:off x="685800" y="1143000"/>
-            <a:ext cx="5486400" cy="3086100"/>
-          </a:xfrm>
-          <a:custGeom>
-            <a:avLst/>
-            <a:gdLst/>
-            <a:ahLst/>
-            <a:cxnLst/>
-            <a:rect l="l" t="t" r="r" b="b"/>
-            <a:pathLst>
-              <a:path w="120000" h="120000" extrusionOk="0">
-                <a:moveTo>
-                  <a:pt x="0" y="0"/>
-                </a:moveTo>
-                <a:lnTo>
-                  <a:pt x="120000" y="0"/>
-                </a:lnTo>
-                <a:lnTo>
-                  <a:pt x="120000" y="120000"/>
-                </a:lnTo>
-                <a:lnTo>
-                  <a:pt x="0" y="120000"/>
-                </a:lnTo>
-                <a:close/>
-              </a:path>
-            </a:pathLst>
-          </a:custGeom>
-        </p:spPr>
-      </p:sp>
-    </p:spTree>
-    <p:extLst>
-      <p:ext uri="{BB962C8B-B14F-4D97-AF65-F5344CB8AC3E}">
-        <p14:creationId xmlns:p14="http://schemas.microsoft.com/office/powerpoint/2010/main" val="2039826478"/>
-      </p:ext>
-    </p:extLst>
-  </p:cSld>
-  <p:clrMapOvr>
-    <a:masterClrMapping/>
-  </p:clrMapOvr>
-</p:notes>
-</file>
-
 <file path=ppt/notesSlides/notesSlide2.xml><?xml version="1.0" encoding="utf-8"?>
 <p:notes xmlns:a="http://schemas.openxmlformats.org/drawingml/2006/main" xmlns:r="http://schemas.openxmlformats.org/officeDocument/2006/relationships" xmlns:p="http://schemas.openxmlformats.org/presentationml/2006/main" showMasterSp="0" showMasterPhAnim="0">
   <p:cSld>
@@ -1728,119 +1577,6 @@
   <p:cSld>
     <p:spTree>
       <p:nvGrpSpPr>
-        <p:cNvPr id="1" name="Shape 151"/>
-        <p:cNvGrpSpPr/>
-        <p:nvPr/>
-      </p:nvGrpSpPr>
-      <p:grpSpPr>
-        <a:xfrm>
-          <a:off x="0" y="0"/>
-          <a:ext cx="0" cy="0"/>
-          <a:chOff x="0" y="0"/>
-          <a:chExt cx="0" cy="0"/>
-        </a:xfrm>
-      </p:grpSpPr>
-      <p:sp>
-        <p:nvSpPr>
-          <p:cNvPr id="152" name="Google Shape;152;p10:notes"/>
-          <p:cNvSpPr txBox="1">
-            <a:spLocks noGrp="1"/>
-          </p:cNvSpPr>
-          <p:nvPr>
-            <p:ph type="body" idx="1"/>
-          </p:nvPr>
-        </p:nvSpPr>
-        <p:spPr>
-          <a:xfrm>
-            <a:off x="685800" y="4400550"/>
-            <a:ext cx="5486400" cy="3600600"/>
-          </a:xfrm>
-          <a:prstGeom prst="rect">
-            <a:avLst/>
-          </a:prstGeom>
-          <a:noFill/>
-          <a:ln>
-            <a:noFill/>
-          </a:ln>
-        </p:spPr>
-        <p:txBody>
-          <a:bodyPr spcFirstLastPara="1" wrap="square" lIns="91425" tIns="91425" rIns="91425" bIns="91425" anchor="ctr" anchorCtr="0">
-            <a:noAutofit/>
-          </a:bodyPr>
-          <a:lstStyle/>
-          <a:p>
-            <a:pPr marL="0" lvl="0" indent="0" algn="l" rtl="0">
-              <a:spcBef>
-                <a:spcPts val="0"/>
-              </a:spcBef>
-              <a:spcAft>
-                <a:spcPts val="0"/>
-              </a:spcAft>
-              <a:buNone/>
-            </a:pPr>
-            <a:endParaRPr/>
-          </a:p>
-        </p:txBody>
-      </p:sp>
-      <p:sp>
-        <p:nvSpPr>
-          <p:cNvPr id="153" name="Google Shape;153;p10:notes"/>
-          <p:cNvSpPr>
-            <a:spLocks noGrp="1" noRot="1" noChangeAspect="1"/>
-          </p:cNvSpPr>
-          <p:nvPr>
-            <p:ph type="sldImg" idx="2"/>
-          </p:nvPr>
-        </p:nvSpPr>
-        <p:spPr>
-          <a:xfrm>
-            <a:off x="685800" y="1143000"/>
-            <a:ext cx="5486400" cy="3086100"/>
-          </a:xfrm>
-          <a:custGeom>
-            <a:avLst/>
-            <a:gdLst/>
-            <a:ahLst/>
-            <a:cxnLst/>
-            <a:rect l="l" t="t" r="r" b="b"/>
-            <a:pathLst>
-              <a:path w="120000" h="120000" extrusionOk="0">
-                <a:moveTo>
-                  <a:pt x="0" y="0"/>
-                </a:moveTo>
-                <a:lnTo>
-                  <a:pt x="120000" y="0"/>
-                </a:lnTo>
-                <a:lnTo>
-                  <a:pt x="120000" y="120000"/>
-                </a:lnTo>
-                <a:lnTo>
-                  <a:pt x="0" y="120000"/>
-                </a:lnTo>
-                <a:close/>
-              </a:path>
-            </a:pathLst>
-          </a:custGeom>
-        </p:spPr>
-      </p:sp>
-    </p:spTree>
-    <p:extLst>
-      <p:ext uri="{BB962C8B-B14F-4D97-AF65-F5344CB8AC3E}">
-        <p14:creationId xmlns:p14="http://schemas.microsoft.com/office/powerpoint/2010/main" val="2679806873"/>
-      </p:ext>
-    </p:extLst>
-  </p:cSld>
-  <p:clrMapOvr>
-    <a:masterClrMapping/>
-  </p:clrMapOvr>
-</p:notes>
-</file>
-
-<file path=ppt/notesSlides/notesSlide9.xml><?xml version="1.0" encoding="utf-8"?>
-<p:notes xmlns:a="http://schemas.openxmlformats.org/drawingml/2006/main" xmlns:r="http://schemas.openxmlformats.org/officeDocument/2006/relationships" xmlns:p="http://schemas.openxmlformats.org/presentationml/2006/main" showMasterSp="0" showMasterPhAnim="0">
-  <p:cSld>
-    <p:spTree>
-      <p:nvGrpSpPr>
         <p:cNvPr id="1" name="Shape 217"/>
         <p:cNvGrpSpPr/>
         <p:nvPr/>
@@ -1949,6 +1685,119 @@
 </p:notes>
 </file>
 
+<file path=ppt/notesSlides/notesSlide9.xml><?xml version="1.0" encoding="utf-8"?>
+<p:notes xmlns:a="http://schemas.openxmlformats.org/drawingml/2006/main" xmlns:r="http://schemas.openxmlformats.org/officeDocument/2006/relationships" xmlns:p="http://schemas.openxmlformats.org/presentationml/2006/main" showMasterSp="0" showMasterPhAnim="0">
+  <p:cSld>
+    <p:spTree>
+      <p:nvGrpSpPr>
+        <p:cNvPr id="1" name="Shape 238"/>
+        <p:cNvGrpSpPr/>
+        <p:nvPr/>
+      </p:nvGrpSpPr>
+      <p:grpSpPr>
+        <a:xfrm>
+          <a:off x="0" y="0"/>
+          <a:ext cx="0" cy="0"/>
+          <a:chOff x="0" y="0"/>
+          <a:chExt cx="0" cy="0"/>
+        </a:xfrm>
+      </p:grpSpPr>
+      <p:sp>
+        <p:nvSpPr>
+          <p:cNvPr id="239" name="Google Shape;239;p15:notes"/>
+          <p:cNvSpPr txBox="1">
+            <a:spLocks noGrp="1"/>
+          </p:cNvSpPr>
+          <p:nvPr>
+            <p:ph type="body" idx="1"/>
+          </p:nvPr>
+        </p:nvSpPr>
+        <p:spPr>
+          <a:xfrm>
+            <a:off x="685800" y="4400550"/>
+            <a:ext cx="5486400" cy="3600600"/>
+          </a:xfrm>
+          <a:prstGeom prst="rect">
+            <a:avLst/>
+          </a:prstGeom>
+          <a:noFill/>
+          <a:ln>
+            <a:noFill/>
+          </a:ln>
+        </p:spPr>
+        <p:txBody>
+          <a:bodyPr spcFirstLastPara="1" wrap="square" lIns="91425" tIns="91425" rIns="91425" bIns="91425" anchor="ctr" anchorCtr="0">
+            <a:noAutofit/>
+          </a:bodyPr>
+          <a:lstStyle/>
+          <a:p>
+            <a:pPr marL="0" lvl="0" indent="0" algn="l" rtl="0">
+              <a:spcBef>
+                <a:spcPts val="0"/>
+              </a:spcBef>
+              <a:spcAft>
+                <a:spcPts val="0"/>
+              </a:spcAft>
+              <a:buNone/>
+            </a:pPr>
+            <a:endParaRPr/>
+          </a:p>
+        </p:txBody>
+      </p:sp>
+      <p:sp>
+        <p:nvSpPr>
+          <p:cNvPr id="240" name="Google Shape;240;p15:notes"/>
+          <p:cNvSpPr>
+            <a:spLocks noGrp="1" noRot="1" noChangeAspect="1"/>
+          </p:cNvSpPr>
+          <p:nvPr>
+            <p:ph type="sldImg" idx="2"/>
+          </p:nvPr>
+        </p:nvSpPr>
+        <p:spPr>
+          <a:xfrm>
+            <a:off x="685800" y="1143000"/>
+            <a:ext cx="5486400" cy="3086100"/>
+          </a:xfrm>
+          <a:custGeom>
+            <a:avLst/>
+            <a:gdLst/>
+            <a:ahLst/>
+            <a:cxnLst/>
+            <a:rect l="l" t="t" r="r" b="b"/>
+            <a:pathLst>
+              <a:path w="120000" h="120000" extrusionOk="0">
+                <a:moveTo>
+                  <a:pt x="0" y="0"/>
+                </a:moveTo>
+                <a:lnTo>
+                  <a:pt x="120000" y="0"/>
+                </a:lnTo>
+                <a:lnTo>
+                  <a:pt x="120000" y="120000"/>
+                </a:lnTo>
+                <a:lnTo>
+                  <a:pt x="0" y="120000"/>
+                </a:lnTo>
+                <a:close/>
+              </a:path>
+            </a:pathLst>
+          </a:custGeom>
+        </p:spPr>
+      </p:sp>
+    </p:spTree>
+    <p:extLst>
+      <p:ext uri="{BB962C8B-B14F-4D97-AF65-F5344CB8AC3E}">
+        <p14:creationId xmlns:p14="http://schemas.microsoft.com/office/powerpoint/2010/main" val="418874140"/>
+      </p:ext>
+    </p:extLst>
+  </p:cSld>
+  <p:clrMapOvr>
+    <a:masterClrMapping/>
+  </p:clrMapOvr>
+</p:notes>
+</file>
+
 <file path=ppt/slideLayouts/slideLayout1.xml><?xml version="1.0" encoding="utf-8"?>
 <p:sldLayout xmlns:a="http://schemas.openxmlformats.org/drawingml/2006/main" xmlns:r="http://schemas.openxmlformats.org/officeDocument/2006/relationships" xmlns:p="http://schemas.openxmlformats.org/presentationml/2006/main" type="title" preserve="1">
   <p:cSld name="Diapositiva de título">
@@ -2080,7 +1929,7 @@
           <a:p>
             <a:fld id="{3807986E-5C03-4E6F-AF93-F55E25722CDA}" type="datetimeFigureOut">
               <a:rPr lang="es-CO" smtClean="0"/>
-              <a:t>8/02/2024</a:t>
+              <a:t>14/08/2024</a:t>
             </a:fld>
             <a:endParaRPr lang="es-CO"/>
           </a:p>
@@ -2250,7 +2099,7 @@
           <a:p>
             <a:fld id="{3807986E-5C03-4E6F-AF93-F55E25722CDA}" type="datetimeFigureOut">
               <a:rPr lang="es-CO" smtClean="0"/>
-              <a:t>8/02/2024</a:t>
+              <a:t>14/08/2024</a:t>
             </a:fld>
             <a:endParaRPr lang="es-CO"/>
           </a:p>
@@ -2430,7 +2279,7 @@
           <a:p>
             <a:fld id="{3807986E-5C03-4E6F-AF93-F55E25722CDA}" type="datetimeFigureOut">
               <a:rPr lang="es-CO" smtClean="0"/>
-              <a:t>8/02/2024</a:t>
+              <a:t>14/08/2024</a:t>
             </a:fld>
             <a:endParaRPr lang="es-CO"/>
           </a:p>
@@ -11496,7 +11345,7 @@
           <a:p>
             <a:fld id="{3807986E-5C03-4E6F-AF93-F55E25722CDA}" type="datetimeFigureOut">
               <a:rPr lang="es-CO" smtClean="0"/>
-              <a:t>8/02/2024</a:t>
+              <a:t>14/08/2024</a:t>
             </a:fld>
             <a:endParaRPr lang="es-CO"/>
           </a:p>
@@ -15100,7 +14949,7 @@
           <a:p>
             <a:fld id="{3807986E-5C03-4E6F-AF93-F55E25722CDA}" type="datetimeFigureOut">
               <a:rPr lang="es-CO" smtClean="0"/>
-              <a:t>8/02/2024</a:t>
+              <a:t>14/08/2024</a:t>
             </a:fld>
             <a:endParaRPr lang="es-CO"/>
           </a:p>
@@ -15332,7 +15181,7 @@
           <a:p>
             <a:fld id="{3807986E-5C03-4E6F-AF93-F55E25722CDA}" type="datetimeFigureOut">
               <a:rPr lang="es-CO" smtClean="0"/>
-              <a:t>8/02/2024</a:t>
+              <a:t>14/08/2024</a:t>
             </a:fld>
             <a:endParaRPr lang="es-CO"/>
           </a:p>
@@ -15699,7 +15548,7 @@
           <a:p>
             <a:fld id="{3807986E-5C03-4E6F-AF93-F55E25722CDA}" type="datetimeFigureOut">
               <a:rPr lang="es-CO" smtClean="0"/>
-              <a:t>8/02/2024</a:t>
+              <a:t>14/08/2024</a:t>
             </a:fld>
             <a:endParaRPr lang="es-CO"/>
           </a:p>
@@ -15817,7 +15666,7 @@
           <a:p>
             <a:fld id="{3807986E-5C03-4E6F-AF93-F55E25722CDA}" type="datetimeFigureOut">
               <a:rPr lang="es-CO" smtClean="0"/>
-              <a:t>8/02/2024</a:t>
+              <a:t>14/08/2024</a:t>
             </a:fld>
             <a:endParaRPr lang="es-CO"/>
           </a:p>
@@ -15912,7 +15761,7 @@
           <a:p>
             <a:fld id="{3807986E-5C03-4E6F-AF93-F55E25722CDA}" type="datetimeFigureOut">
               <a:rPr lang="es-CO" smtClean="0"/>
-              <a:t>8/02/2024</a:t>
+              <a:t>14/08/2024</a:t>
             </a:fld>
             <a:endParaRPr lang="es-CO"/>
           </a:p>
@@ -16189,7 +16038,7 @@
           <a:p>
             <a:fld id="{3807986E-5C03-4E6F-AF93-F55E25722CDA}" type="datetimeFigureOut">
               <a:rPr lang="es-CO" smtClean="0"/>
-              <a:t>8/02/2024</a:t>
+              <a:t>14/08/2024</a:t>
             </a:fld>
             <a:endParaRPr lang="es-CO"/>
           </a:p>
@@ -16442,7 +16291,7 @@
           <a:p>
             <a:fld id="{3807986E-5C03-4E6F-AF93-F55E25722CDA}" type="datetimeFigureOut">
               <a:rPr lang="es-CO" smtClean="0"/>
-              <a:t>8/02/2024</a:t>
+              <a:t>14/08/2024</a:t>
             </a:fld>
             <a:endParaRPr lang="es-CO"/>
           </a:p>
@@ -16655,7 +16504,7 @@
           <a:p>
             <a:fld id="{3807986E-5C03-4E6F-AF93-F55E25722CDA}" type="datetimeFigureOut">
               <a:rPr lang="es-CO" smtClean="0"/>
-              <a:t>8/02/2024</a:t>
+              <a:t>14/08/2024</a:t>
             </a:fld>
             <a:endParaRPr lang="es-CO"/>
           </a:p>
@@ -18835,7 +18684,7 @@
   <p:cSld>
     <p:spTree>
       <p:nvGrpSpPr>
-        <p:cNvPr id="1" name="Shape 220"/>
+        <p:cNvPr id="1" name=""/>
         <p:cNvGrpSpPr/>
         <p:nvPr/>
       </p:nvGrpSpPr>
@@ -18849,45 +18698,31 @@
       </p:grpSpPr>
       <p:sp>
         <p:nvSpPr>
-          <p:cNvPr id="221" name="Google Shape;221;p22"/>
-          <p:cNvSpPr txBox="1">
+          <p:cNvPr id="2" name="Título 1"/>
+          <p:cNvSpPr>
             <a:spLocks noGrp="1"/>
           </p:cNvSpPr>
           <p:nvPr>
             <p:ph type="title"/>
           </p:nvPr>
         </p:nvSpPr>
-        <p:spPr>
-          <a:xfrm>
-            <a:off x="838200" y="365126"/>
-            <a:ext cx="10515706" cy="1325647"/>
-          </a:xfrm>
-          <a:prstGeom prst="rect">
-            <a:avLst/>
-          </a:prstGeom>
-          <a:noFill/>
-          <a:ln>
-            <a:noFill/>
-          </a:ln>
-        </p:spPr>
+        <p:spPr/>
         <p:txBody>
-          <a:bodyPr spcFirstLastPara="1" wrap="square" lIns="80669" tIns="40324" rIns="80669" bIns="40324" anchor="ctr" anchorCtr="0">
-            <a:noAutofit/>
-          </a:bodyPr>
+          <a:bodyPr/>
           <a:lstStyle/>
           <a:p>
             <a:r>
-              <a:rPr lang="es-CO" dirty="0"/>
-              <a:t>Todo Partes Agregación</a:t>
+              <a:rPr lang="es-ES" dirty="0"/>
+              <a:t>Ejercicio Relaciones Completo</a:t>
             </a:r>
-            <a:endParaRPr dirty="0"/>
+            <a:endParaRPr lang="es-CO" dirty="0"/>
           </a:p>
         </p:txBody>
       </p:sp>
       <p:sp>
         <p:nvSpPr>
-          <p:cNvPr id="222" name="Google Shape;222;p22"/>
-          <p:cNvSpPr txBox="1">
+          <p:cNvPr id="3" name="Marcador de texto 2"/>
+          <p:cNvSpPr>
             <a:spLocks noGrp="1"/>
           </p:cNvSpPr>
           <p:nvPr>
@@ -18896,1443 +18731,187 @@
         </p:nvSpPr>
         <p:spPr>
           <a:xfrm>
-            <a:off x="838200" y="1825625"/>
-            <a:ext cx="4962706" cy="4351235"/>
+            <a:off x="165253" y="1370627"/>
+            <a:ext cx="7422169" cy="4656462"/>
+          </a:xfrm>
+        </p:spPr>
+        <p:txBody>
+          <a:bodyPr/>
+          <a:lstStyle/>
+          <a:p>
+            <a:r>
+              <a:rPr lang="es-ES" sz="1800" dirty="0"/>
+              <a:t>Se tiene un </a:t>
+            </a:r>
+            <a:r>
+              <a:rPr lang="es-ES" sz="1800" dirty="0">
+                <a:highlight>
+                  <a:srgbClr val="00FF00"/>
+                </a:highlight>
+              </a:rPr>
+              <a:t>parque</a:t>
+            </a:r>
+            <a:r>
+              <a:rPr lang="es-ES" sz="1800" dirty="0"/>
+              <a:t> de diversiones compuesto por 10 </a:t>
+            </a:r>
+            <a:r>
+              <a:rPr lang="es-ES" sz="1800" dirty="0">
+                <a:highlight>
+                  <a:srgbClr val="00FF00"/>
+                </a:highlight>
+              </a:rPr>
+              <a:t>atracciones</a:t>
+            </a:r>
+            <a:r>
+              <a:rPr lang="es-ES" sz="1800" dirty="0"/>
+              <a:t> y 3 </a:t>
+            </a:r>
+            <a:r>
+              <a:rPr lang="es-ES" sz="1800" dirty="0">
+                <a:highlight>
+                  <a:srgbClr val="00FF00"/>
+                </a:highlight>
+              </a:rPr>
+              <a:t>taquillas</a:t>
+            </a:r>
+            <a:r>
+              <a:rPr lang="es-ES" sz="1800" dirty="0"/>
+              <a:t>. Cuando el parque abre, tiene </a:t>
+            </a:r>
+            <a:r>
+              <a:rPr lang="es-ES" sz="1800"/>
+              <a:t>1000 manillas. </a:t>
+            </a:r>
+            <a:endParaRPr lang="es-ES" sz="1800" dirty="0"/>
+          </a:p>
+          <a:p>
+            <a:r>
+              <a:rPr lang="es-ES" sz="1800" dirty="0"/>
+              <a:t>La </a:t>
+            </a:r>
+            <a:r>
+              <a:rPr lang="es-ES" sz="1800" dirty="0">
+                <a:highlight>
+                  <a:srgbClr val="FF0000"/>
+                </a:highlight>
+              </a:rPr>
+              <a:t>persona</a:t>
+            </a:r>
+            <a:r>
+              <a:rPr lang="es-ES" sz="1800" dirty="0"/>
+              <a:t> cuando va a ingresar adquiere una </a:t>
+            </a:r>
+            <a:r>
+              <a:rPr lang="es-ES" sz="1800" dirty="0">
+                <a:highlight>
+                  <a:srgbClr val="00FF00"/>
+                </a:highlight>
+              </a:rPr>
+              <a:t>manilla</a:t>
+            </a:r>
+            <a:r>
+              <a:rPr lang="es-ES" sz="1800" dirty="0"/>
+              <a:t> que carga con </a:t>
+            </a:r>
+            <a:r>
+              <a:rPr lang="es-ES" sz="1800" dirty="0">
+                <a:highlight>
+                  <a:srgbClr val="FF0000"/>
+                </a:highlight>
+              </a:rPr>
+              <a:t>dinero</a:t>
+            </a:r>
+            <a:r>
+              <a:rPr lang="es-ES" sz="1800" dirty="0"/>
+              <a:t>. </a:t>
+            </a:r>
+          </a:p>
+          <a:p>
+            <a:r>
+              <a:rPr lang="es-ES" sz="1800" dirty="0"/>
+              <a:t>La carga mínima son $20,000. De la carga siempre le descuentan 4.000 del ingreso y el dinero restante los convierten en 1 punto por cada $500. </a:t>
+            </a:r>
+          </a:p>
+          <a:p>
+            <a:r>
+              <a:rPr lang="es-ES" sz="1800" dirty="0"/>
+              <a:t>Cada atracción tiene el nombre, la duración y unos puntos para ingresar que se descuentan en la manilla de cada persona.  </a:t>
+            </a:r>
+          </a:p>
+          <a:p>
+            <a:r>
+              <a:rPr lang="es-ES" sz="1800" dirty="0"/>
+              <a:t>La manilla tiene un id interno y el saldo en puntos. </a:t>
+            </a:r>
+          </a:p>
+          <a:p>
+            <a:r>
+              <a:rPr lang="es-ES" sz="1800" dirty="0"/>
+              <a:t>La taquilla tiene un  id interno y el saldo en dinero que va recogiendo y el saldo de las manillas que va entregando. Cada taquilla comienza con un saldo de $0 en dinero y 100 manillas. </a:t>
+            </a:r>
+          </a:p>
+          <a:p>
+            <a:r>
+              <a:rPr lang="es-ES" sz="1800" dirty="0"/>
+              <a:t>El parque tiene un </a:t>
+            </a:r>
+            <a:r>
+              <a:rPr lang="es-ES" sz="1800" dirty="0">
+                <a:highlight>
+                  <a:srgbClr val="00FF00"/>
+                </a:highlight>
+              </a:rPr>
+              <a:t>registro</a:t>
+            </a:r>
+            <a:r>
+              <a:rPr lang="es-ES" sz="1800" dirty="0"/>
+              <a:t> de todas las </a:t>
+            </a:r>
+            <a:r>
+              <a:rPr lang="es-ES" sz="1800" dirty="0">
+                <a:highlight>
+                  <a:srgbClr val="FF0000"/>
+                </a:highlight>
+              </a:rPr>
+              <a:t>entradas</a:t>
+            </a:r>
+            <a:r>
+              <a:rPr lang="es-ES" sz="1800" dirty="0"/>
+              <a:t> que se hacen en las atracciones el cual tiene: la manilla, la hora, la atracción</a:t>
+            </a:r>
+            <a:endParaRPr lang="es-CO" sz="1800" dirty="0"/>
+          </a:p>
+        </p:txBody>
+      </p:sp>
+      <p:pic>
+        <p:nvPicPr>
+          <p:cNvPr id="4" name="Imagen 3"/>
+          <p:cNvPicPr>
+            <a:picLocks noChangeAspect="1"/>
+          </p:cNvPicPr>
+          <p:nvPr/>
+        </p:nvPicPr>
+        <p:blipFill>
+          <a:blip r:embed="rId2"/>
+          <a:stretch>
+            <a:fillRect/>
+          </a:stretch>
+        </p:blipFill>
+        <p:spPr>
+          <a:xfrm>
+            <a:off x="7741658" y="2074389"/>
+            <a:ext cx="4063833" cy="2709222"/>
           </a:xfrm>
           <a:prstGeom prst="rect">
             <a:avLst/>
           </a:prstGeom>
-          <a:noFill/>
-          <a:ln>
-            <a:noFill/>
-          </a:ln>
         </p:spPr>
-        <p:txBody>
-          <a:bodyPr spcFirstLastPara="1" wrap="square" lIns="80669" tIns="40324" rIns="80669" bIns="40324" anchor="t" anchorCtr="0">
-            <a:noAutofit/>
-          </a:bodyPr>
-          <a:lstStyle/>
-          <a:p>
-            <a:pPr marL="228605" indent="-228605">
-              <a:spcBef>
-                <a:spcPts val="0"/>
-              </a:spcBef>
-              <a:buSzPts val="2400"/>
-            </a:pPr>
-            <a:r>
-              <a:rPr lang="es-CO" sz="2118"/>
-              <a:t>Acomplamiento más fuerte entre clases que la asociación</a:t>
-            </a:r>
-            <a:endParaRPr sz="2118"/>
-          </a:p>
-          <a:p>
-            <a:pPr marL="228605" indent="-228605">
-              <a:buSzPts val="2400"/>
-            </a:pPr>
-            <a:r>
-              <a:rPr lang="es-CO" sz="2118"/>
-              <a:t>Una de las clases representa el TODO y las demás las PARTES</a:t>
-            </a:r>
-            <a:endParaRPr/>
-          </a:p>
-          <a:p>
-            <a:pPr marL="228605" indent="-228605">
-              <a:buSzPts val="2400"/>
-            </a:pPr>
-            <a:r>
-              <a:rPr lang="es-CO" sz="2118"/>
-              <a:t>Un objeto será representado por el TODO + las Partes</a:t>
-            </a:r>
-            <a:endParaRPr sz="2118"/>
-          </a:p>
-          <a:p>
-            <a:pPr marL="228605" indent="-228605">
-              <a:buSzPts val="2400"/>
-            </a:pPr>
-            <a:r>
-              <a:rPr lang="es-CO" sz="2118"/>
-              <a:t>Se puede entender la agregación como una serie de clases que aparecen como atributos de otras clases</a:t>
-            </a:r>
-            <a:endParaRPr sz="2118"/>
-          </a:p>
-          <a:p>
-            <a:pPr marL="228605" indent="-228605">
-              <a:buSzPts val="2400"/>
-            </a:pPr>
-            <a:r>
-              <a:rPr lang="es-CO" sz="2118"/>
-              <a:t>El rombo en blanco está en la clase propietaria o el todo</a:t>
-            </a:r>
-            <a:endParaRPr sz="2118"/>
-          </a:p>
-          <a:p>
-            <a:pPr marL="228605" indent="-94127">
-              <a:buSzPts val="2400"/>
-              <a:buNone/>
-            </a:pPr>
-            <a:endParaRPr sz="2118"/>
-          </a:p>
-          <a:p>
-            <a:pPr marL="228605" indent="-94127">
-              <a:buSzPts val="2400"/>
-              <a:buNone/>
-            </a:pPr>
-            <a:endParaRPr sz="2118"/>
-          </a:p>
-        </p:txBody>
-      </p:sp>
-      <p:grpSp>
-        <p:nvGrpSpPr>
-          <p:cNvPr id="223" name="Google Shape;223;p22"/>
-          <p:cNvGrpSpPr/>
-          <p:nvPr/>
-        </p:nvGrpSpPr>
-        <p:grpSpPr>
-          <a:xfrm>
-            <a:off x="6704130" y="2540213"/>
-            <a:ext cx="4649588" cy="1761799"/>
-            <a:chOff x="7598014" y="2878908"/>
-            <a:chExt cx="5269533" cy="1996706"/>
-          </a:xfrm>
-        </p:grpSpPr>
-        <p:sp>
-          <p:nvSpPr>
-            <p:cNvPr id="224" name="Google Shape;224;p22"/>
-            <p:cNvSpPr/>
-            <p:nvPr/>
-          </p:nvSpPr>
-          <p:spPr>
-            <a:xfrm>
-              <a:off x="9541117" y="2878908"/>
-              <a:ext cx="1466100" cy="523200"/>
-            </a:xfrm>
-            <a:prstGeom prst="rect">
-              <a:avLst/>
-            </a:prstGeom>
-            <a:solidFill>
-              <a:schemeClr val="lt1"/>
-            </a:solidFill>
-            <a:ln w="12700" cap="flat" cmpd="sng">
-              <a:solidFill>
-                <a:srgbClr val="42719B"/>
-              </a:solidFill>
-              <a:prstDash val="solid"/>
-              <a:miter lim="800000"/>
-              <a:headEnd type="none" w="sm" len="sm"/>
-              <a:tailEnd type="none" w="sm" len="sm"/>
-            </a:ln>
-          </p:spPr>
-          <p:txBody>
-            <a:bodyPr spcFirstLastPara="1" wrap="square" lIns="80669" tIns="40324" rIns="80669" bIns="40324" anchor="ctr" anchorCtr="0">
-              <a:noAutofit/>
-            </a:bodyPr>
-            <a:lstStyle/>
-            <a:p>
-              <a:pPr algn="ctr" defTabSz="806867">
-                <a:buClr>
-                  <a:srgbClr val="000000"/>
-                </a:buClr>
-              </a:pPr>
-              <a:r>
-                <a:rPr lang="es-CO" sz="1588" kern="0">
-                  <a:solidFill>
-                    <a:srgbClr val="C00000"/>
-                  </a:solidFill>
-                  <a:latin typeface="Calibri"/>
-                  <a:ea typeface="Calibri"/>
-                  <a:cs typeface="Calibri"/>
-                  <a:sym typeface="Calibri"/>
-                </a:rPr>
-                <a:t>Clase TODO</a:t>
-              </a:r>
-              <a:endParaRPr sz="1588" kern="0">
-                <a:solidFill>
-                  <a:srgbClr val="C00000"/>
-                </a:solidFill>
-                <a:latin typeface="Calibri"/>
-                <a:ea typeface="Calibri"/>
-                <a:cs typeface="Calibri"/>
-                <a:sym typeface="Calibri"/>
-              </a:endParaRPr>
-            </a:p>
-          </p:txBody>
-        </p:sp>
-        <p:sp>
-          <p:nvSpPr>
-            <p:cNvPr id="225" name="Google Shape;225;p22"/>
-            <p:cNvSpPr/>
-            <p:nvPr/>
-          </p:nvSpPr>
-          <p:spPr>
-            <a:xfrm>
-              <a:off x="11401447" y="4352414"/>
-              <a:ext cx="1466100" cy="523200"/>
-            </a:xfrm>
-            <a:prstGeom prst="rect">
-              <a:avLst/>
-            </a:prstGeom>
-            <a:solidFill>
-              <a:schemeClr val="lt1"/>
-            </a:solidFill>
-            <a:ln w="12700" cap="flat" cmpd="sng">
-              <a:solidFill>
-                <a:srgbClr val="42719B"/>
-              </a:solidFill>
-              <a:prstDash val="solid"/>
-              <a:miter lim="800000"/>
-              <a:headEnd type="none" w="sm" len="sm"/>
-              <a:tailEnd type="none" w="sm" len="sm"/>
-            </a:ln>
-          </p:spPr>
-          <p:txBody>
-            <a:bodyPr spcFirstLastPara="1" wrap="square" lIns="80669" tIns="40324" rIns="80669" bIns="40324" anchor="ctr" anchorCtr="0">
-              <a:noAutofit/>
-            </a:bodyPr>
-            <a:lstStyle/>
-            <a:p>
-              <a:pPr algn="ctr" defTabSz="806867">
-                <a:buClr>
-                  <a:srgbClr val="000000"/>
-                </a:buClr>
-              </a:pPr>
-              <a:r>
-                <a:rPr lang="es-CO" sz="1588" kern="0">
-                  <a:solidFill>
-                    <a:srgbClr val="C00000"/>
-                  </a:solidFill>
-                  <a:latin typeface="Calibri"/>
-                  <a:ea typeface="Calibri"/>
-                  <a:cs typeface="Calibri"/>
-                  <a:sym typeface="Calibri"/>
-                </a:rPr>
-                <a:t>Clase Parte</a:t>
-              </a:r>
-              <a:endParaRPr sz="1588" kern="0">
-                <a:solidFill>
-                  <a:srgbClr val="C00000"/>
-                </a:solidFill>
-                <a:latin typeface="Calibri"/>
-                <a:ea typeface="Calibri"/>
-                <a:cs typeface="Calibri"/>
-                <a:sym typeface="Calibri"/>
-              </a:endParaRPr>
-            </a:p>
-          </p:txBody>
-        </p:sp>
-        <p:sp>
-          <p:nvSpPr>
-            <p:cNvPr id="226" name="Google Shape;226;p22"/>
-            <p:cNvSpPr/>
-            <p:nvPr/>
-          </p:nvSpPr>
-          <p:spPr>
-            <a:xfrm>
-              <a:off x="10140206" y="3402128"/>
-              <a:ext cx="268014" cy="305023"/>
-            </a:xfrm>
-            <a:prstGeom prst="flowChartDecision">
-              <a:avLst/>
-            </a:prstGeom>
-            <a:solidFill>
-              <a:schemeClr val="lt1"/>
-            </a:solidFill>
-            <a:ln w="12700" cap="flat" cmpd="sng">
-              <a:solidFill>
-                <a:srgbClr val="42719B"/>
-              </a:solidFill>
-              <a:prstDash val="solid"/>
-              <a:miter lim="800000"/>
-              <a:headEnd type="none" w="sm" len="sm"/>
-              <a:tailEnd type="none" w="sm" len="sm"/>
-            </a:ln>
-          </p:spPr>
-          <p:txBody>
-            <a:bodyPr spcFirstLastPara="1" wrap="square" lIns="80669" tIns="40324" rIns="80669" bIns="40324" anchor="ctr" anchorCtr="0">
-              <a:noAutofit/>
-            </a:bodyPr>
-            <a:lstStyle/>
-            <a:p>
-              <a:pPr algn="ctr" defTabSz="806867">
-                <a:buClr>
-                  <a:srgbClr val="000000"/>
-                </a:buClr>
-              </a:pPr>
-              <a:endParaRPr sz="1588" kern="0">
-                <a:solidFill>
-                  <a:srgbClr val="FFFFFF"/>
-                </a:solidFill>
-                <a:latin typeface="Calibri"/>
-                <a:ea typeface="Calibri"/>
-                <a:cs typeface="Calibri"/>
-                <a:sym typeface="Calibri"/>
-              </a:endParaRPr>
-            </a:p>
-          </p:txBody>
-        </p:sp>
-        <p:cxnSp>
-          <p:nvCxnSpPr>
-            <p:cNvPr id="227" name="Google Shape;227;p22"/>
-            <p:cNvCxnSpPr>
-              <a:stCxn id="226" idx="2"/>
-              <a:endCxn id="225" idx="0"/>
-            </p:cNvCxnSpPr>
-            <p:nvPr/>
-          </p:nvCxnSpPr>
-          <p:spPr>
-            <a:xfrm rot="-5400000" flipH="1">
-              <a:off x="10881713" y="3099651"/>
-              <a:ext cx="645300" cy="1860300"/>
-            </a:xfrm>
-            <a:prstGeom prst="bentConnector3">
-              <a:avLst>
-                <a:gd name="adj1" fmla="val 50000"/>
-              </a:avLst>
-            </a:prstGeom>
-            <a:noFill/>
-            <a:ln w="9525" cap="flat" cmpd="sng">
-              <a:solidFill>
-                <a:schemeClr val="accent1"/>
-              </a:solidFill>
-              <a:prstDash val="solid"/>
-              <a:miter lim="800000"/>
-              <a:headEnd type="none" w="sm" len="sm"/>
-              <a:tailEnd type="none" w="sm" len="sm"/>
-            </a:ln>
-          </p:spPr>
-        </p:cxnSp>
-        <p:sp>
-          <p:nvSpPr>
-            <p:cNvPr id="228" name="Google Shape;228;p22"/>
-            <p:cNvSpPr/>
-            <p:nvPr/>
-          </p:nvSpPr>
-          <p:spPr>
-            <a:xfrm>
-              <a:off x="9548993" y="4352413"/>
-              <a:ext cx="1466100" cy="523200"/>
-            </a:xfrm>
-            <a:prstGeom prst="rect">
-              <a:avLst/>
-            </a:prstGeom>
-            <a:solidFill>
-              <a:schemeClr val="lt1"/>
-            </a:solidFill>
-            <a:ln w="12700" cap="flat" cmpd="sng">
-              <a:solidFill>
-                <a:srgbClr val="42719B"/>
-              </a:solidFill>
-              <a:prstDash val="solid"/>
-              <a:miter lim="800000"/>
-              <a:headEnd type="none" w="sm" len="sm"/>
-              <a:tailEnd type="none" w="sm" len="sm"/>
-            </a:ln>
-          </p:spPr>
-          <p:txBody>
-            <a:bodyPr spcFirstLastPara="1" wrap="square" lIns="80669" tIns="40324" rIns="80669" bIns="40324" anchor="ctr" anchorCtr="0">
-              <a:noAutofit/>
-            </a:bodyPr>
-            <a:lstStyle/>
-            <a:p>
-              <a:pPr algn="ctr" defTabSz="806867">
-                <a:buClr>
-                  <a:srgbClr val="000000"/>
-                </a:buClr>
-              </a:pPr>
-              <a:r>
-                <a:rPr lang="es-CO" sz="1588" kern="0">
-                  <a:solidFill>
-                    <a:srgbClr val="C00000"/>
-                  </a:solidFill>
-                  <a:latin typeface="Calibri"/>
-                  <a:ea typeface="Calibri"/>
-                  <a:cs typeface="Calibri"/>
-                  <a:sym typeface="Calibri"/>
-                </a:rPr>
-                <a:t>Clase Parte</a:t>
-              </a:r>
-              <a:endParaRPr sz="1588" kern="0">
-                <a:solidFill>
-                  <a:srgbClr val="C00000"/>
-                </a:solidFill>
-                <a:latin typeface="Calibri"/>
-                <a:ea typeface="Calibri"/>
-                <a:cs typeface="Calibri"/>
-                <a:sym typeface="Calibri"/>
-              </a:endParaRPr>
-            </a:p>
-          </p:txBody>
-        </p:sp>
-        <p:sp>
-          <p:nvSpPr>
-            <p:cNvPr id="229" name="Google Shape;229;p22"/>
-            <p:cNvSpPr/>
-            <p:nvPr/>
-          </p:nvSpPr>
-          <p:spPr>
-            <a:xfrm>
-              <a:off x="7598014" y="4352413"/>
-              <a:ext cx="1466100" cy="523200"/>
-            </a:xfrm>
-            <a:prstGeom prst="rect">
-              <a:avLst/>
-            </a:prstGeom>
-            <a:solidFill>
-              <a:schemeClr val="lt1"/>
-            </a:solidFill>
-            <a:ln w="12700" cap="flat" cmpd="sng">
-              <a:solidFill>
-                <a:srgbClr val="42719B"/>
-              </a:solidFill>
-              <a:prstDash val="solid"/>
-              <a:miter lim="800000"/>
-              <a:headEnd type="none" w="sm" len="sm"/>
-              <a:tailEnd type="none" w="sm" len="sm"/>
-            </a:ln>
-          </p:spPr>
-          <p:txBody>
-            <a:bodyPr spcFirstLastPara="1" wrap="square" lIns="80669" tIns="40324" rIns="80669" bIns="40324" anchor="ctr" anchorCtr="0">
-              <a:noAutofit/>
-            </a:bodyPr>
-            <a:lstStyle/>
-            <a:p>
-              <a:pPr algn="ctr" defTabSz="806867">
-                <a:buClr>
-                  <a:srgbClr val="000000"/>
-                </a:buClr>
-              </a:pPr>
-              <a:r>
-                <a:rPr lang="es-CO" sz="1588" kern="0">
-                  <a:solidFill>
-                    <a:srgbClr val="C00000"/>
-                  </a:solidFill>
-                  <a:latin typeface="Calibri"/>
-                  <a:ea typeface="Calibri"/>
-                  <a:cs typeface="Calibri"/>
-                  <a:sym typeface="Calibri"/>
-                </a:rPr>
-                <a:t>Clase Parte</a:t>
-              </a:r>
-              <a:endParaRPr sz="1588" kern="0">
-                <a:solidFill>
-                  <a:srgbClr val="C00000"/>
-                </a:solidFill>
-                <a:latin typeface="Calibri"/>
-                <a:ea typeface="Calibri"/>
-                <a:cs typeface="Calibri"/>
-                <a:sym typeface="Calibri"/>
-              </a:endParaRPr>
-            </a:p>
-          </p:txBody>
-        </p:sp>
-        <p:cxnSp>
-          <p:nvCxnSpPr>
-            <p:cNvPr id="230" name="Google Shape;230;p22"/>
-            <p:cNvCxnSpPr>
-              <a:stCxn id="229" idx="0"/>
-              <a:endCxn id="226" idx="2"/>
-            </p:cNvCxnSpPr>
-            <p:nvPr/>
-          </p:nvCxnSpPr>
-          <p:spPr>
-            <a:xfrm rot="-5400000">
-              <a:off x="8979964" y="3058213"/>
-              <a:ext cx="645300" cy="1943100"/>
-            </a:xfrm>
-            <a:prstGeom prst="bentConnector3">
-              <a:avLst>
-                <a:gd name="adj1" fmla="val 50000"/>
-              </a:avLst>
-            </a:prstGeom>
-            <a:noFill/>
-            <a:ln w="9525" cap="flat" cmpd="sng">
-              <a:solidFill>
-                <a:schemeClr val="accent1"/>
-              </a:solidFill>
-              <a:prstDash val="solid"/>
-              <a:miter lim="800000"/>
-              <a:headEnd type="none" w="sm" len="sm"/>
-              <a:tailEnd type="none" w="sm" len="sm"/>
-            </a:ln>
-          </p:spPr>
-        </p:cxnSp>
-        <p:cxnSp>
-          <p:nvCxnSpPr>
-            <p:cNvPr id="231" name="Google Shape;231;p22"/>
-            <p:cNvCxnSpPr>
-              <a:stCxn id="228" idx="0"/>
-              <a:endCxn id="226" idx="2"/>
-            </p:cNvCxnSpPr>
-            <p:nvPr/>
-          </p:nvCxnSpPr>
-          <p:spPr>
-            <a:xfrm rot="5400000" flipH="1">
-              <a:off x="9955493" y="4025863"/>
-              <a:ext cx="645300" cy="7800"/>
-            </a:xfrm>
-            <a:prstGeom prst="bentConnector3">
-              <a:avLst>
-                <a:gd name="adj1" fmla="val 50000"/>
-              </a:avLst>
-            </a:prstGeom>
-            <a:noFill/>
-            <a:ln w="9525" cap="flat" cmpd="sng">
-              <a:solidFill>
-                <a:schemeClr val="accent1"/>
-              </a:solidFill>
-              <a:prstDash val="solid"/>
-              <a:miter lim="800000"/>
-              <a:headEnd type="none" w="sm" len="sm"/>
-              <a:tailEnd type="none" w="sm" len="sm"/>
-            </a:ln>
-          </p:spPr>
-        </p:cxnSp>
-      </p:grpSp>
+      </p:pic>
     </p:spTree>
     <p:extLst>
       <p:ext uri="{BB962C8B-B14F-4D97-AF65-F5344CB8AC3E}">
-        <p14:creationId xmlns:p14="http://schemas.microsoft.com/office/powerpoint/2010/main" val="422580424"/>
-      </p:ext>
-    </p:extLst>
-  </p:cSld>
-  <p:clrMapOvr>
-    <a:masterClrMapping/>
-  </p:clrMapOvr>
-  <p:timing>
-    <p:tnLst>
-      <p:par>
-        <p:cTn id="1" dur="indefinite" restart="never" nodeType="tmRoot">
-          <p:childTnLst>
-            <p:seq concurrent="1" nextAc="seek">
-              <p:cTn id="2" dur="indefinite" nodeType="mainSeq">
-                <p:childTnLst>
-                  <p:par>
-                    <p:cTn id="3" fill="hold">
-                      <p:stCondLst>
-                        <p:cond delay="indefinite"/>
-                      </p:stCondLst>
-                      <p:childTnLst>
-                        <p:par>
-                          <p:cTn id="4" fill="hold">
-                            <p:stCondLst>
-                              <p:cond delay="0"/>
-                            </p:stCondLst>
-                            <p:childTnLst>
-                              <p:par>
-                                <p:cTn id="5" presetID="1" presetClass="entr" presetSubtype="0" fill="hold" nodeType="clickEffect">
-                                  <p:stCondLst>
-                                    <p:cond delay="0"/>
-                                  </p:stCondLst>
-                                  <p:childTnLst>
-                                    <p:set>
-                                      <p:cBhvr>
-                                        <p:cTn id="6" dur="1" fill="hold">
-                                          <p:stCondLst>
-                                            <p:cond delay="0"/>
-                                          </p:stCondLst>
-                                        </p:cTn>
-                                        <p:tgtEl>
-                                          <p:spTgt spid="223"/>
-                                        </p:tgtEl>
-                                        <p:attrNameLst>
-                                          <p:attrName>style.visibility</p:attrName>
-                                        </p:attrNameLst>
-                                      </p:cBhvr>
-                                      <p:to>
-                                        <p:strVal val="visible"/>
-                                      </p:to>
-                                    </p:set>
-                                  </p:childTnLst>
-                                </p:cTn>
-                              </p:par>
-                            </p:childTnLst>
-                          </p:cTn>
-                        </p:par>
-                      </p:childTnLst>
-                    </p:cTn>
-                  </p:par>
-                </p:childTnLst>
-              </p:cTn>
-              <p:prevCondLst>
-                <p:cond evt="onPrev" delay="0">
-                  <p:tgtEl>
-                    <p:sldTgt/>
-                  </p:tgtEl>
-                </p:cond>
-              </p:prevCondLst>
-              <p:nextCondLst>
-                <p:cond evt="onNext" delay="0">
-                  <p:tgtEl>
-                    <p:sldTgt/>
-                  </p:tgtEl>
-                </p:cond>
-              </p:nextCondLst>
-            </p:seq>
-          </p:childTnLst>
-        </p:cTn>
-      </p:par>
-    </p:tnLst>
-  </p:timing>
-</p:sld>
-</file>
-
-<file path=ppt/slides/slide11.xml><?xml version="1.0" encoding="utf-8"?>
-<p:sld xmlns:a="http://schemas.openxmlformats.org/drawingml/2006/main" xmlns:r="http://schemas.openxmlformats.org/officeDocument/2006/relationships" xmlns:p="http://schemas.openxmlformats.org/presentationml/2006/main">
-  <p:cSld>
-    <p:spTree>
-      <p:nvGrpSpPr>
-        <p:cNvPr id="1" name="Shape 241"/>
-        <p:cNvGrpSpPr/>
-        <p:nvPr/>
-      </p:nvGrpSpPr>
-      <p:grpSpPr>
-        <a:xfrm>
-          <a:off x="0" y="0"/>
-          <a:ext cx="0" cy="0"/>
-          <a:chOff x="0" y="0"/>
-          <a:chExt cx="0" cy="0"/>
-        </a:xfrm>
-      </p:grpSpPr>
-      <p:sp>
-        <p:nvSpPr>
-          <p:cNvPr id="242" name="Google Shape;242;p24"/>
-          <p:cNvSpPr txBox="1">
-            <a:spLocks noGrp="1"/>
-          </p:cNvSpPr>
-          <p:nvPr>
-            <p:ph type="title"/>
-          </p:nvPr>
-        </p:nvSpPr>
-        <p:spPr>
-          <a:xfrm>
-            <a:off x="838200" y="365126"/>
-            <a:ext cx="10515706" cy="1325647"/>
-          </a:xfrm>
-          <a:prstGeom prst="rect">
-            <a:avLst/>
-          </a:prstGeom>
-          <a:noFill/>
-          <a:ln>
-            <a:noFill/>
-          </a:ln>
-        </p:spPr>
-        <p:txBody>
-          <a:bodyPr spcFirstLastPara="1" wrap="square" lIns="80669" tIns="40324" rIns="80669" bIns="40324" anchor="ctr" anchorCtr="0">
-            <a:noAutofit/>
-          </a:bodyPr>
-          <a:lstStyle/>
-          <a:p>
-            <a:r>
-              <a:rPr lang="es-CO" dirty="0"/>
-              <a:t>Todo Partes Composición</a:t>
-            </a:r>
-            <a:endParaRPr dirty="0"/>
-          </a:p>
-        </p:txBody>
-      </p:sp>
-      <p:sp>
-        <p:nvSpPr>
-          <p:cNvPr id="243" name="Google Shape;243;p24"/>
-          <p:cNvSpPr txBox="1">
-            <a:spLocks noGrp="1"/>
-          </p:cNvSpPr>
-          <p:nvPr>
-            <p:ph type="body" idx="1"/>
-          </p:nvPr>
-        </p:nvSpPr>
-        <p:spPr>
-          <a:xfrm>
-            <a:off x="838200" y="1825625"/>
-            <a:ext cx="5574706" cy="4351235"/>
-          </a:xfrm>
-          <a:prstGeom prst="rect">
-            <a:avLst/>
-          </a:prstGeom>
-          <a:noFill/>
-          <a:ln>
-            <a:noFill/>
-          </a:ln>
-        </p:spPr>
-        <p:txBody>
-          <a:bodyPr spcFirstLastPara="1" wrap="square" lIns="80669" tIns="40324" rIns="80669" bIns="40324" anchor="t" anchorCtr="0">
-            <a:noAutofit/>
-          </a:bodyPr>
-          <a:lstStyle/>
-          <a:p>
-            <a:pPr marL="228605" indent="-228605">
-              <a:spcBef>
-                <a:spcPts val="0"/>
-              </a:spcBef>
-              <a:buSzPts val="2935"/>
-            </a:pPr>
-            <a:r>
-              <a:rPr lang="es-CO" sz="2590"/>
-              <a:t>Tipo especial de agregación</a:t>
-            </a:r>
-            <a:endParaRPr sz="2590"/>
-          </a:p>
-          <a:p>
-            <a:pPr marL="228605" indent="-228605">
-              <a:buSzPts val="2935"/>
-            </a:pPr>
-            <a:r>
-              <a:rPr lang="es-CO" sz="2590"/>
-              <a:t>Supone algunas restricciones</a:t>
-            </a:r>
-            <a:endParaRPr/>
-          </a:p>
-          <a:p>
-            <a:pPr marL="228605" indent="-228605">
-              <a:buSzPts val="2935"/>
-            </a:pPr>
-            <a:r>
-              <a:rPr lang="es-CO" sz="2590"/>
-              <a:t>Cada componente pertenece a un solo todo. Los componentes no tienen sentido fuera del objeto resultante</a:t>
-            </a:r>
-            <a:endParaRPr/>
-          </a:p>
-          <a:p>
-            <a:pPr marL="228605" indent="-228605">
-              <a:buSzPts val="2935"/>
-            </a:pPr>
-            <a:r>
-              <a:rPr lang="es-CO" sz="2590"/>
-              <a:t>Si el objeto completo se borra o se copia, sus partes se copian o suprimen con él</a:t>
-            </a:r>
-            <a:endParaRPr/>
-          </a:p>
-          <a:p>
-            <a:pPr marL="228605" indent="-228605">
-              <a:buSzPts val="2935"/>
-            </a:pPr>
-            <a:r>
-              <a:rPr lang="es-CO" sz="2590"/>
-              <a:t>El rombo en este caso, es relleno</a:t>
-            </a:r>
-            <a:endParaRPr/>
-          </a:p>
-          <a:p>
-            <a:pPr marL="228605" indent="-228605">
-              <a:buSzPts val="2935"/>
-            </a:pPr>
-            <a:r>
-              <a:rPr lang="es-CO" sz="2590"/>
-              <a:t>“..es parte de…”</a:t>
-            </a:r>
-            <a:endParaRPr sz="2590"/>
-          </a:p>
-        </p:txBody>
-      </p:sp>
-      <p:grpSp>
-        <p:nvGrpSpPr>
-          <p:cNvPr id="244" name="Google Shape;244;p24"/>
-          <p:cNvGrpSpPr/>
-          <p:nvPr/>
-        </p:nvGrpSpPr>
-        <p:grpSpPr>
-          <a:xfrm>
-            <a:off x="7628652" y="2039426"/>
-            <a:ext cx="2939261" cy="1961851"/>
-            <a:chOff x="8645805" y="2311349"/>
-            <a:chExt cx="3331163" cy="2223431"/>
-          </a:xfrm>
-        </p:grpSpPr>
-        <p:sp>
-          <p:nvSpPr>
-            <p:cNvPr id="245" name="Google Shape;245;p24"/>
-            <p:cNvSpPr/>
-            <p:nvPr/>
-          </p:nvSpPr>
-          <p:spPr>
-            <a:xfrm>
-              <a:off x="9470344" y="2311349"/>
-              <a:ext cx="1466100" cy="523200"/>
-            </a:xfrm>
-            <a:prstGeom prst="rect">
-              <a:avLst/>
-            </a:prstGeom>
-            <a:solidFill>
-              <a:schemeClr val="lt1"/>
-            </a:solidFill>
-            <a:ln w="12700" cap="flat" cmpd="sng">
-              <a:solidFill>
-                <a:srgbClr val="42719B"/>
-              </a:solidFill>
-              <a:prstDash val="solid"/>
-              <a:miter lim="800000"/>
-              <a:headEnd type="none" w="sm" len="sm"/>
-              <a:tailEnd type="none" w="sm" len="sm"/>
-            </a:ln>
-          </p:spPr>
-          <p:txBody>
-            <a:bodyPr spcFirstLastPara="1" wrap="square" lIns="80669" tIns="40324" rIns="80669" bIns="40324" anchor="ctr" anchorCtr="0">
-              <a:noAutofit/>
-            </a:bodyPr>
-            <a:lstStyle/>
-            <a:p>
-              <a:pPr algn="ctr" defTabSz="806867">
-                <a:buClr>
-                  <a:srgbClr val="000000"/>
-                </a:buClr>
-              </a:pPr>
-              <a:r>
-                <a:rPr lang="es-CO" sz="1588" kern="0" dirty="0" err="1">
-                  <a:solidFill>
-                    <a:srgbClr val="C00000"/>
-                  </a:solidFill>
-                  <a:latin typeface="Calibri"/>
-                  <a:ea typeface="Calibri"/>
-                  <a:cs typeface="Calibri"/>
-                  <a:sym typeface="Calibri"/>
-                </a:rPr>
-                <a:t>Album</a:t>
-              </a:r>
-              <a:endParaRPr sz="1588" kern="0" dirty="0">
-                <a:solidFill>
-                  <a:srgbClr val="C00000"/>
-                </a:solidFill>
-                <a:latin typeface="Calibri"/>
-                <a:ea typeface="Calibri"/>
-                <a:cs typeface="Calibri"/>
-                <a:sym typeface="Calibri"/>
-              </a:endParaRPr>
-            </a:p>
-          </p:txBody>
-        </p:sp>
-        <p:sp>
-          <p:nvSpPr>
-            <p:cNvPr id="246" name="Google Shape;246;p24"/>
-            <p:cNvSpPr/>
-            <p:nvPr/>
-          </p:nvSpPr>
-          <p:spPr>
-            <a:xfrm>
-              <a:off x="10510868" y="4011580"/>
-              <a:ext cx="1466100" cy="523200"/>
-            </a:xfrm>
-            <a:prstGeom prst="rect">
-              <a:avLst/>
-            </a:prstGeom>
-            <a:solidFill>
-              <a:schemeClr val="lt1"/>
-            </a:solidFill>
-            <a:ln w="12700" cap="flat" cmpd="sng">
-              <a:solidFill>
-                <a:srgbClr val="42719B"/>
-              </a:solidFill>
-              <a:prstDash val="solid"/>
-              <a:miter lim="800000"/>
-              <a:headEnd type="none" w="sm" len="sm"/>
-              <a:tailEnd type="none" w="sm" len="sm"/>
-            </a:ln>
-          </p:spPr>
-          <p:txBody>
-            <a:bodyPr spcFirstLastPara="1" wrap="square" lIns="80669" tIns="40324" rIns="80669" bIns="40324" anchor="ctr" anchorCtr="0">
-              <a:noAutofit/>
-            </a:bodyPr>
-            <a:lstStyle/>
-            <a:p>
-              <a:pPr algn="ctr" defTabSz="806867">
-                <a:buClr>
-                  <a:srgbClr val="000000"/>
-                </a:buClr>
-              </a:pPr>
-              <a:r>
-                <a:rPr lang="es-ES" sz="1588" kern="0" dirty="0">
-                  <a:solidFill>
-                    <a:srgbClr val="C00000"/>
-                  </a:solidFill>
-                  <a:latin typeface="Calibri"/>
-                  <a:ea typeface="Calibri"/>
-                  <a:cs typeface="Calibri"/>
-                  <a:sym typeface="Calibri"/>
-                </a:rPr>
-                <a:t>Lamina</a:t>
-              </a:r>
-              <a:endParaRPr sz="1588" kern="0" dirty="0">
-                <a:solidFill>
-                  <a:srgbClr val="C00000"/>
-                </a:solidFill>
-                <a:latin typeface="Calibri"/>
-                <a:ea typeface="Calibri"/>
-                <a:cs typeface="Calibri"/>
-                <a:sym typeface="Calibri"/>
-              </a:endParaRPr>
-            </a:p>
-          </p:txBody>
-        </p:sp>
-        <p:sp>
-          <p:nvSpPr>
-            <p:cNvPr id="247" name="Google Shape;247;p24"/>
-            <p:cNvSpPr/>
-            <p:nvPr/>
-          </p:nvSpPr>
-          <p:spPr>
-            <a:xfrm>
-              <a:off x="10069433" y="2834569"/>
-              <a:ext cx="268014" cy="305023"/>
-            </a:xfrm>
-            <a:prstGeom prst="flowChartDecision">
-              <a:avLst/>
-            </a:prstGeom>
-            <a:solidFill>
-              <a:schemeClr val="dk1"/>
-            </a:solidFill>
-            <a:ln w="12700" cap="flat" cmpd="sng">
-              <a:solidFill>
-                <a:srgbClr val="42719B"/>
-              </a:solidFill>
-              <a:prstDash val="solid"/>
-              <a:miter lim="800000"/>
-              <a:headEnd type="none" w="sm" len="sm"/>
-              <a:tailEnd type="none" w="sm" len="sm"/>
-            </a:ln>
-          </p:spPr>
-          <p:txBody>
-            <a:bodyPr spcFirstLastPara="1" wrap="square" lIns="80669" tIns="40324" rIns="80669" bIns="40324" anchor="ctr" anchorCtr="0">
-              <a:noAutofit/>
-            </a:bodyPr>
-            <a:lstStyle/>
-            <a:p>
-              <a:pPr algn="ctr" defTabSz="806867">
-                <a:buClr>
-                  <a:srgbClr val="000000"/>
-                </a:buClr>
-              </a:pPr>
-              <a:endParaRPr sz="1588" kern="0">
-                <a:solidFill>
-                  <a:srgbClr val="FFFFFF"/>
-                </a:solidFill>
-                <a:latin typeface="Calibri"/>
-                <a:ea typeface="Calibri"/>
-                <a:cs typeface="Calibri"/>
-                <a:sym typeface="Calibri"/>
-              </a:endParaRPr>
-            </a:p>
-          </p:txBody>
-        </p:sp>
-        <p:sp>
-          <p:nvSpPr>
-            <p:cNvPr id="248" name="Google Shape;248;p24"/>
-            <p:cNvSpPr/>
-            <p:nvPr/>
-          </p:nvSpPr>
-          <p:spPr>
-            <a:xfrm>
-              <a:off x="8645805" y="4011580"/>
-              <a:ext cx="1466100" cy="523200"/>
-            </a:xfrm>
-            <a:prstGeom prst="rect">
-              <a:avLst/>
-            </a:prstGeom>
-            <a:solidFill>
-              <a:schemeClr val="lt1"/>
-            </a:solidFill>
-            <a:ln w="12700" cap="flat" cmpd="sng">
-              <a:solidFill>
-                <a:srgbClr val="42719B"/>
-              </a:solidFill>
-              <a:prstDash val="solid"/>
-              <a:miter lim="800000"/>
-              <a:headEnd type="none" w="sm" len="sm"/>
-              <a:tailEnd type="none" w="sm" len="sm"/>
-            </a:ln>
-          </p:spPr>
-          <p:txBody>
-            <a:bodyPr spcFirstLastPara="1" wrap="square" lIns="80669" tIns="40324" rIns="80669" bIns="40324" anchor="ctr" anchorCtr="0">
-              <a:noAutofit/>
-            </a:bodyPr>
-            <a:lstStyle/>
-            <a:p>
-              <a:pPr algn="ctr" defTabSz="806867">
-                <a:buClr>
-                  <a:srgbClr val="000000"/>
-                </a:buClr>
-              </a:pPr>
-              <a:r>
-                <a:rPr lang="es-CO" sz="1588" kern="0">
-                  <a:solidFill>
-                    <a:srgbClr val="C00000"/>
-                  </a:solidFill>
-                  <a:latin typeface="Calibri"/>
-                  <a:ea typeface="Calibri"/>
-                  <a:cs typeface="Calibri"/>
-                  <a:sym typeface="Calibri"/>
-                </a:rPr>
-                <a:t>Tapa</a:t>
-              </a:r>
-              <a:endParaRPr sz="1588" kern="0">
-                <a:solidFill>
-                  <a:srgbClr val="C00000"/>
-                </a:solidFill>
-                <a:latin typeface="Calibri"/>
-                <a:ea typeface="Calibri"/>
-                <a:cs typeface="Calibri"/>
-                <a:sym typeface="Calibri"/>
-              </a:endParaRPr>
-            </a:p>
-          </p:txBody>
-        </p:sp>
-        <p:cxnSp>
-          <p:nvCxnSpPr>
-            <p:cNvPr id="249" name="Google Shape;249;p24"/>
-            <p:cNvCxnSpPr>
-              <a:stCxn id="247" idx="2"/>
-              <a:endCxn id="248" idx="0"/>
-            </p:cNvCxnSpPr>
-            <p:nvPr/>
-          </p:nvCxnSpPr>
-          <p:spPr>
-            <a:xfrm rot="5400000">
-              <a:off x="9355040" y="3163292"/>
-              <a:ext cx="872100" cy="824700"/>
-            </a:xfrm>
-            <a:prstGeom prst="bentConnector3">
-              <a:avLst>
-                <a:gd name="adj1" fmla="val 50000"/>
-              </a:avLst>
-            </a:prstGeom>
-            <a:noFill/>
-            <a:ln w="9525" cap="flat" cmpd="sng">
-              <a:solidFill>
-                <a:schemeClr val="accent1"/>
-              </a:solidFill>
-              <a:prstDash val="solid"/>
-              <a:miter lim="800000"/>
-              <a:headEnd type="none" w="sm" len="sm"/>
-              <a:tailEnd type="none" w="sm" len="sm"/>
-            </a:ln>
-          </p:spPr>
-        </p:cxnSp>
-        <p:cxnSp>
-          <p:nvCxnSpPr>
-            <p:cNvPr id="250" name="Google Shape;250;p24"/>
-            <p:cNvCxnSpPr>
-              <a:stCxn id="247" idx="2"/>
-              <a:endCxn id="246" idx="0"/>
-            </p:cNvCxnSpPr>
-            <p:nvPr/>
-          </p:nvCxnSpPr>
-          <p:spPr>
-            <a:xfrm rot="-5400000" flipH="1">
-              <a:off x="10287590" y="3055442"/>
-              <a:ext cx="872100" cy="1040400"/>
-            </a:xfrm>
-            <a:prstGeom prst="bentConnector3">
-              <a:avLst>
-                <a:gd name="adj1" fmla="val 50000"/>
-              </a:avLst>
-            </a:prstGeom>
-            <a:noFill/>
-            <a:ln w="9525" cap="flat" cmpd="sng">
-              <a:solidFill>
-                <a:schemeClr val="accent1"/>
-              </a:solidFill>
-              <a:prstDash val="solid"/>
-              <a:miter lim="800000"/>
-              <a:headEnd type="none" w="sm" len="sm"/>
-              <a:tailEnd type="none" w="sm" len="sm"/>
-            </a:ln>
-          </p:spPr>
-        </p:cxnSp>
-        <p:sp>
-          <p:nvSpPr>
-            <p:cNvPr id="251" name="Google Shape;251;p24"/>
-            <p:cNvSpPr txBox="1"/>
-            <p:nvPr/>
-          </p:nvSpPr>
-          <p:spPr>
-            <a:xfrm>
-              <a:off x="9916510" y="3168865"/>
-              <a:ext cx="301800" cy="369300"/>
-            </a:xfrm>
-            <a:prstGeom prst="rect">
-              <a:avLst/>
-            </a:prstGeom>
-            <a:noFill/>
-            <a:ln>
-              <a:noFill/>
-            </a:ln>
-          </p:spPr>
-          <p:txBody>
-            <a:bodyPr spcFirstLastPara="1" wrap="square" lIns="80669" tIns="40324" rIns="80669" bIns="40324" anchor="t" anchorCtr="0">
-              <a:noAutofit/>
-            </a:bodyPr>
-            <a:lstStyle/>
-            <a:p>
-              <a:pPr defTabSz="806867">
-                <a:buClr>
-                  <a:srgbClr val="000000"/>
-                </a:buClr>
-              </a:pPr>
-              <a:r>
-                <a:rPr lang="es-CO" sz="1588" kern="0">
-                  <a:solidFill>
-                    <a:srgbClr val="000000"/>
-                  </a:solidFill>
-                  <a:latin typeface="Calibri"/>
-                  <a:ea typeface="Calibri"/>
-                  <a:cs typeface="Calibri"/>
-                  <a:sym typeface="Calibri"/>
-                </a:rPr>
-                <a:t>1</a:t>
-              </a:r>
-              <a:endParaRPr sz="1588" kern="0">
-                <a:solidFill>
-                  <a:srgbClr val="000000"/>
-                </a:solidFill>
-                <a:latin typeface="Calibri"/>
-                <a:ea typeface="Calibri"/>
-                <a:cs typeface="Calibri"/>
-                <a:sym typeface="Calibri"/>
-              </a:endParaRPr>
-            </a:p>
-          </p:txBody>
-        </p:sp>
-        <p:sp>
-          <p:nvSpPr>
-            <p:cNvPr id="252" name="Google Shape;252;p24"/>
-            <p:cNvSpPr txBox="1"/>
-            <p:nvPr/>
-          </p:nvSpPr>
-          <p:spPr>
-            <a:xfrm>
-              <a:off x="8954814" y="3531473"/>
-              <a:ext cx="301800" cy="369300"/>
-            </a:xfrm>
-            <a:prstGeom prst="rect">
-              <a:avLst/>
-            </a:prstGeom>
-            <a:noFill/>
-            <a:ln>
-              <a:noFill/>
-            </a:ln>
-          </p:spPr>
-          <p:txBody>
-            <a:bodyPr spcFirstLastPara="1" wrap="square" lIns="80669" tIns="40324" rIns="80669" bIns="40324" anchor="t" anchorCtr="0">
-              <a:noAutofit/>
-            </a:bodyPr>
-            <a:lstStyle/>
-            <a:p>
-              <a:pPr defTabSz="806867">
-                <a:buClr>
-                  <a:srgbClr val="000000"/>
-                </a:buClr>
-              </a:pPr>
-              <a:r>
-                <a:rPr lang="es-CO" sz="1588" kern="0">
-                  <a:solidFill>
-                    <a:srgbClr val="000000"/>
-                  </a:solidFill>
-                  <a:latin typeface="Calibri"/>
-                  <a:ea typeface="Calibri"/>
-                  <a:cs typeface="Calibri"/>
-                  <a:sym typeface="Calibri"/>
-                </a:rPr>
-                <a:t>1</a:t>
-              </a:r>
-              <a:endParaRPr sz="1588" kern="0">
-                <a:solidFill>
-                  <a:srgbClr val="000000"/>
-                </a:solidFill>
-                <a:latin typeface="Calibri"/>
-                <a:ea typeface="Calibri"/>
-                <a:cs typeface="Calibri"/>
-                <a:sym typeface="Calibri"/>
-              </a:endParaRPr>
-            </a:p>
-          </p:txBody>
-        </p:sp>
-        <p:sp>
-          <p:nvSpPr>
-            <p:cNvPr id="253" name="Google Shape;253;p24"/>
-            <p:cNvSpPr txBox="1"/>
-            <p:nvPr/>
-          </p:nvSpPr>
-          <p:spPr>
-            <a:xfrm>
-              <a:off x="11385854" y="3576450"/>
-              <a:ext cx="535800" cy="369300"/>
-            </a:xfrm>
-            <a:prstGeom prst="rect">
-              <a:avLst/>
-            </a:prstGeom>
-            <a:noFill/>
-            <a:ln>
-              <a:noFill/>
-            </a:ln>
-          </p:spPr>
-          <p:txBody>
-            <a:bodyPr spcFirstLastPara="1" wrap="square" lIns="80669" tIns="40324" rIns="80669" bIns="40324" anchor="t" anchorCtr="0">
-              <a:noAutofit/>
-            </a:bodyPr>
-            <a:lstStyle/>
-            <a:p>
-              <a:pPr defTabSz="806867">
-                <a:buClr>
-                  <a:srgbClr val="000000"/>
-                </a:buClr>
-              </a:pPr>
-              <a:r>
-                <a:rPr lang="es-CO" sz="1588" kern="0">
-                  <a:solidFill>
-                    <a:srgbClr val="000000"/>
-                  </a:solidFill>
-                  <a:latin typeface="Calibri"/>
-                  <a:ea typeface="Calibri"/>
-                  <a:cs typeface="Calibri"/>
-                  <a:sym typeface="Calibri"/>
-                </a:rPr>
-                <a:t>670</a:t>
-              </a:r>
-              <a:endParaRPr sz="1588" kern="0">
-                <a:solidFill>
-                  <a:srgbClr val="000000"/>
-                </a:solidFill>
-                <a:latin typeface="Calibri"/>
-                <a:ea typeface="Calibri"/>
-                <a:cs typeface="Calibri"/>
-                <a:sym typeface="Calibri"/>
-              </a:endParaRPr>
-            </a:p>
-          </p:txBody>
-        </p:sp>
-      </p:grpSp>
-    </p:spTree>
-    <p:extLst>
-      <p:ext uri="{BB962C8B-B14F-4D97-AF65-F5344CB8AC3E}">
-        <p14:creationId xmlns:p14="http://schemas.microsoft.com/office/powerpoint/2010/main" val="3187660144"/>
-      </p:ext>
-    </p:extLst>
-  </p:cSld>
-  <p:clrMapOvr>
-    <a:masterClrMapping/>
-  </p:clrMapOvr>
-  <p:timing>
-    <p:tnLst>
-      <p:par>
-        <p:cTn id="1" dur="indefinite" restart="never" nodeType="tmRoot">
-          <p:childTnLst>
-            <p:seq concurrent="1" nextAc="seek">
-              <p:cTn id="2" dur="indefinite" nodeType="mainSeq">
-                <p:childTnLst>
-                  <p:par>
-                    <p:cTn id="3" fill="hold">
-                      <p:stCondLst>
-                        <p:cond delay="indefinite"/>
-                      </p:stCondLst>
-                      <p:childTnLst>
-                        <p:par>
-                          <p:cTn id="4" fill="hold">
-                            <p:stCondLst>
-                              <p:cond delay="0"/>
-                            </p:stCondLst>
-                            <p:childTnLst>
-                              <p:par>
-                                <p:cTn id="5" presetID="1" presetClass="entr" presetSubtype="0" fill="hold" nodeType="clickEffect">
-                                  <p:stCondLst>
-                                    <p:cond delay="0"/>
-                                  </p:stCondLst>
-                                  <p:childTnLst>
-                                    <p:set>
-                                      <p:cBhvr>
-                                        <p:cTn id="6" dur="1" fill="hold">
-                                          <p:stCondLst>
-                                            <p:cond delay="0"/>
-                                          </p:stCondLst>
-                                        </p:cTn>
-                                        <p:tgtEl>
-                                          <p:spTgt spid="244"/>
-                                        </p:tgtEl>
-                                        <p:attrNameLst>
-                                          <p:attrName>style.visibility</p:attrName>
-                                        </p:attrNameLst>
-                                      </p:cBhvr>
-                                      <p:to>
-                                        <p:strVal val="visible"/>
-                                      </p:to>
-                                    </p:set>
-                                  </p:childTnLst>
-                                </p:cTn>
-                              </p:par>
-                            </p:childTnLst>
-                          </p:cTn>
-                        </p:par>
-                      </p:childTnLst>
-                    </p:cTn>
-                  </p:par>
-                </p:childTnLst>
-              </p:cTn>
-              <p:prevCondLst>
-                <p:cond evt="onPrev" delay="0">
-                  <p:tgtEl>
-                    <p:sldTgt/>
-                  </p:tgtEl>
-                </p:cond>
-              </p:prevCondLst>
-              <p:nextCondLst>
-                <p:cond evt="onNext" delay="0">
-                  <p:tgtEl>
-                    <p:sldTgt/>
-                  </p:tgtEl>
-                </p:cond>
-              </p:nextCondLst>
-            </p:seq>
-          </p:childTnLst>
-        </p:cTn>
-      </p:par>
-    </p:tnLst>
-  </p:timing>
-</p:sld>
-</file>
-
-<file path=ppt/slides/slide12.xml><?xml version="1.0" encoding="utf-8"?>
-<p:sld xmlns:a="http://schemas.openxmlformats.org/drawingml/2006/main" xmlns:r="http://schemas.openxmlformats.org/officeDocument/2006/relationships" xmlns:p="http://schemas.openxmlformats.org/presentationml/2006/main">
-  <p:cSld>
-    <p:spTree>
-      <p:nvGrpSpPr>
-        <p:cNvPr id="1" name="Shape 235"/>
-        <p:cNvGrpSpPr/>
-        <p:nvPr/>
-      </p:nvGrpSpPr>
-      <p:grpSpPr>
-        <a:xfrm>
-          <a:off x="0" y="0"/>
-          <a:ext cx="0" cy="0"/>
-          <a:chOff x="0" y="0"/>
-          <a:chExt cx="0" cy="0"/>
-        </a:xfrm>
-      </p:grpSpPr>
-      <p:sp>
-        <p:nvSpPr>
-          <p:cNvPr id="236" name="Google Shape;236;p23"/>
-          <p:cNvSpPr txBox="1">
-            <a:spLocks noGrp="1"/>
-          </p:cNvSpPr>
-          <p:nvPr>
-            <p:ph type="title"/>
-          </p:nvPr>
-        </p:nvSpPr>
-        <p:spPr>
-          <a:xfrm>
-            <a:off x="838200" y="365126"/>
-            <a:ext cx="10515706" cy="1325647"/>
-          </a:xfrm>
-          <a:prstGeom prst="rect">
-            <a:avLst/>
-          </a:prstGeom>
-          <a:noFill/>
-          <a:ln>
-            <a:noFill/>
-          </a:ln>
-        </p:spPr>
-        <p:txBody>
-          <a:bodyPr spcFirstLastPara="1" wrap="square" lIns="80669" tIns="40324" rIns="80669" bIns="40324" anchor="ctr" anchorCtr="0">
-            <a:noAutofit/>
-          </a:bodyPr>
-          <a:lstStyle/>
-          <a:p>
-            <a:r>
-              <a:rPr lang="es-CO" dirty="0"/>
-              <a:t>Ejercicio Todo Partes</a:t>
-            </a:r>
-            <a:endParaRPr dirty="0"/>
-          </a:p>
-        </p:txBody>
-      </p:sp>
-      <p:sp>
-        <p:nvSpPr>
-          <p:cNvPr id="237" name="Google Shape;237;p23"/>
-          <p:cNvSpPr txBox="1">
-            <a:spLocks noGrp="1"/>
-          </p:cNvSpPr>
-          <p:nvPr>
-            <p:ph type="body" idx="1"/>
-          </p:nvPr>
-        </p:nvSpPr>
-        <p:spPr>
-          <a:xfrm>
-            <a:off x="838200" y="1825625"/>
-            <a:ext cx="10515706" cy="4351235"/>
-          </a:xfrm>
-          <a:prstGeom prst="rect">
-            <a:avLst/>
-          </a:prstGeom>
-          <a:noFill/>
-          <a:ln>
-            <a:noFill/>
-          </a:ln>
-        </p:spPr>
-        <p:txBody>
-          <a:bodyPr spcFirstLastPara="1" wrap="square" lIns="80669" tIns="40324" rIns="80669" bIns="40324" anchor="t" anchorCtr="0">
-            <a:noAutofit/>
-          </a:bodyPr>
-          <a:lstStyle/>
-          <a:p>
-            <a:pPr marL="228605" indent="-228605">
-              <a:spcBef>
-                <a:spcPts val="0"/>
-              </a:spcBef>
-            </a:pPr>
-            <a:r>
-              <a:rPr lang="es-CO" dirty="0"/>
-              <a:t>Diseñar el diagrama UML para representar la clase bicicleta. </a:t>
-            </a:r>
-          </a:p>
-          <a:p>
-            <a:pPr marL="228605" indent="-228605">
-              <a:spcBef>
-                <a:spcPts val="0"/>
-              </a:spcBef>
-            </a:pPr>
-            <a:r>
-              <a:rPr lang="es-ES" dirty="0"/>
-              <a:t>La bicicleta es una relación todo partes que deben estar relacionadas para que sea un objeto</a:t>
-            </a:r>
-            <a:endParaRPr lang="es-CO" dirty="0"/>
-          </a:p>
-          <a:p>
-            <a:pPr marL="228605" indent="-228605">
-              <a:spcBef>
-                <a:spcPts val="0"/>
-              </a:spcBef>
-            </a:pPr>
-            <a:r>
-              <a:rPr lang="es-CO" dirty="0"/>
-              <a:t>Realizar una abstracción completa, para ello consulte en internet las características de sus partes.</a:t>
-            </a:r>
-          </a:p>
-          <a:p>
-            <a:pPr marL="228605" indent="-228605">
-              <a:spcBef>
-                <a:spcPts val="0"/>
-              </a:spcBef>
-            </a:pPr>
-            <a:r>
-              <a:rPr lang="es-ES" dirty="0"/>
-              <a:t>Piense en que tiene dos pedales, 1 marco, 2 llantas, cadena, etc…</a:t>
-            </a:r>
-          </a:p>
-          <a:p>
-            <a:pPr marL="0" indent="0">
-              <a:spcBef>
-                <a:spcPts val="0"/>
-              </a:spcBef>
-              <a:buNone/>
-            </a:pPr>
-            <a:endParaRPr dirty="0"/>
-          </a:p>
-          <a:p>
-            <a:pPr marL="0" indent="0">
-              <a:buNone/>
-            </a:pPr>
-            <a:endParaRPr dirty="0"/>
-          </a:p>
-        </p:txBody>
-      </p:sp>
-    </p:spTree>
-    <p:extLst>
-      <p:ext uri="{BB962C8B-B14F-4D97-AF65-F5344CB8AC3E}">
-        <p14:creationId xmlns:p14="http://schemas.microsoft.com/office/powerpoint/2010/main" val="197080040"/>
+        <p14:creationId xmlns:p14="http://schemas.microsoft.com/office/powerpoint/2010/main" val="3641373641"/>
       </p:ext>
     </p:extLst>
   </p:cSld>
@@ -25669,7 +24248,7 @@
   <p:cSld>
     <p:spTree>
       <p:nvGrpSpPr>
-        <p:cNvPr id="1" name="Shape 154"/>
+        <p:cNvPr id="1" name="Shape 220"/>
         <p:cNvGrpSpPr/>
         <p:nvPr/>
       </p:nvGrpSpPr>
@@ -25683,130 +24262,17 @@
       </p:grpSpPr>
       <p:sp>
         <p:nvSpPr>
-          <p:cNvPr id="155" name="Google Shape;155;p18"/>
+          <p:cNvPr id="221" name="Google Shape;221;p22"/>
           <p:cNvSpPr txBox="1">
             <a:spLocks noGrp="1"/>
           </p:cNvSpPr>
           <p:nvPr>
-            <p:ph type="body" idx="1"/>
+            <p:ph type="title"/>
           </p:nvPr>
         </p:nvSpPr>
         <p:spPr>
           <a:xfrm>
-            <a:off x="838200" y="1825625"/>
-            <a:ext cx="9765890" cy="4351235"/>
-          </a:xfrm>
-          <a:prstGeom prst="rect">
-            <a:avLst/>
-          </a:prstGeom>
-          <a:noFill/>
-          <a:ln>
-            <a:noFill/>
-          </a:ln>
-        </p:spPr>
-        <p:txBody>
-          <a:bodyPr spcFirstLastPara="1" wrap="square" lIns="80669" tIns="40324" rIns="80669" bIns="40324" anchor="t" anchorCtr="0">
-            <a:noAutofit/>
-          </a:bodyPr>
-          <a:lstStyle/>
-          <a:p>
-            <a:pPr marL="228605" indent="-228605">
-              <a:spcBef>
-                <a:spcPts val="0"/>
-              </a:spcBef>
-            </a:pPr>
-            <a:r>
-              <a:rPr lang="es-CO" dirty="0"/>
-              <a:t>Defina las relaciones de asociación y representarlas en un diagrama UML de clases, para:</a:t>
-            </a:r>
-            <a:endParaRPr dirty="0"/>
-          </a:p>
-          <a:p>
-            <a:pPr marL="685816" lvl="1" indent="-228605"/>
-            <a:r>
-              <a:rPr lang="es-CO" dirty="0"/>
-              <a:t>Libros -  Autores</a:t>
-            </a:r>
-            <a:endParaRPr dirty="0"/>
-          </a:p>
-          <a:p>
-            <a:pPr marL="685816" lvl="1" indent="-228605"/>
-            <a:r>
-              <a:rPr lang="es-CO" dirty="0"/>
-              <a:t>Películas – Actores</a:t>
-            </a:r>
-            <a:endParaRPr dirty="0"/>
-          </a:p>
-          <a:p>
-            <a:pPr marL="685816" lvl="1" indent="-228605"/>
-            <a:r>
-              <a:rPr lang="es-CO" dirty="0"/>
-              <a:t>Películas – Director</a:t>
-            </a:r>
-            <a:endParaRPr dirty="0"/>
-          </a:p>
-          <a:p>
-            <a:pPr marL="685816" lvl="1" indent="-228605"/>
-            <a:r>
-              <a:rPr lang="es-CO" dirty="0"/>
-              <a:t>Revistas  - Artículos</a:t>
-            </a:r>
-            <a:endParaRPr dirty="0"/>
-          </a:p>
-          <a:p>
-            <a:pPr marL="685816" lvl="1" indent="-228605"/>
-            <a:r>
-              <a:rPr lang="es-CO" dirty="0"/>
-              <a:t>Biblioteca – Libros</a:t>
-            </a:r>
-            <a:endParaRPr dirty="0"/>
-          </a:p>
-          <a:p>
-            <a:pPr marL="685816" lvl="1" indent="-228605"/>
-            <a:r>
-              <a:rPr lang="es-CO" dirty="0"/>
-              <a:t>Biblioteca – </a:t>
-            </a:r>
-            <a:r>
-              <a:rPr lang="es-CO" dirty="0" err="1"/>
-              <a:t>DVDs</a:t>
-            </a:r>
-            <a:endParaRPr dirty="0"/>
-          </a:p>
-          <a:p>
-            <a:pPr marL="685816" lvl="1" indent="-228605"/>
-            <a:r>
-              <a:rPr lang="es-CO" dirty="0"/>
-              <a:t>Biblioteca – Revistas</a:t>
-            </a:r>
-          </a:p>
-          <a:p>
-            <a:pPr marL="685816" lvl="1" indent="-228605"/>
-            <a:r>
-              <a:rPr lang="es-CO" dirty="0" err="1"/>
-              <a:t>DVDs</a:t>
-            </a:r>
-            <a:r>
-              <a:rPr lang="es-CO" dirty="0"/>
-              <a:t> - </a:t>
-            </a:r>
-            <a:r>
-              <a:rPr lang="es-CO" dirty="0" err="1"/>
-              <a:t>PelÍculas</a:t>
-            </a:r>
-            <a:endParaRPr dirty="0"/>
-          </a:p>
-        </p:txBody>
-      </p:sp>
-      <p:sp>
-        <p:nvSpPr>
-          <p:cNvPr id="156" name="Google Shape;156;p18"/>
-          <p:cNvSpPr txBox="1"/>
-          <p:nvPr/>
-        </p:nvSpPr>
-        <p:spPr>
-          <a:xfrm>
-            <a:off x="972671" y="499596"/>
+            <a:off x="838200" y="365126"/>
             <a:ext cx="10515706" cy="1325647"/>
           </a:xfrm>
           <a:prstGeom prst="rect">
@@ -25823,49 +24289,602 @@
           </a:bodyPr>
           <a:lstStyle/>
           <a:p>
-            <a:pPr defTabSz="806867">
-              <a:lnSpc>
-                <a:spcPct val="90000"/>
-              </a:lnSpc>
-              <a:buClr>
-                <a:srgbClr val="000000"/>
-              </a:buClr>
-              <a:buSzPts val="4987"/>
+            <a:r>
+              <a:rPr lang="es-CO" dirty="0"/>
+              <a:t>Todo Partes Agregación</a:t>
+            </a:r>
+            <a:endParaRPr dirty="0"/>
+          </a:p>
+        </p:txBody>
+      </p:sp>
+      <p:sp>
+        <p:nvSpPr>
+          <p:cNvPr id="222" name="Google Shape;222;p22"/>
+          <p:cNvSpPr txBox="1">
+            <a:spLocks noGrp="1"/>
+          </p:cNvSpPr>
+          <p:nvPr>
+            <p:ph type="body" idx="1"/>
+          </p:nvPr>
+        </p:nvSpPr>
+        <p:spPr>
+          <a:xfrm>
+            <a:off x="838200" y="1825625"/>
+            <a:ext cx="4962706" cy="4351235"/>
+          </a:xfrm>
+          <a:prstGeom prst="rect">
+            <a:avLst/>
+          </a:prstGeom>
+          <a:noFill/>
+          <a:ln>
+            <a:noFill/>
+          </a:ln>
+        </p:spPr>
+        <p:txBody>
+          <a:bodyPr spcFirstLastPara="1" wrap="square" lIns="80669" tIns="40324" rIns="80669" bIns="40324" anchor="t" anchorCtr="0">
+            <a:noAutofit/>
+          </a:bodyPr>
+          <a:lstStyle/>
+          <a:p>
+            <a:pPr marL="228605" indent="-228605">
+              <a:spcBef>
+                <a:spcPts val="0"/>
+              </a:spcBef>
+              <a:buSzPts val="2400"/>
             </a:pPr>
             <a:r>
-              <a:rPr lang="es-CO" sz="4401" kern="0">
-                <a:solidFill>
-                  <a:srgbClr val="000000"/>
-                </a:solidFill>
-                <a:latin typeface="Calibri"/>
-                <a:ea typeface="Calibri"/>
-                <a:cs typeface="Calibri"/>
-                <a:sym typeface="Calibri"/>
-              </a:rPr>
-              <a:t>Relaciones de asociación</a:t>
+              <a:rPr lang="es-CO" sz="2118"/>
+              <a:t>Acomplamiento más fuerte entre clases que la asociación</a:t>
             </a:r>
-            <a:endParaRPr sz="4401" kern="0">
-              <a:solidFill>
-                <a:srgbClr val="000000"/>
-              </a:solidFill>
-              <a:latin typeface="Calibri"/>
-              <a:ea typeface="Calibri"/>
-              <a:cs typeface="Calibri"/>
-              <a:sym typeface="Calibri"/>
-            </a:endParaRPr>
+            <a:endParaRPr sz="2118"/>
+          </a:p>
+          <a:p>
+            <a:pPr marL="228605" indent="-228605">
+              <a:buSzPts val="2400"/>
+            </a:pPr>
+            <a:r>
+              <a:rPr lang="es-CO" sz="2118"/>
+              <a:t>Una de las clases representa el TODO y las demás las PARTES</a:t>
+            </a:r>
+            <a:endParaRPr/>
+          </a:p>
+          <a:p>
+            <a:pPr marL="228605" indent="-228605">
+              <a:buSzPts val="2400"/>
+            </a:pPr>
+            <a:r>
+              <a:rPr lang="es-CO" sz="2118"/>
+              <a:t>Un objeto será representado por el TODO + las Partes</a:t>
+            </a:r>
+            <a:endParaRPr sz="2118"/>
+          </a:p>
+          <a:p>
+            <a:pPr marL="228605" indent="-228605">
+              <a:buSzPts val="2400"/>
+            </a:pPr>
+            <a:r>
+              <a:rPr lang="es-CO" sz="2118"/>
+              <a:t>Se puede entender la agregación como una serie de clases que aparecen como atributos de otras clases</a:t>
+            </a:r>
+            <a:endParaRPr sz="2118"/>
+          </a:p>
+          <a:p>
+            <a:pPr marL="228605" indent="-228605">
+              <a:buSzPts val="2400"/>
+            </a:pPr>
+            <a:r>
+              <a:rPr lang="es-CO" sz="2118"/>
+              <a:t>El rombo en blanco está en la clase propietaria o el todo</a:t>
+            </a:r>
+            <a:endParaRPr sz="2118"/>
+          </a:p>
+          <a:p>
+            <a:pPr marL="228605" indent="-94127">
+              <a:buSzPts val="2400"/>
+              <a:buNone/>
+            </a:pPr>
+            <a:endParaRPr sz="2118"/>
+          </a:p>
+          <a:p>
+            <a:pPr marL="228605" indent="-94127">
+              <a:buSzPts val="2400"/>
+              <a:buNone/>
+            </a:pPr>
+            <a:endParaRPr sz="2118"/>
           </a:p>
         </p:txBody>
       </p:sp>
+      <p:grpSp>
+        <p:nvGrpSpPr>
+          <p:cNvPr id="223" name="Google Shape;223;p22"/>
+          <p:cNvGrpSpPr/>
+          <p:nvPr/>
+        </p:nvGrpSpPr>
+        <p:grpSpPr>
+          <a:xfrm>
+            <a:off x="6704130" y="2540213"/>
+            <a:ext cx="4649588" cy="1761799"/>
+            <a:chOff x="7598014" y="2878908"/>
+            <a:chExt cx="5269533" cy="1996706"/>
+          </a:xfrm>
+        </p:grpSpPr>
+        <p:sp>
+          <p:nvSpPr>
+            <p:cNvPr id="224" name="Google Shape;224;p22"/>
+            <p:cNvSpPr/>
+            <p:nvPr/>
+          </p:nvSpPr>
+          <p:spPr>
+            <a:xfrm>
+              <a:off x="9541117" y="2878908"/>
+              <a:ext cx="1466100" cy="523200"/>
+            </a:xfrm>
+            <a:prstGeom prst="rect">
+              <a:avLst/>
+            </a:prstGeom>
+            <a:solidFill>
+              <a:schemeClr val="lt1"/>
+            </a:solidFill>
+            <a:ln w="12700" cap="flat" cmpd="sng">
+              <a:solidFill>
+                <a:srgbClr val="42719B"/>
+              </a:solidFill>
+              <a:prstDash val="solid"/>
+              <a:miter lim="800000"/>
+              <a:headEnd type="none" w="sm" len="sm"/>
+              <a:tailEnd type="none" w="sm" len="sm"/>
+            </a:ln>
+          </p:spPr>
+          <p:txBody>
+            <a:bodyPr spcFirstLastPara="1" wrap="square" lIns="80669" tIns="40324" rIns="80669" bIns="40324" anchor="ctr" anchorCtr="0">
+              <a:noAutofit/>
+            </a:bodyPr>
+            <a:lstStyle/>
+            <a:p>
+              <a:pPr algn="ctr" defTabSz="806867">
+                <a:buClr>
+                  <a:srgbClr val="000000"/>
+                </a:buClr>
+              </a:pPr>
+              <a:r>
+                <a:rPr lang="es-CO" sz="1588" kern="0">
+                  <a:solidFill>
+                    <a:srgbClr val="C00000"/>
+                  </a:solidFill>
+                  <a:latin typeface="Calibri"/>
+                  <a:ea typeface="Calibri"/>
+                  <a:cs typeface="Calibri"/>
+                  <a:sym typeface="Calibri"/>
+                </a:rPr>
+                <a:t>Clase TODO</a:t>
+              </a:r>
+              <a:endParaRPr sz="1588" kern="0">
+                <a:solidFill>
+                  <a:srgbClr val="C00000"/>
+                </a:solidFill>
+                <a:latin typeface="Calibri"/>
+                <a:ea typeface="Calibri"/>
+                <a:cs typeface="Calibri"/>
+                <a:sym typeface="Calibri"/>
+              </a:endParaRPr>
+            </a:p>
+          </p:txBody>
+        </p:sp>
+        <p:sp>
+          <p:nvSpPr>
+            <p:cNvPr id="225" name="Google Shape;225;p22"/>
+            <p:cNvSpPr/>
+            <p:nvPr/>
+          </p:nvSpPr>
+          <p:spPr>
+            <a:xfrm>
+              <a:off x="11401447" y="4352414"/>
+              <a:ext cx="1466100" cy="523200"/>
+            </a:xfrm>
+            <a:prstGeom prst="rect">
+              <a:avLst/>
+            </a:prstGeom>
+            <a:solidFill>
+              <a:schemeClr val="lt1"/>
+            </a:solidFill>
+            <a:ln w="12700" cap="flat" cmpd="sng">
+              <a:solidFill>
+                <a:srgbClr val="42719B"/>
+              </a:solidFill>
+              <a:prstDash val="solid"/>
+              <a:miter lim="800000"/>
+              <a:headEnd type="none" w="sm" len="sm"/>
+              <a:tailEnd type="none" w="sm" len="sm"/>
+            </a:ln>
+          </p:spPr>
+          <p:txBody>
+            <a:bodyPr spcFirstLastPara="1" wrap="square" lIns="80669" tIns="40324" rIns="80669" bIns="40324" anchor="ctr" anchorCtr="0">
+              <a:noAutofit/>
+            </a:bodyPr>
+            <a:lstStyle/>
+            <a:p>
+              <a:pPr algn="ctr" defTabSz="806867">
+                <a:buClr>
+                  <a:srgbClr val="000000"/>
+                </a:buClr>
+              </a:pPr>
+              <a:r>
+                <a:rPr lang="es-CO" sz="1588" kern="0">
+                  <a:solidFill>
+                    <a:srgbClr val="C00000"/>
+                  </a:solidFill>
+                  <a:latin typeface="Calibri"/>
+                  <a:ea typeface="Calibri"/>
+                  <a:cs typeface="Calibri"/>
+                  <a:sym typeface="Calibri"/>
+                </a:rPr>
+                <a:t>Clase Parte</a:t>
+              </a:r>
+              <a:endParaRPr sz="1588" kern="0">
+                <a:solidFill>
+                  <a:srgbClr val="C00000"/>
+                </a:solidFill>
+                <a:latin typeface="Calibri"/>
+                <a:ea typeface="Calibri"/>
+                <a:cs typeface="Calibri"/>
+                <a:sym typeface="Calibri"/>
+              </a:endParaRPr>
+            </a:p>
+          </p:txBody>
+        </p:sp>
+        <p:sp>
+          <p:nvSpPr>
+            <p:cNvPr id="226" name="Google Shape;226;p22"/>
+            <p:cNvSpPr/>
+            <p:nvPr/>
+          </p:nvSpPr>
+          <p:spPr>
+            <a:xfrm>
+              <a:off x="10140206" y="3402128"/>
+              <a:ext cx="268014" cy="305023"/>
+            </a:xfrm>
+            <a:prstGeom prst="flowChartDecision">
+              <a:avLst/>
+            </a:prstGeom>
+            <a:solidFill>
+              <a:schemeClr val="lt1"/>
+            </a:solidFill>
+            <a:ln w="12700" cap="flat" cmpd="sng">
+              <a:solidFill>
+                <a:srgbClr val="42719B"/>
+              </a:solidFill>
+              <a:prstDash val="solid"/>
+              <a:miter lim="800000"/>
+              <a:headEnd type="none" w="sm" len="sm"/>
+              <a:tailEnd type="none" w="sm" len="sm"/>
+            </a:ln>
+          </p:spPr>
+          <p:txBody>
+            <a:bodyPr spcFirstLastPara="1" wrap="square" lIns="80669" tIns="40324" rIns="80669" bIns="40324" anchor="ctr" anchorCtr="0">
+              <a:noAutofit/>
+            </a:bodyPr>
+            <a:lstStyle/>
+            <a:p>
+              <a:pPr algn="ctr" defTabSz="806867">
+                <a:buClr>
+                  <a:srgbClr val="000000"/>
+                </a:buClr>
+              </a:pPr>
+              <a:endParaRPr sz="1588" kern="0">
+                <a:solidFill>
+                  <a:srgbClr val="FFFFFF"/>
+                </a:solidFill>
+                <a:latin typeface="Calibri"/>
+                <a:ea typeface="Calibri"/>
+                <a:cs typeface="Calibri"/>
+                <a:sym typeface="Calibri"/>
+              </a:endParaRPr>
+            </a:p>
+          </p:txBody>
+        </p:sp>
+        <p:cxnSp>
+          <p:nvCxnSpPr>
+            <p:cNvPr id="227" name="Google Shape;227;p22"/>
+            <p:cNvCxnSpPr>
+              <a:stCxn id="226" idx="2"/>
+              <a:endCxn id="225" idx="0"/>
+            </p:cNvCxnSpPr>
+            <p:nvPr/>
+          </p:nvCxnSpPr>
+          <p:spPr>
+            <a:xfrm rot="-5400000" flipH="1">
+              <a:off x="10881713" y="3099651"/>
+              <a:ext cx="645300" cy="1860300"/>
+            </a:xfrm>
+            <a:prstGeom prst="bentConnector3">
+              <a:avLst>
+                <a:gd name="adj1" fmla="val 50000"/>
+              </a:avLst>
+            </a:prstGeom>
+            <a:noFill/>
+            <a:ln w="9525" cap="flat" cmpd="sng">
+              <a:solidFill>
+                <a:schemeClr val="accent1"/>
+              </a:solidFill>
+              <a:prstDash val="solid"/>
+              <a:miter lim="800000"/>
+              <a:headEnd type="none" w="sm" len="sm"/>
+              <a:tailEnd type="none" w="sm" len="sm"/>
+            </a:ln>
+          </p:spPr>
+        </p:cxnSp>
+        <p:sp>
+          <p:nvSpPr>
+            <p:cNvPr id="228" name="Google Shape;228;p22"/>
+            <p:cNvSpPr/>
+            <p:nvPr/>
+          </p:nvSpPr>
+          <p:spPr>
+            <a:xfrm>
+              <a:off x="9548993" y="4352413"/>
+              <a:ext cx="1466100" cy="523200"/>
+            </a:xfrm>
+            <a:prstGeom prst="rect">
+              <a:avLst/>
+            </a:prstGeom>
+            <a:solidFill>
+              <a:schemeClr val="lt1"/>
+            </a:solidFill>
+            <a:ln w="12700" cap="flat" cmpd="sng">
+              <a:solidFill>
+                <a:srgbClr val="42719B"/>
+              </a:solidFill>
+              <a:prstDash val="solid"/>
+              <a:miter lim="800000"/>
+              <a:headEnd type="none" w="sm" len="sm"/>
+              <a:tailEnd type="none" w="sm" len="sm"/>
+            </a:ln>
+          </p:spPr>
+          <p:txBody>
+            <a:bodyPr spcFirstLastPara="1" wrap="square" lIns="80669" tIns="40324" rIns="80669" bIns="40324" anchor="ctr" anchorCtr="0">
+              <a:noAutofit/>
+            </a:bodyPr>
+            <a:lstStyle/>
+            <a:p>
+              <a:pPr algn="ctr" defTabSz="806867">
+                <a:buClr>
+                  <a:srgbClr val="000000"/>
+                </a:buClr>
+              </a:pPr>
+              <a:r>
+                <a:rPr lang="es-CO" sz="1588" kern="0">
+                  <a:solidFill>
+                    <a:srgbClr val="C00000"/>
+                  </a:solidFill>
+                  <a:latin typeface="Calibri"/>
+                  <a:ea typeface="Calibri"/>
+                  <a:cs typeface="Calibri"/>
+                  <a:sym typeface="Calibri"/>
+                </a:rPr>
+                <a:t>Clase Parte</a:t>
+              </a:r>
+              <a:endParaRPr sz="1588" kern="0">
+                <a:solidFill>
+                  <a:srgbClr val="C00000"/>
+                </a:solidFill>
+                <a:latin typeface="Calibri"/>
+                <a:ea typeface="Calibri"/>
+                <a:cs typeface="Calibri"/>
+                <a:sym typeface="Calibri"/>
+              </a:endParaRPr>
+            </a:p>
+          </p:txBody>
+        </p:sp>
+        <p:sp>
+          <p:nvSpPr>
+            <p:cNvPr id="229" name="Google Shape;229;p22"/>
+            <p:cNvSpPr/>
+            <p:nvPr/>
+          </p:nvSpPr>
+          <p:spPr>
+            <a:xfrm>
+              <a:off x="7598014" y="4352413"/>
+              <a:ext cx="1466100" cy="523200"/>
+            </a:xfrm>
+            <a:prstGeom prst="rect">
+              <a:avLst/>
+            </a:prstGeom>
+            <a:solidFill>
+              <a:schemeClr val="lt1"/>
+            </a:solidFill>
+            <a:ln w="12700" cap="flat" cmpd="sng">
+              <a:solidFill>
+                <a:srgbClr val="42719B"/>
+              </a:solidFill>
+              <a:prstDash val="solid"/>
+              <a:miter lim="800000"/>
+              <a:headEnd type="none" w="sm" len="sm"/>
+              <a:tailEnd type="none" w="sm" len="sm"/>
+            </a:ln>
+          </p:spPr>
+          <p:txBody>
+            <a:bodyPr spcFirstLastPara="1" wrap="square" lIns="80669" tIns="40324" rIns="80669" bIns="40324" anchor="ctr" anchorCtr="0">
+              <a:noAutofit/>
+            </a:bodyPr>
+            <a:lstStyle/>
+            <a:p>
+              <a:pPr algn="ctr" defTabSz="806867">
+                <a:buClr>
+                  <a:srgbClr val="000000"/>
+                </a:buClr>
+              </a:pPr>
+              <a:r>
+                <a:rPr lang="es-CO" sz="1588" kern="0">
+                  <a:solidFill>
+                    <a:srgbClr val="C00000"/>
+                  </a:solidFill>
+                  <a:latin typeface="Calibri"/>
+                  <a:ea typeface="Calibri"/>
+                  <a:cs typeface="Calibri"/>
+                  <a:sym typeface="Calibri"/>
+                </a:rPr>
+                <a:t>Clase Parte</a:t>
+              </a:r>
+              <a:endParaRPr sz="1588" kern="0">
+                <a:solidFill>
+                  <a:srgbClr val="C00000"/>
+                </a:solidFill>
+                <a:latin typeface="Calibri"/>
+                <a:ea typeface="Calibri"/>
+                <a:cs typeface="Calibri"/>
+                <a:sym typeface="Calibri"/>
+              </a:endParaRPr>
+            </a:p>
+          </p:txBody>
+        </p:sp>
+        <p:cxnSp>
+          <p:nvCxnSpPr>
+            <p:cNvPr id="230" name="Google Shape;230;p22"/>
+            <p:cNvCxnSpPr>
+              <a:stCxn id="229" idx="0"/>
+              <a:endCxn id="226" idx="2"/>
+            </p:cNvCxnSpPr>
+            <p:nvPr/>
+          </p:nvCxnSpPr>
+          <p:spPr>
+            <a:xfrm rot="-5400000">
+              <a:off x="8979964" y="3058213"/>
+              <a:ext cx="645300" cy="1943100"/>
+            </a:xfrm>
+            <a:prstGeom prst="bentConnector3">
+              <a:avLst>
+                <a:gd name="adj1" fmla="val 50000"/>
+              </a:avLst>
+            </a:prstGeom>
+            <a:noFill/>
+            <a:ln w="9525" cap="flat" cmpd="sng">
+              <a:solidFill>
+                <a:schemeClr val="accent1"/>
+              </a:solidFill>
+              <a:prstDash val="solid"/>
+              <a:miter lim="800000"/>
+              <a:headEnd type="none" w="sm" len="sm"/>
+              <a:tailEnd type="none" w="sm" len="sm"/>
+            </a:ln>
+          </p:spPr>
+        </p:cxnSp>
+        <p:cxnSp>
+          <p:nvCxnSpPr>
+            <p:cNvPr id="231" name="Google Shape;231;p22"/>
+            <p:cNvCxnSpPr>
+              <a:stCxn id="228" idx="0"/>
+              <a:endCxn id="226" idx="2"/>
+            </p:cNvCxnSpPr>
+            <p:nvPr/>
+          </p:nvCxnSpPr>
+          <p:spPr>
+            <a:xfrm rot="5400000" flipH="1">
+              <a:off x="9955493" y="4025863"/>
+              <a:ext cx="645300" cy="7800"/>
+            </a:xfrm>
+            <a:prstGeom prst="bentConnector3">
+              <a:avLst>
+                <a:gd name="adj1" fmla="val 50000"/>
+              </a:avLst>
+            </a:prstGeom>
+            <a:noFill/>
+            <a:ln w="9525" cap="flat" cmpd="sng">
+              <a:solidFill>
+                <a:schemeClr val="accent1"/>
+              </a:solidFill>
+              <a:prstDash val="solid"/>
+              <a:miter lim="800000"/>
+              <a:headEnd type="none" w="sm" len="sm"/>
+              <a:tailEnd type="none" w="sm" len="sm"/>
+            </a:ln>
+          </p:spPr>
+        </p:cxnSp>
+      </p:grpSp>
     </p:spTree>
     <p:extLst>
       <p:ext uri="{BB962C8B-B14F-4D97-AF65-F5344CB8AC3E}">
-        <p14:creationId xmlns:p14="http://schemas.microsoft.com/office/powerpoint/2010/main" val="2597893151"/>
+        <p14:creationId xmlns:p14="http://schemas.microsoft.com/office/powerpoint/2010/main" val="422580424"/>
       </p:ext>
     </p:extLst>
   </p:cSld>
   <p:clrMapOvr>
     <a:masterClrMapping/>
   </p:clrMapOvr>
+  <p:timing>
+    <p:tnLst>
+      <p:par>
+        <p:cTn id="1" dur="indefinite" restart="never" nodeType="tmRoot">
+          <p:childTnLst>
+            <p:seq concurrent="1" nextAc="seek">
+              <p:cTn id="2" dur="indefinite" nodeType="mainSeq">
+                <p:childTnLst>
+                  <p:par>
+                    <p:cTn id="3" fill="hold">
+                      <p:stCondLst>
+                        <p:cond delay="indefinite"/>
+                      </p:stCondLst>
+                      <p:childTnLst>
+                        <p:par>
+                          <p:cTn id="4" fill="hold">
+                            <p:stCondLst>
+                              <p:cond delay="0"/>
+                            </p:stCondLst>
+                            <p:childTnLst>
+                              <p:par>
+                                <p:cTn id="5" presetID="1" presetClass="entr" presetSubtype="0" fill="hold" nodeType="clickEffect">
+                                  <p:stCondLst>
+                                    <p:cond delay="0"/>
+                                  </p:stCondLst>
+                                  <p:childTnLst>
+                                    <p:set>
+                                      <p:cBhvr>
+                                        <p:cTn id="6" dur="1" fill="hold">
+                                          <p:stCondLst>
+                                            <p:cond delay="0"/>
+                                          </p:stCondLst>
+                                        </p:cTn>
+                                        <p:tgtEl>
+                                          <p:spTgt spid="223"/>
+                                        </p:tgtEl>
+                                        <p:attrNameLst>
+                                          <p:attrName>style.visibility</p:attrName>
+                                        </p:attrNameLst>
+                                      </p:cBhvr>
+                                      <p:to>
+                                        <p:strVal val="visible"/>
+                                      </p:to>
+                                    </p:set>
+                                  </p:childTnLst>
+                                </p:cTn>
+                              </p:par>
+                            </p:childTnLst>
+                          </p:cTn>
+                        </p:par>
+                      </p:childTnLst>
+                    </p:cTn>
+                  </p:par>
+                </p:childTnLst>
+              </p:cTn>
+              <p:prevCondLst>
+                <p:cond evt="onPrev" delay="0">
+                  <p:tgtEl>
+                    <p:sldTgt/>
+                  </p:tgtEl>
+                </p:cond>
+              </p:prevCondLst>
+              <p:nextCondLst>
+                <p:cond evt="onNext" delay="0">
+                  <p:tgtEl>
+                    <p:sldTgt/>
+                  </p:tgtEl>
+                </p:cond>
+              </p:nextCondLst>
+            </p:seq>
+          </p:childTnLst>
+        </p:cTn>
+      </p:par>
+    </p:tnLst>
+  </p:timing>
 </p:sld>
 </file>
 
@@ -25874,7 +24893,7 @@
   <p:cSld>
     <p:spTree>
       <p:nvGrpSpPr>
-        <p:cNvPr id="1" name=""/>
+        <p:cNvPr id="1" name="Shape 241"/>
         <p:cNvGrpSpPr/>
         <p:nvPr/>
       </p:nvGrpSpPr>
@@ -25888,31 +24907,45 @@
       </p:grpSpPr>
       <p:sp>
         <p:nvSpPr>
-          <p:cNvPr id="2" name="Título 1"/>
-          <p:cNvSpPr>
+          <p:cNvPr id="242" name="Google Shape;242;p24"/>
+          <p:cNvSpPr txBox="1">
             <a:spLocks noGrp="1"/>
           </p:cNvSpPr>
           <p:nvPr>
             <p:ph type="title"/>
           </p:nvPr>
         </p:nvSpPr>
-        <p:spPr/>
+        <p:spPr>
+          <a:xfrm>
+            <a:off x="838200" y="365126"/>
+            <a:ext cx="10515706" cy="1325647"/>
+          </a:xfrm>
+          <a:prstGeom prst="rect">
+            <a:avLst/>
+          </a:prstGeom>
+          <a:noFill/>
+          <a:ln>
+            <a:noFill/>
+          </a:ln>
+        </p:spPr>
         <p:txBody>
-          <a:bodyPr/>
+          <a:bodyPr spcFirstLastPara="1" wrap="square" lIns="80669" tIns="40324" rIns="80669" bIns="40324" anchor="ctr" anchorCtr="0">
+            <a:noAutofit/>
+          </a:bodyPr>
           <a:lstStyle/>
           <a:p>
             <a:r>
-              <a:rPr lang="es-ES" dirty="0"/>
-              <a:t>Ejercicio Asociación Completo</a:t>
+              <a:rPr lang="es-CO" dirty="0"/>
+              <a:t>Todo Partes Composición</a:t>
             </a:r>
-            <a:endParaRPr lang="es-CO" dirty="0"/>
+            <a:endParaRPr dirty="0"/>
           </a:p>
         </p:txBody>
       </p:sp>
       <p:sp>
         <p:nvSpPr>
-          <p:cNvPr id="3" name="Marcador de texto 2"/>
-          <p:cNvSpPr>
+          <p:cNvPr id="243" name="Google Shape;243;p24"/>
+          <p:cNvSpPr txBox="1">
             <a:spLocks noGrp="1"/>
           </p:cNvSpPr>
           <p:nvPr>
@@ -25921,74 +24954,647 @@
         </p:nvSpPr>
         <p:spPr>
           <a:xfrm>
-            <a:off x="838200" y="1557913"/>
-            <a:ext cx="6005052" cy="4351338"/>
-          </a:xfrm>
-        </p:spPr>
-        <p:txBody>
-          <a:bodyPr/>
-          <a:lstStyle/>
-          <a:p>
-            <a:r>
-              <a:rPr lang="es-ES" sz="2000" dirty="0"/>
-              <a:t>Se tiene un parque de diversiones donde hay 10 atracciones y 3 taquillas. La persona cuando va a ingresar adquiere una manilla que carga con dinero. La carga mínima son $20,000. De la carga siempre le descuentan 4.000 del ingreso y el dinero restante los convierten en 1 punto por cada $500. </a:t>
-            </a:r>
-          </a:p>
-          <a:p>
-            <a:r>
-              <a:rPr lang="es-ES" sz="2000" dirty="0"/>
-              <a:t>Cada atracción tiene el nombre y unos puntos para ingresar que se descuentan en la manilla de cada persona.  </a:t>
-            </a:r>
-          </a:p>
-          <a:p>
-            <a:r>
-              <a:rPr lang="es-ES" sz="2000" dirty="0"/>
-              <a:t>La manilla tiene un id interno y el saldo en puntos. </a:t>
-            </a:r>
-          </a:p>
-          <a:p>
-            <a:r>
-              <a:rPr lang="es-ES" sz="2000" dirty="0"/>
-              <a:t>La taquilla tiene un  id interno y el saldo en dinero que va recogiendo y el saldo de las manillas que va entregando. Cada taquilla comienza con un saldo de $0 en dinero y 100 manillas. </a:t>
-            </a:r>
-            <a:endParaRPr lang="es-CO" sz="2000" dirty="0"/>
-          </a:p>
-        </p:txBody>
-      </p:sp>
-      <p:pic>
-        <p:nvPicPr>
-          <p:cNvPr id="4" name="Imagen 3"/>
-          <p:cNvPicPr>
-            <a:picLocks noChangeAspect="1"/>
-          </p:cNvPicPr>
-          <p:nvPr/>
-        </p:nvPicPr>
-        <p:blipFill>
-          <a:blip r:embed="rId2"/>
-          <a:stretch>
-            <a:fillRect/>
-          </a:stretch>
-        </p:blipFill>
-        <p:spPr>
-          <a:xfrm>
-            <a:off x="7289967" y="2378971"/>
-            <a:ext cx="4063833" cy="2709222"/>
+            <a:off x="838200" y="1825625"/>
+            <a:ext cx="5574706" cy="4351235"/>
           </a:xfrm>
           <a:prstGeom prst="rect">
             <a:avLst/>
           </a:prstGeom>
+          <a:noFill/>
+          <a:ln>
+            <a:noFill/>
+          </a:ln>
         </p:spPr>
-      </p:pic>
+        <p:txBody>
+          <a:bodyPr spcFirstLastPara="1" wrap="square" lIns="80669" tIns="40324" rIns="80669" bIns="40324" anchor="t" anchorCtr="0">
+            <a:noAutofit/>
+          </a:bodyPr>
+          <a:lstStyle/>
+          <a:p>
+            <a:pPr marL="228605" indent="-228605">
+              <a:spcBef>
+                <a:spcPts val="0"/>
+              </a:spcBef>
+              <a:buSzPts val="2935"/>
+            </a:pPr>
+            <a:r>
+              <a:rPr lang="es-CO" sz="2590"/>
+              <a:t>Tipo especial de agregación</a:t>
+            </a:r>
+            <a:endParaRPr sz="2590"/>
+          </a:p>
+          <a:p>
+            <a:pPr marL="228605" indent="-228605">
+              <a:buSzPts val="2935"/>
+            </a:pPr>
+            <a:r>
+              <a:rPr lang="es-CO" sz="2590"/>
+              <a:t>Supone algunas restricciones</a:t>
+            </a:r>
+            <a:endParaRPr/>
+          </a:p>
+          <a:p>
+            <a:pPr marL="228605" indent="-228605">
+              <a:buSzPts val="2935"/>
+            </a:pPr>
+            <a:r>
+              <a:rPr lang="es-CO" sz="2590"/>
+              <a:t>Cada componente pertenece a un solo todo. Los componentes no tienen sentido fuera del objeto resultante</a:t>
+            </a:r>
+            <a:endParaRPr/>
+          </a:p>
+          <a:p>
+            <a:pPr marL="228605" indent="-228605">
+              <a:buSzPts val="2935"/>
+            </a:pPr>
+            <a:r>
+              <a:rPr lang="es-CO" sz="2590"/>
+              <a:t>Si el objeto completo se borra o se copia, sus partes se copian o suprimen con él</a:t>
+            </a:r>
+            <a:endParaRPr/>
+          </a:p>
+          <a:p>
+            <a:pPr marL="228605" indent="-228605">
+              <a:buSzPts val="2935"/>
+            </a:pPr>
+            <a:r>
+              <a:rPr lang="es-CO" sz="2590"/>
+              <a:t>El rombo en este caso, es relleno</a:t>
+            </a:r>
+            <a:endParaRPr/>
+          </a:p>
+          <a:p>
+            <a:pPr marL="228605" indent="-228605">
+              <a:buSzPts val="2935"/>
+            </a:pPr>
+            <a:r>
+              <a:rPr lang="es-CO" sz="2590"/>
+              <a:t>“..es parte de…”</a:t>
+            </a:r>
+            <a:endParaRPr sz="2590"/>
+          </a:p>
+        </p:txBody>
+      </p:sp>
+      <p:grpSp>
+        <p:nvGrpSpPr>
+          <p:cNvPr id="244" name="Google Shape;244;p24"/>
+          <p:cNvGrpSpPr/>
+          <p:nvPr/>
+        </p:nvGrpSpPr>
+        <p:grpSpPr>
+          <a:xfrm>
+            <a:off x="7628652" y="2039426"/>
+            <a:ext cx="2939261" cy="1961851"/>
+            <a:chOff x="8645805" y="2311349"/>
+            <a:chExt cx="3331163" cy="2223431"/>
+          </a:xfrm>
+        </p:grpSpPr>
+        <p:sp>
+          <p:nvSpPr>
+            <p:cNvPr id="245" name="Google Shape;245;p24"/>
+            <p:cNvSpPr/>
+            <p:nvPr/>
+          </p:nvSpPr>
+          <p:spPr>
+            <a:xfrm>
+              <a:off x="9470344" y="2311349"/>
+              <a:ext cx="1466100" cy="523200"/>
+            </a:xfrm>
+            <a:prstGeom prst="rect">
+              <a:avLst/>
+            </a:prstGeom>
+            <a:solidFill>
+              <a:schemeClr val="lt1"/>
+            </a:solidFill>
+            <a:ln w="12700" cap="flat" cmpd="sng">
+              <a:solidFill>
+                <a:srgbClr val="42719B"/>
+              </a:solidFill>
+              <a:prstDash val="solid"/>
+              <a:miter lim="800000"/>
+              <a:headEnd type="none" w="sm" len="sm"/>
+              <a:tailEnd type="none" w="sm" len="sm"/>
+            </a:ln>
+          </p:spPr>
+          <p:txBody>
+            <a:bodyPr spcFirstLastPara="1" wrap="square" lIns="80669" tIns="40324" rIns="80669" bIns="40324" anchor="ctr" anchorCtr="0">
+              <a:noAutofit/>
+            </a:bodyPr>
+            <a:lstStyle/>
+            <a:p>
+              <a:pPr algn="ctr" defTabSz="806867">
+                <a:buClr>
+                  <a:srgbClr val="000000"/>
+                </a:buClr>
+              </a:pPr>
+              <a:r>
+                <a:rPr lang="es-CO" sz="1588" kern="0" dirty="0" err="1">
+                  <a:solidFill>
+                    <a:srgbClr val="C00000"/>
+                  </a:solidFill>
+                  <a:latin typeface="Calibri"/>
+                  <a:ea typeface="Calibri"/>
+                  <a:cs typeface="Calibri"/>
+                  <a:sym typeface="Calibri"/>
+                </a:rPr>
+                <a:t>Album</a:t>
+              </a:r>
+              <a:endParaRPr sz="1588" kern="0" dirty="0">
+                <a:solidFill>
+                  <a:srgbClr val="C00000"/>
+                </a:solidFill>
+                <a:latin typeface="Calibri"/>
+                <a:ea typeface="Calibri"/>
+                <a:cs typeface="Calibri"/>
+                <a:sym typeface="Calibri"/>
+              </a:endParaRPr>
+            </a:p>
+          </p:txBody>
+        </p:sp>
+        <p:sp>
+          <p:nvSpPr>
+            <p:cNvPr id="246" name="Google Shape;246;p24"/>
+            <p:cNvSpPr/>
+            <p:nvPr/>
+          </p:nvSpPr>
+          <p:spPr>
+            <a:xfrm>
+              <a:off x="10510868" y="4011580"/>
+              <a:ext cx="1466100" cy="523200"/>
+            </a:xfrm>
+            <a:prstGeom prst="rect">
+              <a:avLst/>
+            </a:prstGeom>
+            <a:solidFill>
+              <a:schemeClr val="lt1"/>
+            </a:solidFill>
+            <a:ln w="12700" cap="flat" cmpd="sng">
+              <a:solidFill>
+                <a:srgbClr val="42719B"/>
+              </a:solidFill>
+              <a:prstDash val="solid"/>
+              <a:miter lim="800000"/>
+              <a:headEnd type="none" w="sm" len="sm"/>
+              <a:tailEnd type="none" w="sm" len="sm"/>
+            </a:ln>
+          </p:spPr>
+          <p:txBody>
+            <a:bodyPr spcFirstLastPara="1" wrap="square" lIns="80669" tIns="40324" rIns="80669" bIns="40324" anchor="ctr" anchorCtr="0">
+              <a:noAutofit/>
+            </a:bodyPr>
+            <a:lstStyle/>
+            <a:p>
+              <a:pPr algn="ctr" defTabSz="806867">
+                <a:buClr>
+                  <a:srgbClr val="000000"/>
+                </a:buClr>
+              </a:pPr>
+              <a:r>
+                <a:rPr lang="es-ES" sz="1588" kern="0" dirty="0">
+                  <a:solidFill>
+                    <a:srgbClr val="C00000"/>
+                  </a:solidFill>
+                  <a:latin typeface="Calibri"/>
+                  <a:ea typeface="Calibri"/>
+                  <a:cs typeface="Calibri"/>
+                  <a:sym typeface="Calibri"/>
+                </a:rPr>
+                <a:t>Lamina</a:t>
+              </a:r>
+              <a:endParaRPr sz="1588" kern="0" dirty="0">
+                <a:solidFill>
+                  <a:srgbClr val="C00000"/>
+                </a:solidFill>
+                <a:latin typeface="Calibri"/>
+                <a:ea typeface="Calibri"/>
+                <a:cs typeface="Calibri"/>
+                <a:sym typeface="Calibri"/>
+              </a:endParaRPr>
+            </a:p>
+          </p:txBody>
+        </p:sp>
+        <p:sp>
+          <p:nvSpPr>
+            <p:cNvPr id="247" name="Google Shape;247;p24"/>
+            <p:cNvSpPr/>
+            <p:nvPr/>
+          </p:nvSpPr>
+          <p:spPr>
+            <a:xfrm>
+              <a:off x="10069433" y="2834569"/>
+              <a:ext cx="268014" cy="305023"/>
+            </a:xfrm>
+            <a:prstGeom prst="flowChartDecision">
+              <a:avLst/>
+            </a:prstGeom>
+            <a:solidFill>
+              <a:schemeClr val="dk1"/>
+            </a:solidFill>
+            <a:ln w="12700" cap="flat" cmpd="sng">
+              <a:solidFill>
+                <a:srgbClr val="42719B"/>
+              </a:solidFill>
+              <a:prstDash val="solid"/>
+              <a:miter lim="800000"/>
+              <a:headEnd type="none" w="sm" len="sm"/>
+              <a:tailEnd type="none" w="sm" len="sm"/>
+            </a:ln>
+          </p:spPr>
+          <p:txBody>
+            <a:bodyPr spcFirstLastPara="1" wrap="square" lIns="80669" tIns="40324" rIns="80669" bIns="40324" anchor="ctr" anchorCtr="0">
+              <a:noAutofit/>
+            </a:bodyPr>
+            <a:lstStyle/>
+            <a:p>
+              <a:pPr algn="ctr" defTabSz="806867">
+                <a:buClr>
+                  <a:srgbClr val="000000"/>
+                </a:buClr>
+              </a:pPr>
+              <a:endParaRPr sz="1588" kern="0">
+                <a:solidFill>
+                  <a:srgbClr val="FFFFFF"/>
+                </a:solidFill>
+                <a:latin typeface="Calibri"/>
+                <a:ea typeface="Calibri"/>
+                <a:cs typeface="Calibri"/>
+                <a:sym typeface="Calibri"/>
+              </a:endParaRPr>
+            </a:p>
+          </p:txBody>
+        </p:sp>
+        <p:sp>
+          <p:nvSpPr>
+            <p:cNvPr id="248" name="Google Shape;248;p24"/>
+            <p:cNvSpPr/>
+            <p:nvPr/>
+          </p:nvSpPr>
+          <p:spPr>
+            <a:xfrm>
+              <a:off x="8645805" y="4011580"/>
+              <a:ext cx="1466100" cy="523200"/>
+            </a:xfrm>
+            <a:prstGeom prst="rect">
+              <a:avLst/>
+            </a:prstGeom>
+            <a:solidFill>
+              <a:schemeClr val="lt1"/>
+            </a:solidFill>
+            <a:ln w="12700" cap="flat" cmpd="sng">
+              <a:solidFill>
+                <a:srgbClr val="42719B"/>
+              </a:solidFill>
+              <a:prstDash val="solid"/>
+              <a:miter lim="800000"/>
+              <a:headEnd type="none" w="sm" len="sm"/>
+              <a:tailEnd type="none" w="sm" len="sm"/>
+            </a:ln>
+          </p:spPr>
+          <p:txBody>
+            <a:bodyPr spcFirstLastPara="1" wrap="square" lIns="80669" tIns="40324" rIns="80669" bIns="40324" anchor="ctr" anchorCtr="0">
+              <a:noAutofit/>
+            </a:bodyPr>
+            <a:lstStyle/>
+            <a:p>
+              <a:pPr algn="ctr" defTabSz="806867">
+                <a:buClr>
+                  <a:srgbClr val="000000"/>
+                </a:buClr>
+              </a:pPr>
+              <a:r>
+                <a:rPr lang="es-CO" sz="1588" kern="0">
+                  <a:solidFill>
+                    <a:srgbClr val="C00000"/>
+                  </a:solidFill>
+                  <a:latin typeface="Calibri"/>
+                  <a:ea typeface="Calibri"/>
+                  <a:cs typeface="Calibri"/>
+                  <a:sym typeface="Calibri"/>
+                </a:rPr>
+                <a:t>Tapa</a:t>
+              </a:r>
+              <a:endParaRPr sz="1588" kern="0">
+                <a:solidFill>
+                  <a:srgbClr val="C00000"/>
+                </a:solidFill>
+                <a:latin typeface="Calibri"/>
+                <a:ea typeface="Calibri"/>
+                <a:cs typeface="Calibri"/>
+                <a:sym typeface="Calibri"/>
+              </a:endParaRPr>
+            </a:p>
+          </p:txBody>
+        </p:sp>
+        <p:cxnSp>
+          <p:nvCxnSpPr>
+            <p:cNvPr id="249" name="Google Shape;249;p24"/>
+            <p:cNvCxnSpPr>
+              <a:stCxn id="247" idx="2"/>
+              <a:endCxn id="248" idx="0"/>
+            </p:cNvCxnSpPr>
+            <p:nvPr/>
+          </p:nvCxnSpPr>
+          <p:spPr>
+            <a:xfrm rot="5400000">
+              <a:off x="9355040" y="3163292"/>
+              <a:ext cx="872100" cy="824700"/>
+            </a:xfrm>
+            <a:prstGeom prst="bentConnector3">
+              <a:avLst>
+                <a:gd name="adj1" fmla="val 50000"/>
+              </a:avLst>
+            </a:prstGeom>
+            <a:noFill/>
+            <a:ln w="9525" cap="flat" cmpd="sng">
+              <a:solidFill>
+                <a:schemeClr val="accent1"/>
+              </a:solidFill>
+              <a:prstDash val="solid"/>
+              <a:miter lim="800000"/>
+              <a:headEnd type="none" w="sm" len="sm"/>
+              <a:tailEnd type="none" w="sm" len="sm"/>
+            </a:ln>
+          </p:spPr>
+        </p:cxnSp>
+        <p:cxnSp>
+          <p:nvCxnSpPr>
+            <p:cNvPr id="250" name="Google Shape;250;p24"/>
+            <p:cNvCxnSpPr>
+              <a:stCxn id="247" idx="2"/>
+              <a:endCxn id="246" idx="0"/>
+            </p:cNvCxnSpPr>
+            <p:nvPr/>
+          </p:nvCxnSpPr>
+          <p:spPr>
+            <a:xfrm rot="-5400000" flipH="1">
+              <a:off x="10287590" y="3055442"/>
+              <a:ext cx="872100" cy="1040400"/>
+            </a:xfrm>
+            <a:prstGeom prst="bentConnector3">
+              <a:avLst>
+                <a:gd name="adj1" fmla="val 50000"/>
+              </a:avLst>
+            </a:prstGeom>
+            <a:noFill/>
+            <a:ln w="9525" cap="flat" cmpd="sng">
+              <a:solidFill>
+                <a:schemeClr val="accent1"/>
+              </a:solidFill>
+              <a:prstDash val="solid"/>
+              <a:miter lim="800000"/>
+              <a:headEnd type="none" w="sm" len="sm"/>
+              <a:tailEnd type="none" w="sm" len="sm"/>
+            </a:ln>
+          </p:spPr>
+        </p:cxnSp>
+        <p:sp>
+          <p:nvSpPr>
+            <p:cNvPr id="251" name="Google Shape;251;p24"/>
+            <p:cNvSpPr txBox="1"/>
+            <p:nvPr/>
+          </p:nvSpPr>
+          <p:spPr>
+            <a:xfrm>
+              <a:off x="9916510" y="3168865"/>
+              <a:ext cx="301800" cy="369300"/>
+            </a:xfrm>
+            <a:prstGeom prst="rect">
+              <a:avLst/>
+            </a:prstGeom>
+            <a:noFill/>
+            <a:ln>
+              <a:noFill/>
+            </a:ln>
+          </p:spPr>
+          <p:txBody>
+            <a:bodyPr spcFirstLastPara="1" wrap="square" lIns="80669" tIns="40324" rIns="80669" bIns="40324" anchor="t" anchorCtr="0">
+              <a:noAutofit/>
+            </a:bodyPr>
+            <a:lstStyle/>
+            <a:p>
+              <a:pPr defTabSz="806867">
+                <a:buClr>
+                  <a:srgbClr val="000000"/>
+                </a:buClr>
+              </a:pPr>
+              <a:r>
+                <a:rPr lang="es-CO" sz="1588" kern="0">
+                  <a:solidFill>
+                    <a:srgbClr val="000000"/>
+                  </a:solidFill>
+                  <a:latin typeface="Calibri"/>
+                  <a:ea typeface="Calibri"/>
+                  <a:cs typeface="Calibri"/>
+                  <a:sym typeface="Calibri"/>
+                </a:rPr>
+                <a:t>1</a:t>
+              </a:r>
+              <a:endParaRPr sz="1588" kern="0">
+                <a:solidFill>
+                  <a:srgbClr val="000000"/>
+                </a:solidFill>
+                <a:latin typeface="Calibri"/>
+                <a:ea typeface="Calibri"/>
+                <a:cs typeface="Calibri"/>
+                <a:sym typeface="Calibri"/>
+              </a:endParaRPr>
+            </a:p>
+          </p:txBody>
+        </p:sp>
+        <p:sp>
+          <p:nvSpPr>
+            <p:cNvPr id="252" name="Google Shape;252;p24"/>
+            <p:cNvSpPr txBox="1"/>
+            <p:nvPr/>
+          </p:nvSpPr>
+          <p:spPr>
+            <a:xfrm>
+              <a:off x="8954814" y="3531473"/>
+              <a:ext cx="301800" cy="369300"/>
+            </a:xfrm>
+            <a:prstGeom prst="rect">
+              <a:avLst/>
+            </a:prstGeom>
+            <a:noFill/>
+            <a:ln>
+              <a:noFill/>
+            </a:ln>
+          </p:spPr>
+          <p:txBody>
+            <a:bodyPr spcFirstLastPara="1" wrap="square" lIns="80669" tIns="40324" rIns="80669" bIns="40324" anchor="t" anchorCtr="0">
+              <a:noAutofit/>
+            </a:bodyPr>
+            <a:lstStyle/>
+            <a:p>
+              <a:pPr defTabSz="806867">
+                <a:buClr>
+                  <a:srgbClr val="000000"/>
+                </a:buClr>
+              </a:pPr>
+              <a:r>
+                <a:rPr lang="es-CO" sz="1588" kern="0">
+                  <a:solidFill>
+                    <a:srgbClr val="000000"/>
+                  </a:solidFill>
+                  <a:latin typeface="Calibri"/>
+                  <a:ea typeface="Calibri"/>
+                  <a:cs typeface="Calibri"/>
+                  <a:sym typeface="Calibri"/>
+                </a:rPr>
+                <a:t>1</a:t>
+              </a:r>
+              <a:endParaRPr sz="1588" kern="0">
+                <a:solidFill>
+                  <a:srgbClr val="000000"/>
+                </a:solidFill>
+                <a:latin typeface="Calibri"/>
+                <a:ea typeface="Calibri"/>
+                <a:cs typeface="Calibri"/>
+                <a:sym typeface="Calibri"/>
+              </a:endParaRPr>
+            </a:p>
+          </p:txBody>
+        </p:sp>
+        <p:sp>
+          <p:nvSpPr>
+            <p:cNvPr id="253" name="Google Shape;253;p24"/>
+            <p:cNvSpPr txBox="1"/>
+            <p:nvPr/>
+          </p:nvSpPr>
+          <p:spPr>
+            <a:xfrm>
+              <a:off x="11385854" y="3576450"/>
+              <a:ext cx="535800" cy="369300"/>
+            </a:xfrm>
+            <a:prstGeom prst="rect">
+              <a:avLst/>
+            </a:prstGeom>
+            <a:noFill/>
+            <a:ln>
+              <a:noFill/>
+            </a:ln>
+          </p:spPr>
+          <p:txBody>
+            <a:bodyPr spcFirstLastPara="1" wrap="square" lIns="80669" tIns="40324" rIns="80669" bIns="40324" anchor="t" anchorCtr="0">
+              <a:noAutofit/>
+            </a:bodyPr>
+            <a:lstStyle/>
+            <a:p>
+              <a:pPr defTabSz="806867">
+                <a:buClr>
+                  <a:srgbClr val="000000"/>
+                </a:buClr>
+              </a:pPr>
+              <a:r>
+                <a:rPr lang="es-CO" sz="1588" kern="0">
+                  <a:solidFill>
+                    <a:srgbClr val="000000"/>
+                  </a:solidFill>
+                  <a:latin typeface="Calibri"/>
+                  <a:ea typeface="Calibri"/>
+                  <a:cs typeface="Calibri"/>
+                  <a:sym typeface="Calibri"/>
+                </a:rPr>
+                <a:t>670</a:t>
+              </a:r>
+              <a:endParaRPr sz="1588" kern="0">
+                <a:solidFill>
+                  <a:srgbClr val="000000"/>
+                </a:solidFill>
+                <a:latin typeface="Calibri"/>
+                <a:ea typeface="Calibri"/>
+                <a:cs typeface="Calibri"/>
+                <a:sym typeface="Calibri"/>
+              </a:endParaRPr>
+            </a:p>
+          </p:txBody>
+        </p:sp>
+      </p:grpSp>
     </p:spTree>
     <p:extLst>
       <p:ext uri="{BB962C8B-B14F-4D97-AF65-F5344CB8AC3E}">
-        <p14:creationId xmlns:p14="http://schemas.microsoft.com/office/powerpoint/2010/main" val="3229102556"/>
+        <p14:creationId xmlns:p14="http://schemas.microsoft.com/office/powerpoint/2010/main" val="3187660144"/>
       </p:ext>
     </p:extLst>
   </p:cSld>
   <p:clrMapOvr>
     <a:masterClrMapping/>
   </p:clrMapOvr>
+  <p:timing>
+    <p:tnLst>
+      <p:par>
+        <p:cTn id="1" dur="indefinite" restart="never" nodeType="tmRoot">
+          <p:childTnLst>
+            <p:seq concurrent="1" nextAc="seek">
+              <p:cTn id="2" dur="indefinite" nodeType="mainSeq">
+                <p:childTnLst>
+                  <p:par>
+                    <p:cTn id="3" fill="hold">
+                      <p:stCondLst>
+                        <p:cond delay="indefinite"/>
+                      </p:stCondLst>
+                      <p:childTnLst>
+                        <p:par>
+                          <p:cTn id="4" fill="hold">
+                            <p:stCondLst>
+                              <p:cond delay="0"/>
+                            </p:stCondLst>
+                            <p:childTnLst>
+                              <p:par>
+                                <p:cTn id="5" presetID="1" presetClass="entr" presetSubtype="0" fill="hold" nodeType="clickEffect">
+                                  <p:stCondLst>
+                                    <p:cond delay="0"/>
+                                  </p:stCondLst>
+                                  <p:childTnLst>
+                                    <p:set>
+                                      <p:cBhvr>
+                                        <p:cTn id="6" dur="1" fill="hold">
+                                          <p:stCondLst>
+                                            <p:cond delay="0"/>
+                                          </p:stCondLst>
+                                        </p:cTn>
+                                        <p:tgtEl>
+                                          <p:spTgt spid="244"/>
+                                        </p:tgtEl>
+                                        <p:attrNameLst>
+                                          <p:attrName>style.visibility</p:attrName>
+                                        </p:attrNameLst>
+                                      </p:cBhvr>
+                                      <p:to>
+                                        <p:strVal val="visible"/>
+                                      </p:to>
+                                    </p:set>
+                                  </p:childTnLst>
+                                </p:cTn>
+                              </p:par>
+                            </p:childTnLst>
+                          </p:cTn>
+                        </p:par>
+                      </p:childTnLst>
+                    </p:cTn>
+                  </p:par>
+                </p:childTnLst>
+              </p:cTn>
+              <p:prevCondLst>
+                <p:cond evt="onPrev" delay="0">
+                  <p:tgtEl>
+                    <p:sldTgt/>
+                  </p:tgtEl>
+                </p:cond>
+              </p:prevCondLst>
+              <p:nextCondLst>
+                <p:cond evt="onNext" delay="0">
+                  <p:tgtEl>
+                    <p:sldTgt/>
+                  </p:tgtEl>
+                </p:cond>
+              </p:nextCondLst>
+            </p:seq>
+          </p:childTnLst>
+        </p:cTn>
+      </p:par>
+    </p:tnLst>
+  </p:timing>
 </p:sld>
 </file>
 

</xml_diff>

<commit_message>
Commit ppt Relaciones entre clases
</commit_message>
<xml_diff>
--- a/Slides/POO/4 Relaciones entre clases.pptx
+++ b/Slides/POO/4 Relaciones entre clases.pptx
@@ -11,7 +11,7 @@
   <p:sldIdLst>
     <p:sldId id="256" r:id="rId3"/>
     <p:sldId id="257" r:id="rId4"/>
-    <p:sldId id="258" r:id="rId5"/>
+    <p:sldId id="272" r:id="rId5"/>
     <p:sldId id="259" r:id="rId6"/>
     <p:sldId id="260" r:id="rId7"/>
     <p:sldId id="269" r:id="rId8"/>
@@ -128,6 +128,83 @@
 <file path=ppt/changesInfos/changesInfo1.xml><?xml version="1.0" encoding="utf-8"?>
 <pc:chgInfo xmlns:a="http://schemas.openxmlformats.org/drawingml/2006/main" xmlns:r="http://schemas.openxmlformats.org/officeDocument/2006/relationships" xmlns:ac="http://schemas.microsoft.com/office/drawing/2013/main/command" xmlns:pc="http://schemas.microsoft.com/office/powerpoint/2013/main/command">
   <pc:docChgLst>
+    <pc:chgData name="Cesar Augusto Lopez Gallego" userId="0dfa9112-9251-4882-b472-cf2dfcee09d1" providerId="ADAL" clId="{FF06ED2D-CA6C-4B35-AE32-AE5052DC3AF5}"/>
+    <pc:docChg chg="undo custSel addSld delSld modSld">
+      <pc:chgData name="Cesar Augusto Lopez Gallego" userId="0dfa9112-9251-4882-b472-cf2dfcee09d1" providerId="ADAL" clId="{FF06ED2D-CA6C-4B35-AE32-AE5052DC3AF5}" dt="2024-08-14T19:49:53.567" v="306" actId="20577"/>
+      <pc:docMkLst>
+        <pc:docMk/>
+      </pc:docMkLst>
+      <pc:sldChg chg="del">
+        <pc:chgData name="Cesar Augusto Lopez Gallego" userId="0dfa9112-9251-4882-b472-cf2dfcee09d1" providerId="ADAL" clId="{FF06ED2D-CA6C-4B35-AE32-AE5052DC3AF5}" dt="2024-08-14T18:45:23.182" v="1" actId="47"/>
+        <pc:sldMkLst>
+          <pc:docMk/>
+          <pc:sldMk cId="2597893151" sldId="268"/>
+        </pc:sldMkLst>
+      </pc:sldChg>
+      <pc:sldChg chg="del">
+        <pc:chgData name="Cesar Augusto Lopez Gallego" userId="0dfa9112-9251-4882-b472-cf2dfcee09d1" providerId="ADAL" clId="{FF06ED2D-CA6C-4B35-AE32-AE5052DC3AF5}" dt="2024-08-14T18:45:13.361" v="0" actId="47"/>
+        <pc:sldMkLst>
+          <pc:docMk/>
+          <pc:sldMk cId="197080040" sldId="270"/>
+        </pc:sldMkLst>
+      </pc:sldChg>
+      <pc:sldChg chg="modSp del mod">
+        <pc:chgData name="Cesar Augusto Lopez Gallego" userId="0dfa9112-9251-4882-b472-cf2dfcee09d1" providerId="ADAL" clId="{FF06ED2D-CA6C-4B35-AE32-AE5052DC3AF5}" dt="2024-08-14T18:46:59.960" v="200" actId="2696"/>
+        <pc:sldMkLst>
+          <pc:docMk/>
+          <pc:sldMk cId="3229102556" sldId="271"/>
+        </pc:sldMkLst>
+        <pc:spChg chg="mod">
+          <ac:chgData name="Cesar Augusto Lopez Gallego" userId="0dfa9112-9251-4882-b472-cf2dfcee09d1" providerId="ADAL" clId="{FF06ED2D-CA6C-4B35-AE32-AE5052DC3AF5}" dt="2024-08-14T18:45:45.265" v="11" actId="20577"/>
+          <ac:spMkLst>
+            <pc:docMk/>
+            <pc:sldMk cId="3229102556" sldId="271"/>
+            <ac:spMk id="2" creationId="{00000000-0000-0000-0000-000000000000}"/>
+          </ac:spMkLst>
+        </pc:spChg>
+        <pc:spChg chg="mod">
+          <ac:chgData name="Cesar Augusto Lopez Gallego" userId="0dfa9112-9251-4882-b472-cf2dfcee09d1" providerId="ADAL" clId="{FF06ED2D-CA6C-4B35-AE32-AE5052DC3AF5}" dt="2024-08-14T18:46:56.425" v="199" actId="20577"/>
+          <ac:spMkLst>
+            <pc:docMk/>
+            <pc:sldMk cId="3229102556" sldId="271"/>
+            <ac:spMk id="3" creationId="{00000000-0000-0000-0000-000000000000}"/>
+          </ac:spMkLst>
+        </pc:spChg>
+        <pc:picChg chg="mod">
+          <ac:chgData name="Cesar Augusto Lopez Gallego" userId="0dfa9112-9251-4882-b472-cf2dfcee09d1" providerId="ADAL" clId="{FF06ED2D-CA6C-4B35-AE32-AE5052DC3AF5}" dt="2024-08-14T18:46:40.075" v="183" actId="1076"/>
+          <ac:picMkLst>
+            <pc:docMk/>
+            <pc:sldMk cId="3229102556" sldId="271"/>
+            <ac:picMk id="4" creationId="{00000000-0000-0000-0000-000000000000}"/>
+          </ac:picMkLst>
+        </pc:picChg>
+      </pc:sldChg>
+      <pc:sldChg chg="modSp add mod">
+        <pc:chgData name="Cesar Augusto Lopez Gallego" userId="0dfa9112-9251-4882-b472-cf2dfcee09d1" providerId="ADAL" clId="{FF06ED2D-CA6C-4B35-AE32-AE5052DC3AF5}" dt="2024-08-14T19:49:53.567" v="306" actId="20577"/>
+        <pc:sldMkLst>
+          <pc:docMk/>
+          <pc:sldMk cId="3641373641" sldId="271"/>
+        </pc:sldMkLst>
+        <pc:spChg chg="mod">
+          <ac:chgData name="Cesar Augusto Lopez Gallego" userId="0dfa9112-9251-4882-b472-cf2dfcee09d1" providerId="ADAL" clId="{FF06ED2D-CA6C-4B35-AE32-AE5052DC3AF5}" dt="2024-08-14T19:49:53.567" v="306" actId="20577"/>
+          <ac:spMkLst>
+            <pc:docMk/>
+            <pc:sldMk cId="3641373641" sldId="271"/>
+            <ac:spMk id="3" creationId="{00000000-0000-0000-0000-000000000000}"/>
+          </ac:spMkLst>
+        </pc:spChg>
+        <pc:picChg chg="mod">
+          <ac:chgData name="Cesar Augusto Lopez Gallego" userId="0dfa9112-9251-4882-b472-cf2dfcee09d1" providerId="ADAL" clId="{FF06ED2D-CA6C-4B35-AE32-AE5052DC3AF5}" dt="2024-08-14T19:13:30.650" v="202" actId="1076"/>
+          <ac:picMkLst>
+            <pc:docMk/>
+            <pc:sldMk cId="3641373641" sldId="271"/>
+            <ac:picMk id="4" creationId="{00000000-0000-0000-0000-000000000000}"/>
+          </ac:picMkLst>
+        </pc:picChg>
+      </pc:sldChg>
+    </pc:docChg>
+  </pc:docChgLst>
+  <pc:docChgLst>
     <pc:chgData name="Cesar Augusto Lopez Gallego" userId="0dfa9112-9251-4882-b472-cf2dfcee09d1" providerId="ADAL" clId="{22D1981D-4102-4845-93AB-E9B527CF0685}"/>
     <pc:docChg chg="undo custSel modSld">
       <pc:chgData name="Cesar Augusto Lopez Gallego" userId="0dfa9112-9251-4882-b472-cf2dfcee09d1" providerId="ADAL" clId="{22D1981D-4102-4845-93AB-E9B527CF0685}" dt="2024-02-08T11:53:19.292" v="113" actId="20577"/>
@@ -209,83 +286,6 @@
             <ac:spMk id="155" creationId="{00000000-0000-0000-0000-000000000000}"/>
           </ac:spMkLst>
         </pc:spChg>
-      </pc:sldChg>
-    </pc:docChg>
-  </pc:docChgLst>
-  <pc:docChgLst>
-    <pc:chgData name="Cesar Augusto Lopez Gallego" userId="0dfa9112-9251-4882-b472-cf2dfcee09d1" providerId="ADAL" clId="{FF06ED2D-CA6C-4B35-AE32-AE5052DC3AF5}"/>
-    <pc:docChg chg="undo custSel addSld delSld modSld">
-      <pc:chgData name="Cesar Augusto Lopez Gallego" userId="0dfa9112-9251-4882-b472-cf2dfcee09d1" providerId="ADAL" clId="{FF06ED2D-CA6C-4B35-AE32-AE5052DC3AF5}" dt="2024-08-14T19:49:53.567" v="306" actId="20577"/>
-      <pc:docMkLst>
-        <pc:docMk/>
-      </pc:docMkLst>
-      <pc:sldChg chg="del">
-        <pc:chgData name="Cesar Augusto Lopez Gallego" userId="0dfa9112-9251-4882-b472-cf2dfcee09d1" providerId="ADAL" clId="{FF06ED2D-CA6C-4B35-AE32-AE5052DC3AF5}" dt="2024-08-14T18:45:23.182" v="1" actId="47"/>
-        <pc:sldMkLst>
-          <pc:docMk/>
-          <pc:sldMk cId="2597893151" sldId="268"/>
-        </pc:sldMkLst>
-      </pc:sldChg>
-      <pc:sldChg chg="del">
-        <pc:chgData name="Cesar Augusto Lopez Gallego" userId="0dfa9112-9251-4882-b472-cf2dfcee09d1" providerId="ADAL" clId="{FF06ED2D-CA6C-4B35-AE32-AE5052DC3AF5}" dt="2024-08-14T18:45:13.361" v="0" actId="47"/>
-        <pc:sldMkLst>
-          <pc:docMk/>
-          <pc:sldMk cId="197080040" sldId="270"/>
-        </pc:sldMkLst>
-      </pc:sldChg>
-      <pc:sldChg chg="modSp del mod">
-        <pc:chgData name="Cesar Augusto Lopez Gallego" userId="0dfa9112-9251-4882-b472-cf2dfcee09d1" providerId="ADAL" clId="{FF06ED2D-CA6C-4B35-AE32-AE5052DC3AF5}" dt="2024-08-14T18:46:59.960" v="200" actId="2696"/>
-        <pc:sldMkLst>
-          <pc:docMk/>
-          <pc:sldMk cId="3229102556" sldId="271"/>
-        </pc:sldMkLst>
-        <pc:spChg chg="mod">
-          <ac:chgData name="Cesar Augusto Lopez Gallego" userId="0dfa9112-9251-4882-b472-cf2dfcee09d1" providerId="ADAL" clId="{FF06ED2D-CA6C-4B35-AE32-AE5052DC3AF5}" dt="2024-08-14T18:45:45.265" v="11" actId="20577"/>
-          <ac:spMkLst>
-            <pc:docMk/>
-            <pc:sldMk cId="3229102556" sldId="271"/>
-            <ac:spMk id="2" creationId="{00000000-0000-0000-0000-000000000000}"/>
-          </ac:spMkLst>
-        </pc:spChg>
-        <pc:spChg chg="mod">
-          <ac:chgData name="Cesar Augusto Lopez Gallego" userId="0dfa9112-9251-4882-b472-cf2dfcee09d1" providerId="ADAL" clId="{FF06ED2D-CA6C-4B35-AE32-AE5052DC3AF5}" dt="2024-08-14T18:46:56.425" v="199" actId="20577"/>
-          <ac:spMkLst>
-            <pc:docMk/>
-            <pc:sldMk cId="3229102556" sldId="271"/>
-            <ac:spMk id="3" creationId="{00000000-0000-0000-0000-000000000000}"/>
-          </ac:spMkLst>
-        </pc:spChg>
-        <pc:picChg chg="mod">
-          <ac:chgData name="Cesar Augusto Lopez Gallego" userId="0dfa9112-9251-4882-b472-cf2dfcee09d1" providerId="ADAL" clId="{FF06ED2D-CA6C-4B35-AE32-AE5052DC3AF5}" dt="2024-08-14T18:46:40.075" v="183" actId="1076"/>
-          <ac:picMkLst>
-            <pc:docMk/>
-            <pc:sldMk cId="3229102556" sldId="271"/>
-            <ac:picMk id="4" creationId="{00000000-0000-0000-0000-000000000000}"/>
-          </ac:picMkLst>
-        </pc:picChg>
-      </pc:sldChg>
-      <pc:sldChg chg="modSp add mod">
-        <pc:chgData name="Cesar Augusto Lopez Gallego" userId="0dfa9112-9251-4882-b472-cf2dfcee09d1" providerId="ADAL" clId="{FF06ED2D-CA6C-4B35-AE32-AE5052DC3AF5}" dt="2024-08-14T19:49:53.567" v="306" actId="20577"/>
-        <pc:sldMkLst>
-          <pc:docMk/>
-          <pc:sldMk cId="3641373641" sldId="271"/>
-        </pc:sldMkLst>
-        <pc:spChg chg="mod">
-          <ac:chgData name="Cesar Augusto Lopez Gallego" userId="0dfa9112-9251-4882-b472-cf2dfcee09d1" providerId="ADAL" clId="{FF06ED2D-CA6C-4B35-AE32-AE5052DC3AF5}" dt="2024-08-14T19:49:53.567" v="306" actId="20577"/>
-          <ac:spMkLst>
-            <pc:docMk/>
-            <pc:sldMk cId="3641373641" sldId="271"/>
-            <ac:spMk id="3" creationId="{00000000-0000-0000-0000-000000000000}"/>
-          </ac:spMkLst>
-        </pc:spChg>
-        <pc:picChg chg="mod">
-          <ac:chgData name="Cesar Augusto Lopez Gallego" userId="0dfa9112-9251-4882-b472-cf2dfcee09d1" providerId="ADAL" clId="{FF06ED2D-CA6C-4B35-AE32-AE5052DC3AF5}" dt="2024-08-14T19:13:30.650" v="202" actId="1076"/>
-          <ac:picMkLst>
-            <pc:docMk/>
-            <pc:sldMk cId="3641373641" sldId="271"/>
-            <ac:picMk id="4" creationId="{00000000-0000-0000-0000-000000000000}"/>
-          </ac:picMkLst>
-        </pc:picChg>
       </pc:sldChg>
     </pc:docChg>
   </pc:docChgLst>
@@ -420,7 +420,7 @@
           <a:p>
             <a:fld id="{686137FE-060A-406C-8256-1024B28B91EB}" type="datetimeFigureOut">
               <a:rPr lang="es-CO" smtClean="0"/>
-              <a:t>14/08/2024</a:t>
+              <a:t>19/02/2025</a:t>
             </a:fld>
             <a:endParaRPr lang="es-CO"/>
           </a:p>
@@ -1929,7 +1929,7 @@
           <a:p>
             <a:fld id="{3807986E-5C03-4E6F-AF93-F55E25722CDA}" type="datetimeFigureOut">
               <a:rPr lang="es-CO" smtClean="0"/>
-              <a:t>14/08/2024</a:t>
+              <a:t>19/02/2025</a:t>
             </a:fld>
             <a:endParaRPr lang="es-CO"/>
           </a:p>
@@ -2099,7 +2099,7 @@
           <a:p>
             <a:fld id="{3807986E-5C03-4E6F-AF93-F55E25722CDA}" type="datetimeFigureOut">
               <a:rPr lang="es-CO" smtClean="0"/>
-              <a:t>14/08/2024</a:t>
+              <a:t>19/02/2025</a:t>
             </a:fld>
             <a:endParaRPr lang="es-CO"/>
           </a:p>
@@ -2279,7 +2279,7 @@
           <a:p>
             <a:fld id="{3807986E-5C03-4E6F-AF93-F55E25722CDA}" type="datetimeFigureOut">
               <a:rPr lang="es-CO" smtClean="0"/>
-              <a:t>14/08/2024</a:t>
+              <a:t>19/02/2025</a:t>
             </a:fld>
             <a:endParaRPr lang="es-CO"/>
           </a:p>
@@ -11345,7 +11345,7 @@
           <a:p>
             <a:fld id="{3807986E-5C03-4E6F-AF93-F55E25722CDA}" type="datetimeFigureOut">
               <a:rPr lang="es-CO" smtClean="0"/>
-              <a:t>14/08/2024</a:t>
+              <a:t>19/02/2025</a:t>
             </a:fld>
             <a:endParaRPr lang="es-CO"/>
           </a:p>
@@ -14949,7 +14949,7 @@
           <a:p>
             <a:fld id="{3807986E-5C03-4E6F-AF93-F55E25722CDA}" type="datetimeFigureOut">
               <a:rPr lang="es-CO" smtClean="0"/>
-              <a:t>14/08/2024</a:t>
+              <a:t>19/02/2025</a:t>
             </a:fld>
             <a:endParaRPr lang="es-CO"/>
           </a:p>
@@ -15181,7 +15181,7 @@
           <a:p>
             <a:fld id="{3807986E-5C03-4E6F-AF93-F55E25722CDA}" type="datetimeFigureOut">
               <a:rPr lang="es-CO" smtClean="0"/>
-              <a:t>14/08/2024</a:t>
+              <a:t>19/02/2025</a:t>
             </a:fld>
             <a:endParaRPr lang="es-CO"/>
           </a:p>
@@ -15548,7 +15548,7 @@
           <a:p>
             <a:fld id="{3807986E-5C03-4E6F-AF93-F55E25722CDA}" type="datetimeFigureOut">
               <a:rPr lang="es-CO" smtClean="0"/>
-              <a:t>14/08/2024</a:t>
+              <a:t>19/02/2025</a:t>
             </a:fld>
             <a:endParaRPr lang="es-CO"/>
           </a:p>
@@ -15666,7 +15666,7 @@
           <a:p>
             <a:fld id="{3807986E-5C03-4E6F-AF93-F55E25722CDA}" type="datetimeFigureOut">
               <a:rPr lang="es-CO" smtClean="0"/>
-              <a:t>14/08/2024</a:t>
+              <a:t>19/02/2025</a:t>
             </a:fld>
             <a:endParaRPr lang="es-CO"/>
           </a:p>
@@ -15761,7 +15761,7 @@
           <a:p>
             <a:fld id="{3807986E-5C03-4E6F-AF93-F55E25722CDA}" type="datetimeFigureOut">
               <a:rPr lang="es-CO" smtClean="0"/>
-              <a:t>14/08/2024</a:t>
+              <a:t>19/02/2025</a:t>
             </a:fld>
             <a:endParaRPr lang="es-CO"/>
           </a:p>
@@ -16038,7 +16038,7 @@
           <a:p>
             <a:fld id="{3807986E-5C03-4E6F-AF93-F55E25722CDA}" type="datetimeFigureOut">
               <a:rPr lang="es-CO" smtClean="0"/>
-              <a:t>14/08/2024</a:t>
+              <a:t>19/02/2025</a:t>
             </a:fld>
             <a:endParaRPr lang="es-CO"/>
           </a:p>
@@ -16291,7 +16291,7 @@
           <a:p>
             <a:fld id="{3807986E-5C03-4E6F-AF93-F55E25722CDA}" type="datetimeFigureOut">
               <a:rPr lang="es-CO" smtClean="0"/>
-              <a:t>14/08/2024</a:t>
+              <a:t>19/02/2025</a:t>
             </a:fld>
             <a:endParaRPr lang="es-CO"/>
           </a:p>
@@ -16504,7 +16504,7 @@
           <a:p>
             <a:fld id="{3807986E-5C03-4E6F-AF93-F55E25722CDA}" type="datetimeFigureOut">
               <a:rPr lang="es-CO" smtClean="0"/>
-              <a:t>14/08/2024</a:t>
+              <a:t>19/02/2025</a:t>
             </a:fld>
             <a:endParaRPr lang="es-CO"/>
           </a:p>
@@ -19125,8 +19125,8 @@
         </p:nvSpPr>
         <p:spPr>
           <a:xfrm>
-            <a:off x="838200" y="365126"/>
-            <a:ext cx="10515706" cy="1325647"/>
+            <a:off x="342254" y="335967"/>
+            <a:ext cx="10515706" cy="956526"/>
           </a:xfrm>
           <a:prstGeom prst="rect">
             <a:avLst/>
@@ -19137,1218 +19137,1675 @@
           </a:ln>
         </p:spPr>
         <p:txBody>
-          <a:bodyPr spcFirstLastPara="1" wrap="square" lIns="80669" tIns="40324" rIns="80669" bIns="40324" anchor="ctr" anchorCtr="0">
+          <a:bodyPr spcFirstLastPara="1" vert="horz" wrap="square" lIns="80669" tIns="40324" rIns="80669" bIns="40324" rtlCol="0" anchor="ctr" anchorCtr="0">
             <a:noAutofit/>
           </a:bodyPr>
           <a:lstStyle/>
           <a:p>
             <a:r>
-              <a:rPr lang="es-CO"/>
-              <a:t>3 tipos de relaciones principales</a:t>
+              <a:rPr lang="es-CO" sz="3883" dirty="0"/>
+              <a:t>Relaciones principales</a:t>
             </a:r>
-            <a:endParaRPr/>
+            <a:endParaRPr sz="3883" dirty="0"/>
           </a:p>
         </p:txBody>
       </p:sp>
-      <p:sp>
-        <p:nvSpPr>
-          <p:cNvPr id="99" name="Google Shape;99;p15"/>
-          <p:cNvSpPr txBox="1"/>
+      <p:grpSp>
+        <p:nvGrpSpPr>
+          <p:cNvPr id="13" name="Grupo 12">
+            <a:extLst>
+              <a:ext uri="{FF2B5EF4-FFF2-40B4-BE49-F238E27FC236}">
+                <a16:creationId xmlns:a16="http://schemas.microsoft.com/office/drawing/2014/main" id="{349684B3-DD2E-4A87-A126-91E172A7E7C6}"/>
+              </a:ext>
+            </a:extLst>
+          </p:cNvPr>
+          <p:cNvGrpSpPr/>
           <p:nvPr/>
-        </p:nvSpPr>
-        <p:spPr>
+        </p:nvGrpSpPr>
+        <p:grpSpPr>
           <a:xfrm>
-            <a:off x="5858985" y="4674286"/>
-            <a:ext cx="1027059" cy="353118"/>
+            <a:off x="365402" y="1951075"/>
+            <a:ext cx="4477292" cy="3515346"/>
+            <a:chOff x="414122" y="2211218"/>
+            <a:chExt cx="5074264" cy="3984059"/>
           </a:xfrm>
-          <a:prstGeom prst="rect">
-            <a:avLst/>
-          </a:prstGeom>
-          <a:noFill/>
-          <a:ln>
+        </p:grpSpPr>
+        <p:sp>
+          <p:nvSpPr>
+            <p:cNvPr id="105" name="Google Shape;105;p15"/>
+            <p:cNvSpPr/>
+            <p:nvPr/>
+          </p:nvSpPr>
+          <p:spPr>
+            <a:xfrm>
+              <a:off x="545208" y="2321580"/>
+              <a:ext cx="1466100" cy="523200"/>
+            </a:xfrm>
+            <a:prstGeom prst="rect">
+              <a:avLst/>
+            </a:prstGeom>
+            <a:solidFill>
+              <a:schemeClr val="lt1"/>
+            </a:solidFill>
+            <a:ln w="12700" cap="flat" cmpd="sng">
+              <a:solidFill>
+                <a:srgbClr val="42719B"/>
+              </a:solidFill>
+              <a:prstDash val="solid"/>
+              <a:miter lim="800000"/>
+              <a:headEnd type="none" w="sm" len="sm"/>
+              <a:tailEnd type="none" w="sm" len="sm"/>
+            </a:ln>
+          </p:spPr>
+          <p:txBody>
+            <a:bodyPr spcFirstLastPara="1" wrap="square" lIns="80669" tIns="40324" rIns="80669" bIns="40324" anchor="ctr" anchorCtr="0">
+              <a:noAutofit/>
+            </a:bodyPr>
+            <a:lstStyle/>
+            <a:p>
+              <a:pPr algn="ctr" defTabSz="806886">
+                <a:buClr>
+                  <a:srgbClr val="000000"/>
+                </a:buClr>
+              </a:pPr>
+              <a:r>
+                <a:rPr lang="es-CO" sz="1588" kern="0">
+                  <a:solidFill>
+                    <a:srgbClr val="C00000"/>
+                  </a:solidFill>
+                  <a:latin typeface="Flama Condensed Light" panose="02000000000000000000"/>
+                  <a:ea typeface="Calibri"/>
+                  <a:cs typeface="Calibri"/>
+                  <a:sym typeface="Calibri"/>
+                </a:rPr>
+                <a:t>Clase 1</a:t>
+              </a:r>
+              <a:endParaRPr sz="1588" kern="0">
+                <a:solidFill>
+                  <a:srgbClr val="C00000"/>
+                </a:solidFill>
+                <a:latin typeface="Flama Condensed Light" panose="02000000000000000000"/>
+                <a:ea typeface="Calibri"/>
+                <a:cs typeface="Calibri"/>
+                <a:sym typeface="Calibri"/>
+              </a:endParaRPr>
+            </a:p>
+          </p:txBody>
+        </p:sp>
+        <p:sp>
+          <p:nvSpPr>
+            <p:cNvPr id="106" name="Google Shape;106;p15"/>
+            <p:cNvSpPr/>
+            <p:nvPr/>
+          </p:nvSpPr>
+          <p:spPr>
+            <a:xfrm>
+              <a:off x="3913774" y="2321580"/>
+              <a:ext cx="1466100" cy="523200"/>
+            </a:xfrm>
+            <a:prstGeom prst="rect">
+              <a:avLst/>
+            </a:prstGeom>
+            <a:solidFill>
+              <a:schemeClr val="lt1"/>
+            </a:solidFill>
+            <a:ln w="12700" cap="flat" cmpd="sng">
+              <a:solidFill>
+                <a:srgbClr val="42719B"/>
+              </a:solidFill>
+              <a:prstDash val="solid"/>
+              <a:miter lim="800000"/>
+              <a:headEnd type="none" w="sm" len="sm"/>
+              <a:tailEnd type="none" w="sm" len="sm"/>
+            </a:ln>
+          </p:spPr>
+          <p:txBody>
+            <a:bodyPr spcFirstLastPara="1" wrap="square" lIns="80669" tIns="40324" rIns="80669" bIns="40324" anchor="ctr" anchorCtr="0">
+              <a:noAutofit/>
+            </a:bodyPr>
+            <a:lstStyle/>
+            <a:p>
+              <a:pPr algn="ctr" defTabSz="806886">
+                <a:buClr>
+                  <a:srgbClr val="000000"/>
+                </a:buClr>
+              </a:pPr>
+              <a:r>
+                <a:rPr lang="es-CO" sz="1588" kern="0">
+                  <a:solidFill>
+                    <a:srgbClr val="C00000"/>
+                  </a:solidFill>
+                  <a:latin typeface="Flama Condensed Light" panose="02000000000000000000"/>
+                  <a:ea typeface="Calibri"/>
+                  <a:cs typeface="Calibri"/>
+                  <a:sym typeface="Calibri"/>
+                </a:rPr>
+                <a:t>Clase 2</a:t>
+              </a:r>
+              <a:endParaRPr sz="1588" kern="0">
+                <a:solidFill>
+                  <a:srgbClr val="C00000"/>
+                </a:solidFill>
+                <a:latin typeface="Flama Condensed Light" panose="02000000000000000000"/>
+                <a:ea typeface="Calibri"/>
+                <a:cs typeface="Calibri"/>
+                <a:sym typeface="Calibri"/>
+              </a:endParaRPr>
+            </a:p>
+          </p:txBody>
+        </p:sp>
+        <p:cxnSp>
+          <p:nvCxnSpPr>
+            <p:cNvPr id="107" name="Google Shape;107;p15"/>
+            <p:cNvCxnSpPr>
+              <a:stCxn id="105" idx="3"/>
+              <a:endCxn id="106" idx="1"/>
+            </p:cNvCxnSpPr>
+            <p:nvPr/>
+          </p:nvCxnSpPr>
+          <p:spPr>
+            <a:xfrm>
+              <a:off x="2011308" y="2583180"/>
+              <a:ext cx="1902600" cy="0"/>
+            </a:xfrm>
+            <a:prstGeom prst="straightConnector1">
+              <a:avLst/>
+            </a:prstGeom>
             <a:noFill/>
-          </a:ln>
-        </p:spPr>
-        <p:txBody>
-          <a:bodyPr spcFirstLastPara="1" wrap="square" lIns="80669" tIns="40324" rIns="80669" bIns="40324" anchor="t" anchorCtr="0">
-            <a:noAutofit/>
-          </a:bodyPr>
-          <a:lstStyle/>
-          <a:p>
-            <a:pPr defTabSz="806867">
-              <a:buClr>
-                <a:srgbClr val="000000"/>
-              </a:buClr>
-            </a:pPr>
-            <a:r>
-              <a:rPr lang="es-CO" sz="1765" kern="0">
-                <a:solidFill>
+            <a:ln w="9525" cap="flat" cmpd="sng">
+              <a:solidFill>
+                <a:schemeClr val="accent1"/>
+              </a:solidFill>
+              <a:prstDash val="solid"/>
+              <a:miter lim="800000"/>
+              <a:headEnd type="none" w="sm" len="sm"/>
+              <a:tailEnd type="arrow" w="sm" len="sm"/>
+            </a:ln>
+          </p:spPr>
+        </p:cxnSp>
+        <p:sp>
+          <p:nvSpPr>
+            <p:cNvPr id="108" name="Google Shape;108;p15"/>
+            <p:cNvSpPr txBox="1"/>
+            <p:nvPr/>
+          </p:nvSpPr>
+          <p:spPr>
+            <a:xfrm>
+              <a:off x="2397892" y="2211218"/>
+              <a:ext cx="1185000" cy="369300"/>
+            </a:xfrm>
+            <a:prstGeom prst="rect">
+              <a:avLst/>
+            </a:prstGeom>
+            <a:noFill/>
+            <a:ln>
+              <a:noFill/>
+            </a:ln>
+          </p:spPr>
+          <p:txBody>
+            <a:bodyPr spcFirstLastPara="1" wrap="square" lIns="80669" tIns="40324" rIns="80669" bIns="40324" anchor="t" anchorCtr="0">
+              <a:noAutofit/>
+            </a:bodyPr>
+            <a:lstStyle/>
+            <a:p>
+              <a:pPr defTabSz="806886">
+                <a:buClr>
                   <a:srgbClr val="000000"/>
-                </a:solidFill>
-                <a:latin typeface="Calibri"/>
-                <a:ea typeface="Calibri"/>
-                <a:cs typeface="Calibri"/>
-                <a:sym typeface="Calibri"/>
-              </a:rPr>
-              <a:t>“Es – Un”</a:t>
-            </a:r>
-            <a:endParaRPr sz="1765" kern="0">
+                </a:buClr>
+              </a:pPr>
+              <a:r>
+                <a:rPr lang="es-CO" sz="1588" kern="0">
+                  <a:solidFill>
+                    <a:srgbClr val="000000"/>
+                  </a:solidFill>
+                  <a:latin typeface="Flama Condensed Light" panose="02000000000000000000"/>
+                  <a:ea typeface="Calibri"/>
+                  <a:cs typeface="Calibri"/>
+                  <a:sym typeface="Calibri"/>
+                </a:rPr>
+                <a:t>Asociación</a:t>
+              </a:r>
+              <a:endParaRPr sz="1588" kern="0">
+                <a:solidFill>
+                  <a:srgbClr val="000000"/>
+                </a:solidFill>
+                <a:latin typeface="Flama Condensed Light" panose="02000000000000000000"/>
+                <a:ea typeface="Calibri"/>
+                <a:cs typeface="Calibri"/>
+                <a:sym typeface="Calibri"/>
+              </a:endParaRPr>
+            </a:p>
+          </p:txBody>
+        </p:sp>
+        <p:sp>
+          <p:nvSpPr>
+            <p:cNvPr id="2" name="CuadroTexto 1">
+              <a:extLst>
+                <a:ext uri="{FF2B5EF4-FFF2-40B4-BE49-F238E27FC236}">
+                  <a16:creationId xmlns:a16="http://schemas.microsoft.com/office/drawing/2014/main" id="{A3A72C1E-E83F-4257-9F6B-E22081569B7F}"/>
+                </a:ext>
+              </a:extLst>
+            </p:cNvPr>
+            <p:cNvSpPr txBox="1"/>
+            <p:nvPr/>
+          </p:nvSpPr>
+          <p:spPr>
+            <a:xfrm>
+              <a:off x="949960" y="2928878"/>
+              <a:ext cx="4538426" cy="935475"/>
+            </a:xfrm>
+            <a:prstGeom prst="rect">
+              <a:avLst/>
+            </a:prstGeom>
+            <a:noFill/>
+          </p:spPr>
+          <p:txBody>
+            <a:bodyPr wrap="none" rtlCol="0">
+              <a:spAutoFit/>
+            </a:bodyPr>
+            <a:lstStyle/>
+            <a:p>
+              <a:r>
+                <a:rPr lang="es-ES" sz="1588" dirty="0">
+                  <a:latin typeface="Flama Condensed Light" panose="02000000000000000000"/>
+                </a:rPr>
+                <a:t>Un objeto usa o interactúa con otra. </a:t>
+              </a:r>
+            </a:p>
+            <a:p>
+              <a:r>
+                <a:rPr lang="es-ES" sz="1588" dirty="0">
+                  <a:latin typeface="Flama Condensed Light" panose="02000000000000000000"/>
+                </a:rPr>
+                <a:t>La flecha apunta al objeto que utiliza.</a:t>
+              </a:r>
+            </a:p>
+            <a:p>
+              <a:r>
+                <a:rPr lang="es-ES" sz="1588" dirty="0">
+                  <a:latin typeface="Flama Condensed Light" panose="02000000000000000000"/>
+                </a:rPr>
+                <a:t>Se usa para representar un atributo tipo clase.</a:t>
+              </a:r>
+              <a:endParaRPr lang="es-419" sz="1588" dirty="0">
+                <a:latin typeface="Flama Condensed Light" panose="02000000000000000000"/>
+              </a:endParaRPr>
+            </a:p>
+          </p:txBody>
+        </p:sp>
+        <p:sp>
+          <p:nvSpPr>
+            <p:cNvPr id="26" name="Google Shape;105;p15">
+              <a:extLst>
+                <a:ext uri="{FF2B5EF4-FFF2-40B4-BE49-F238E27FC236}">
+                  <a16:creationId xmlns:a16="http://schemas.microsoft.com/office/drawing/2014/main" id="{92D639A5-2793-4797-BE68-11BB309C3E66}"/>
+                </a:ext>
+              </a:extLst>
+            </p:cNvPr>
+            <p:cNvSpPr/>
+            <p:nvPr/>
+          </p:nvSpPr>
+          <p:spPr>
+            <a:xfrm>
+              <a:off x="414122" y="4359312"/>
+              <a:ext cx="1466100" cy="523200"/>
+            </a:xfrm>
+            <a:prstGeom prst="rect">
+              <a:avLst/>
+            </a:prstGeom>
+            <a:solidFill>
+              <a:schemeClr val="lt1"/>
+            </a:solidFill>
+            <a:ln w="12700" cap="flat" cmpd="sng">
               <a:solidFill>
-                <a:srgbClr val="000000"/>
+                <a:srgbClr val="42719B"/>
               </a:solidFill>
-              <a:latin typeface="Calibri"/>
-              <a:ea typeface="Calibri"/>
-              <a:cs typeface="Calibri"/>
-              <a:sym typeface="Calibri"/>
-            </a:endParaRPr>
-          </a:p>
-        </p:txBody>
-      </p:sp>
-      <p:sp>
-        <p:nvSpPr>
-          <p:cNvPr id="100" name="Google Shape;100;p15"/>
-          <p:cNvSpPr txBox="1"/>
+              <a:prstDash val="solid"/>
+              <a:miter lim="800000"/>
+              <a:headEnd type="none" w="sm" len="sm"/>
+              <a:tailEnd type="none" w="sm" len="sm"/>
+            </a:ln>
+          </p:spPr>
+          <p:txBody>
+            <a:bodyPr spcFirstLastPara="1" wrap="square" lIns="80669" tIns="40324" rIns="80669" bIns="40324" anchor="ctr" anchorCtr="0">
+              <a:noAutofit/>
+            </a:bodyPr>
+            <a:lstStyle/>
+            <a:p>
+              <a:pPr algn="ctr" defTabSz="806886">
+                <a:buClr>
+                  <a:srgbClr val="000000"/>
+                </a:buClr>
+              </a:pPr>
+              <a:r>
+                <a:rPr lang="es-CO" sz="1588" kern="0">
+                  <a:solidFill>
+                    <a:srgbClr val="C00000"/>
+                  </a:solidFill>
+                  <a:latin typeface="Flama Condensed Light" panose="02000000000000000000"/>
+                  <a:ea typeface="Calibri"/>
+                  <a:cs typeface="Calibri"/>
+                  <a:sym typeface="Calibri"/>
+                </a:rPr>
+                <a:t>Clase 1</a:t>
+              </a:r>
+              <a:endParaRPr sz="1588" kern="0">
+                <a:solidFill>
+                  <a:srgbClr val="C00000"/>
+                </a:solidFill>
+                <a:latin typeface="Flama Condensed Light" panose="02000000000000000000"/>
+                <a:ea typeface="Calibri"/>
+                <a:cs typeface="Calibri"/>
+                <a:sym typeface="Calibri"/>
+              </a:endParaRPr>
+            </a:p>
+          </p:txBody>
+        </p:sp>
+        <p:sp>
+          <p:nvSpPr>
+            <p:cNvPr id="27" name="Google Shape;106;p15">
+              <a:extLst>
+                <a:ext uri="{FF2B5EF4-FFF2-40B4-BE49-F238E27FC236}">
+                  <a16:creationId xmlns:a16="http://schemas.microsoft.com/office/drawing/2014/main" id="{9717C372-1CE2-46D3-8F4D-F03369A69426}"/>
+                </a:ext>
+              </a:extLst>
+            </p:cNvPr>
+            <p:cNvSpPr/>
+            <p:nvPr/>
+          </p:nvSpPr>
+          <p:spPr>
+            <a:xfrm>
+              <a:off x="3782688" y="4359312"/>
+              <a:ext cx="1466100" cy="523200"/>
+            </a:xfrm>
+            <a:prstGeom prst="rect">
+              <a:avLst/>
+            </a:prstGeom>
+            <a:solidFill>
+              <a:schemeClr val="lt1"/>
+            </a:solidFill>
+            <a:ln w="12700" cap="flat" cmpd="sng">
+              <a:solidFill>
+                <a:srgbClr val="42719B"/>
+              </a:solidFill>
+              <a:prstDash val="solid"/>
+              <a:miter lim="800000"/>
+              <a:headEnd type="none" w="sm" len="sm"/>
+              <a:tailEnd type="none" w="sm" len="sm"/>
+            </a:ln>
+          </p:spPr>
+          <p:txBody>
+            <a:bodyPr spcFirstLastPara="1" wrap="square" lIns="80669" tIns="40324" rIns="80669" bIns="40324" anchor="ctr" anchorCtr="0">
+              <a:noAutofit/>
+            </a:bodyPr>
+            <a:lstStyle/>
+            <a:p>
+              <a:pPr algn="ctr" defTabSz="806886">
+                <a:buClr>
+                  <a:srgbClr val="000000"/>
+                </a:buClr>
+              </a:pPr>
+              <a:r>
+                <a:rPr lang="es-CO" sz="1588" kern="0">
+                  <a:solidFill>
+                    <a:srgbClr val="C00000"/>
+                  </a:solidFill>
+                  <a:latin typeface="Flama Condensed Light" panose="02000000000000000000"/>
+                  <a:ea typeface="Calibri"/>
+                  <a:cs typeface="Calibri"/>
+                  <a:sym typeface="Calibri"/>
+                </a:rPr>
+                <a:t>Clase 2</a:t>
+              </a:r>
+              <a:endParaRPr sz="1588" kern="0">
+                <a:solidFill>
+                  <a:srgbClr val="C00000"/>
+                </a:solidFill>
+                <a:latin typeface="Flama Condensed Light" panose="02000000000000000000"/>
+                <a:ea typeface="Calibri"/>
+                <a:cs typeface="Calibri"/>
+                <a:sym typeface="Calibri"/>
+              </a:endParaRPr>
+            </a:p>
+          </p:txBody>
+        </p:sp>
+        <p:cxnSp>
+          <p:nvCxnSpPr>
+            <p:cNvPr id="28" name="Google Shape;107;p15">
+              <a:extLst>
+                <a:ext uri="{FF2B5EF4-FFF2-40B4-BE49-F238E27FC236}">
+                  <a16:creationId xmlns:a16="http://schemas.microsoft.com/office/drawing/2014/main" id="{D291748D-F698-45EF-9BC1-D08B622DA135}"/>
+                </a:ext>
+              </a:extLst>
+            </p:cNvPr>
+            <p:cNvCxnSpPr>
+              <a:stCxn id="26" idx="3"/>
+              <a:endCxn id="27" idx="1"/>
+            </p:cNvCxnSpPr>
+            <p:nvPr/>
+          </p:nvCxnSpPr>
+          <p:spPr>
+            <a:xfrm>
+              <a:off x="1880222" y="4620912"/>
+              <a:ext cx="1902600" cy="0"/>
+            </a:xfrm>
+            <a:prstGeom prst="straightConnector1">
+              <a:avLst/>
+            </a:prstGeom>
+            <a:noFill/>
+            <a:ln w="9525" cap="flat" cmpd="sng">
+              <a:solidFill>
+                <a:schemeClr val="accent1"/>
+              </a:solidFill>
+              <a:prstDash val="dash"/>
+              <a:miter lim="800000"/>
+              <a:headEnd type="none" w="sm" len="sm"/>
+              <a:tailEnd type="arrow" w="sm" len="sm"/>
+            </a:ln>
+          </p:spPr>
+        </p:cxnSp>
+        <p:sp>
+          <p:nvSpPr>
+            <p:cNvPr id="29" name="Google Shape;108;p15">
+              <a:extLst>
+                <a:ext uri="{FF2B5EF4-FFF2-40B4-BE49-F238E27FC236}">
+                  <a16:creationId xmlns:a16="http://schemas.microsoft.com/office/drawing/2014/main" id="{C34794FC-AACD-49C8-9201-3CAF68164DC0}"/>
+                </a:ext>
+              </a:extLst>
+            </p:cNvPr>
+            <p:cNvSpPr txBox="1"/>
+            <p:nvPr/>
+          </p:nvSpPr>
+          <p:spPr>
+            <a:xfrm>
+              <a:off x="2064297" y="4197906"/>
+              <a:ext cx="1584336" cy="420344"/>
+            </a:xfrm>
+            <a:prstGeom prst="rect">
+              <a:avLst/>
+            </a:prstGeom>
+            <a:noFill/>
+            <a:ln>
+              <a:noFill/>
+            </a:ln>
+          </p:spPr>
+          <p:txBody>
+            <a:bodyPr spcFirstLastPara="1" wrap="square" lIns="80669" tIns="40324" rIns="80669" bIns="40324" anchor="t" anchorCtr="0">
+              <a:noAutofit/>
+            </a:bodyPr>
+            <a:lstStyle/>
+            <a:p>
+              <a:pPr defTabSz="806886">
+                <a:buClr>
+                  <a:srgbClr val="000000"/>
+                </a:buClr>
+              </a:pPr>
+              <a:r>
+                <a:rPr lang="es-CO" sz="1588" kern="0" dirty="0">
+                  <a:solidFill>
+                    <a:srgbClr val="000000"/>
+                  </a:solidFill>
+                  <a:latin typeface="Flama Condensed Light" panose="02000000000000000000"/>
+                  <a:ea typeface="Calibri"/>
+                  <a:cs typeface="Calibri"/>
+                  <a:sym typeface="Calibri"/>
+                </a:rPr>
+                <a:t>Dependencia</a:t>
+              </a:r>
+              <a:endParaRPr sz="1588" kern="0" dirty="0">
+                <a:solidFill>
+                  <a:srgbClr val="000000"/>
+                </a:solidFill>
+                <a:latin typeface="Flama Condensed Light" panose="02000000000000000000"/>
+                <a:ea typeface="Calibri"/>
+                <a:cs typeface="Calibri"/>
+                <a:sym typeface="Calibri"/>
+              </a:endParaRPr>
+            </a:p>
+          </p:txBody>
+        </p:sp>
+        <p:sp>
+          <p:nvSpPr>
+            <p:cNvPr id="30" name="CuadroTexto 29">
+              <a:extLst>
+                <a:ext uri="{FF2B5EF4-FFF2-40B4-BE49-F238E27FC236}">
+                  <a16:creationId xmlns:a16="http://schemas.microsoft.com/office/drawing/2014/main" id="{34113802-698E-4F6E-AF86-2D74420C7B88}"/>
+                </a:ext>
+              </a:extLst>
+            </p:cNvPr>
+            <p:cNvSpPr txBox="1"/>
+            <p:nvPr/>
+          </p:nvSpPr>
+          <p:spPr>
+            <a:xfrm>
+              <a:off x="515060" y="4982860"/>
+              <a:ext cx="4801200" cy="1212417"/>
+            </a:xfrm>
+            <a:prstGeom prst="rect">
+              <a:avLst/>
+            </a:prstGeom>
+            <a:noFill/>
+          </p:spPr>
+          <p:txBody>
+            <a:bodyPr wrap="square" rtlCol="0">
+              <a:spAutoFit/>
+            </a:bodyPr>
+            <a:lstStyle/>
+            <a:p>
+              <a:r>
+                <a:rPr lang="es-ES" sz="1588" dirty="0">
+                  <a:latin typeface="Flama Condensed Light" panose="02000000000000000000"/>
+                </a:rPr>
+                <a:t>Un tipo de asociación más débil. Quiere decir que no hay una relación permanente.</a:t>
+              </a:r>
+            </a:p>
+            <a:p>
+              <a:r>
+                <a:rPr lang="es-ES" sz="1588" dirty="0">
+                  <a:latin typeface="Flama Condensed Light" panose="02000000000000000000"/>
+                </a:rPr>
+                <a:t>Algunas veces implica que una clase tiene como parámetro de un método a la otra clase</a:t>
+              </a:r>
+            </a:p>
+          </p:txBody>
+        </p:sp>
+      </p:grpSp>
+      <p:grpSp>
+        <p:nvGrpSpPr>
+          <p:cNvPr id="14" name="Grupo 13">
+            <a:extLst>
+              <a:ext uri="{FF2B5EF4-FFF2-40B4-BE49-F238E27FC236}">
+                <a16:creationId xmlns:a16="http://schemas.microsoft.com/office/drawing/2014/main" id="{3347FA9D-DE52-47FA-B9FA-6F9AFF45F07F}"/>
+              </a:ext>
+            </a:extLst>
+          </p:cNvPr>
+          <p:cNvGrpSpPr/>
           <p:nvPr/>
-        </p:nvSpPr>
-        <p:spPr>
+        </p:nvGrpSpPr>
+        <p:grpSpPr>
           <a:xfrm>
-            <a:off x="8738671" y="2454051"/>
-            <a:ext cx="1834676" cy="461647"/>
+            <a:off x="6599188" y="1372330"/>
+            <a:ext cx="4640480" cy="3040817"/>
+            <a:chOff x="7479080" y="1555307"/>
+            <a:chExt cx="5259210" cy="3446260"/>
           </a:xfrm>
-          <a:prstGeom prst="rect">
-            <a:avLst/>
-          </a:prstGeom>
-          <a:noFill/>
-          <a:ln>
+        </p:grpSpPr>
+        <p:sp>
+          <p:nvSpPr>
+            <p:cNvPr id="100" name="Google Shape;100;p15"/>
+            <p:cNvSpPr txBox="1"/>
+            <p:nvPr/>
+          </p:nvSpPr>
+          <p:spPr>
+            <a:xfrm>
+              <a:off x="8781829" y="1555307"/>
+              <a:ext cx="3092909" cy="523200"/>
+            </a:xfrm>
+            <a:prstGeom prst="rect">
+              <a:avLst/>
+            </a:prstGeom>
             <a:noFill/>
-          </a:ln>
-        </p:spPr>
-        <p:txBody>
-          <a:bodyPr spcFirstLastPara="1" wrap="square" lIns="80669" tIns="40324" rIns="80669" bIns="40324" anchor="t" anchorCtr="0">
-            <a:noAutofit/>
-          </a:bodyPr>
-          <a:lstStyle/>
-          <a:p>
-            <a:pPr defTabSz="806867">
-              <a:buClr>
-                <a:srgbClr val="000000"/>
-              </a:buClr>
-            </a:pPr>
-            <a:r>
-              <a:rPr lang="es-CO" sz="2471" kern="0">
-                <a:solidFill>
+            <a:ln>
+              <a:noFill/>
+            </a:ln>
+          </p:spPr>
+          <p:txBody>
+            <a:bodyPr spcFirstLastPara="1" wrap="square" lIns="80669" tIns="40324" rIns="80669" bIns="40324" anchor="t" anchorCtr="0">
+              <a:noAutofit/>
+            </a:bodyPr>
+            <a:lstStyle/>
+            <a:p>
+              <a:pPr algn="ctr" defTabSz="806886">
+                <a:buClr>
                   <a:srgbClr val="000000"/>
-                </a:solidFill>
-                <a:latin typeface="Calibri"/>
-                <a:ea typeface="Calibri"/>
-                <a:cs typeface="Calibri"/>
-                <a:sym typeface="Calibri"/>
-              </a:rPr>
-              <a:t>Todo - Partes</a:t>
-            </a:r>
-            <a:endParaRPr sz="2471" kern="0">
+                </a:buClr>
+              </a:pPr>
+              <a:r>
+                <a:rPr lang="es-CO" sz="2471" kern="0" dirty="0">
+                  <a:solidFill>
+                    <a:srgbClr val="000000"/>
+                  </a:solidFill>
+                  <a:latin typeface="Flama Condensed Light" panose="02000000000000000000"/>
+                  <a:ea typeface="Calibri"/>
+                  <a:cs typeface="Calibri"/>
+                  <a:sym typeface="Calibri"/>
+                </a:rPr>
+                <a:t>Todo – Partes</a:t>
+              </a:r>
+            </a:p>
+            <a:p>
+              <a:pPr algn="ctr" defTabSz="806886">
+                <a:buClr>
+                  <a:srgbClr val="000000"/>
+                </a:buClr>
+              </a:pPr>
+              <a:r>
+                <a:rPr lang="es-CO" sz="1588" kern="0" dirty="0">
+                  <a:solidFill>
+                    <a:srgbClr val="000000"/>
+                  </a:solidFill>
+                  <a:latin typeface="Flama Condensed Light" panose="02000000000000000000"/>
+                  <a:ea typeface="Calibri"/>
+                  <a:cs typeface="Calibri"/>
+                  <a:sym typeface="Calibri"/>
+                </a:rPr>
+                <a:t>“Es parte de”</a:t>
+              </a:r>
+              <a:endParaRPr sz="1588" kern="0" dirty="0">
+                <a:solidFill>
+                  <a:srgbClr val="000000"/>
+                </a:solidFill>
+                <a:latin typeface="Flama Condensed Light" panose="02000000000000000000"/>
+                <a:ea typeface="Calibri"/>
+                <a:cs typeface="Calibri"/>
+                <a:sym typeface="Calibri"/>
+              </a:endParaRPr>
+            </a:p>
+          </p:txBody>
+        </p:sp>
+        <p:sp>
+          <p:nvSpPr>
+            <p:cNvPr id="101" name="Google Shape;101;p15"/>
+            <p:cNvSpPr txBox="1"/>
+            <p:nvPr/>
+          </p:nvSpPr>
+          <p:spPr>
+            <a:xfrm>
+              <a:off x="9451623" y="2414160"/>
+              <a:ext cx="1362000" cy="498875"/>
+            </a:xfrm>
+            <a:prstGeom prst="rect">
+              <a:avLst/>
+            </a:prstGeom>
+            <a:noFill/>
+            <a:ln>
+              <a:noFill/>
+            </a:ln>
+          </p:spPr>
+          <p:txBody>
+            <a:bodyPr spcFirstLastPara="1" wrap="square" lIns="80669" tIns="40324" rIns="80669" bIns="40324" anchor="t" anchorCtr="0">
+              <a:noAutofit/>
+            </a:bodyPr>
+            <a:lstStyle/>
+            <a:p>
+              <a:pPr defTabSz="806886">
+                <a:buClr>
+                  <a:srgbClr val="000000"/>
+                </a:buClr>
+              </a:pPr>
+              <a:r>
+                <a:rPr lang="es-CO" sz="1765" kern="0" dirty="0">
+                  <a:solidFill>
+                    <a:srgbClr val="000000"/>
+                  </a:solidFill>
+                  <a:latin typeface="Flama Condensed Light" panose="02000000000000000000"/>
+                  <a:ea typeface="Calibri"/>
+                  <a:cs typeface="Calibri"/>
+                  <a:sym typeface="Calibri"/>
+                </a:rPr>
+                <a:t>Agregación</a:t>
+              </a:r>
+              <a:endParaRPr sz="1765" kern="0" dirty="0">
+                <a:solidFill>
+                  <a:srgbClr val="000000"/>
+                </a:solidFill>
+                <a:latin typeface="Flama Condensed Light" panose="02000000000000000000"/>
+                <a:ea typeface="Calibri"/>
+                <a:cs typeface="Calibri"/>
+                <a:sym typeface="Calibri"/>
+              </a:endParaRPr>
+            </a:p>
+          </p:txBody>
+        </p:sp>
+        <p:sp>
+          <p:nvSpPr>
+            <p:cNvPr id="102" name="Google Shape;102;p15"/>
+            <p:cNvSpPr txBox="1"/>
+            <p:nvPr/>
+          </p:nvSpPr>
+          <p:spPr>
+            <a:xfrm>
+              <a:off x="9429789" y="3682587"/>
+              <a:ext cx="1527900" cy="400200"/>
+            </a:xfrm>
+            <a:prstGeom prst="rect">
+              <a:avLst/>
+            </a:prstGeom>
+            <a:noFill/>
+            <a:ln>
+              <a:noFill/>
+            </a:ln>
+          </p:spPr>
+          <p:txBody>
+            <a:bodyPr spcFirstLastPara="1" wrap="square" lIns="80669" tIns="40324" rIns="80669" bIns="40324" anchor="t" anchorCtr="0">
+              <a:noAutofit/>
+            </a:bodyPr>
+            <a:lstStyle/>
+            <a:p>
+              <a:pPr defTabSz="806886">
+                <a:buClr>
+                  <a:srgbClr val="000000"/>
+                </a:buClr>
+              </a:pPr>
+              <a:r>
+                <a:rPr lang="es-CO" sz="1765" kern="0" dirty="0">
+                  <a:solidFill>
+                    <a:srgbClr val="000000"/>
+                  </a:solidFill>
+                  <a:latin typeface="Flama Condensed Light" panose="02000000000000000000"/>
+                  <a:ea typeface="Calibri"/>
+                  <a:cs typeface="Calibri"/>
+                  <a:sym typeface="Calibri"/>
+                </a:rPr>
+                <a:t>Composición</a:t>
+              </a:r>
+              <a:endParaRPr sz="1765" kern="0" dirty="0">
+                <a:solidFill>
+                  <a:srgbClr val="000000"/>
+                </a:solidFill>
+                <a:latin typeface="Flama Condensed Light" panose="02000000000000000000"/>
+                <a:ea typeface="Calibri"/>
+                <a:cs typeface="Calibri"/>
+                <a:sym typeface="Calibri"/>
+              </a:endParaRPr>
+            </a:p>
+          </p:txBody>
+        </p:sp>
+        <p:sp>
+          <p:nvSpPr>
+            <p:cNvPr id="109" name="Google Shape;109;p15"/>
+            <p:cNvSpPr/>
+            <p:nvPr/>
+          </p:nvSpPr>
+          <p:spPr>
+            <a:xfrm>
+              <a:off x="7479080" y="2627274"/>
+              <a:ext cx="1466100" cy="523200"/>
+            </a:xfrm>
+            <a:prstGeom prst="rect">
+              <a:avLst/>
+            </a:prstGeom>
+            <a:solidFill>
+              <a:schemeClr val="lt1"/>
+            </a:solidFill>
+            <a:ln w="12700" cap="flat" cmpd="sng">
               <a:solidFill>
-                <a:srgbClr val="000000"/>
+                <a:srgbClr val="42719B"/>
               </a:solidFill>
-              <a:latin typeface="Calibri"/>
-              <a:ea typeface="Calibri"/>
-              <a:cs typeface="Calibri"/>
-              <a:sym typeface="Calibri"/>
-            </a:endParaRPr>
-          </a:p>
-        </p:txBody>
-      </p:sp>
-      <p:sp>
-        <p:nvSpPr>
-          <p:cNvPr id="101" name="Google Shape;101;p15"/>
-          <p:cNvSpPr txBox="1"/>
+              <a:prstDash val="solid"/>
+              <a:miter lim="800000"/>
+              <a:headEnd type="none" w="sm" len="sm"/>
+              <a:tailEnd type="none" w="sm" len="sm"/>
+            </a:ln>
+          </p:spPr>
+          <p:txBody>
+            <a:bodyPr spcFirstLastPara="1" wrap="square" lIns="80669" tIns="40324" rIns="80669" bIns="40324" anchor="ctr" anchorCtr="0">
+              <a:noAutofit/>
+            </a:bodyPr>
+            <a:lstStyle/>
+            <a:p>
+              <a:pPr algn="ctr" defTabSz="806886">
+                <a:buClr>
+                  <a:srgbClr val="000000"/>
+                </a:buClr>
+              </a:pPr>
+              <a:r>
+                <a:rPr lang="es-CO" sz="1588" kern="0">
+                  <a:solidFill>
+                    <a:srgbClr val="C00000"/>
+                  </a:solidFill>
+                  <a:latin typeface="Flama Condensed Light" panose="02000000000000000000"/>
+                  <a:ea typeface="Calibri"/>
+                  <a:cs typeface="Calibri"/>
+                  <a:sym typeface="Calibri"/>
+                </a:rPr>
+                <a:t>Clase 1</a:t>
+              </a:r>
+              <a:endParaRPr sz="1588" kern="0">
+                <a:solidFill>
+                  <a:srgbClr val="C00000"/>
+                </a:solidFill>
+                <a:latin typeface="Flama Condensed Light" panose="02000000000000000000"/>
+                <a:ea typeface="Calibri"/>
+                <a:cs typeface="Calibri"/>
+                <a:sym typeface="Calibri"/>
+              </a:endParaRPr>
+            </a:p>
+          </p:txBody>
+        </p:sp>
+        <p:sp>
+          <p:nvSpPr>
+            <p:cNvPr id="110" name="Google Shape;110;p15"/>
+            <p:cNvSpPr/>
+            <p:nvPr/>
+          </p:nvSpPr>
+          <p:spPr>
+            <a:xfrm>
+              <a:off x="11141688" y="2663598"/>
+              <a:ext cx="1466100" cy="523200"/>
+            </a:xfrm>
+            <a:prstGeom prst="rect">
+              <a:avLst/>
+            </a:prstGeom>
+            <a:solidFill>
+              <a:schemeClr val="lt1"/>
+            </a:solidFill>
+            <a:ln w="12700" cap="flat" cmpd="sng">
+              <a:solidFill>
+                <a:srgbClr val="42719B"/>
+              </a:solidFill>
+              <a:prstDash val="solid"/>
+              <a:miter lim="800000"/>
+              <a:headEnd type="none" w="sm" len="sm"/>
+              <a:tailEnd type="none" w="sm" len="sm"/>
+            </a:ln>
+          </p:spPr>
+          <p:txBody>
+            <a:bodyPr spcFirstLastPara="1" wrap="square" lIns="80669" tIns="40324" rIns="80669" bIns="40324" anchor="ctr" anchorCtr="0">
+              <a:noAutofit/>
+            </a:bodyPr>
+            <a:lstStyle/>
+            <a:p>
+              <a:pPr algn="ctr" defTabSz="806886">
+                <a:buClr>
+                  <a:srgbClr val="000000"/>
+                </a:buClr>
+              </a:pPr>
+              <a:r>
+                <a:rPr lang="es-CO" sz="1588" kern="0">
+                  <a:solidFill>
+                    <a:srgbClr val="C00000"/>
+                  </a:solidFill>
+                  <a:latin typeface="Flama Condensed Light" panose="02000000000000000000"/>
+                  <a:ea typeface="Calibri"/>
+                  <a:cs typeface="Calibri"/>
+                  <a:sym typeface="Calibri"/>
+                </a:rPr>
+                <a:t>Clase 2</a:t>
+              </a:r>
+              <a:endParaRPr sz="1588" kern="0">
+                <a:solidFill>
+                  <a:srgbClr val="C00000"/>
+                </a:solidFill>
+                <a:latin typeface="Flama Condensed Light" panose="02000000000000000000"/>
+                <a:ea typeface="Calibri"/>
+                <a:cs typeface="Calibri"/>
+                <a:sym typeface="Calibri"/>
+              </a:endParaRPr>
+            </a:p>
+          </p:txBody>
+        </p:sp>
+        <p:sp>
+          <p:nvSpPr>
+            <p:cNvPr id="111" name="Google Shape;111;p15"/>
+            <p:cNvSpPr/>
+            <p:nvPr/>
+          </p:nvSpPr>
+          <p:spPr>
+            <a:xfrm>
+              <a:off x="8977038" y="2772687"/>
+              <a:ext cx="268014" cy="305023"/>
+            </a:xfrm>
+            <a:prstGeom prst="flowChartDecision">
+              <a:avLst/>
+            </a:prstGeom>
+            <a:solidFill>
+              <a:schemeClr val="lt1"/>
+            </a:solidFill>
+            <a:ln w="12700" cap="flat" cmpd="sng">
+              <a:solidFill>
+                <a:srgbClr val="42719B"/>
+              </a:solidFill>
+              <a:prstDash val="solid"/>
+              <a:miter lim="800000"/>
+              <a:headEnd type="none" w="sm" len="sm"/>
+              <a:tailEnd type="none" w="sm" len="sm"/>
+            </a:ln>
+          </p:spPr>
+          <p:txBody>
+            <a:bodyPr spcFirstLastPara="1" wrap="square" lIns="80669" tIns="40324" rIns="80669" bIns="40324" anchor="ctr" anchorCtr="0">
+              <a:noAutofit/>
+            </a:bodyPr>
+            <a:lstStyle/>
+            <a:p>
+              <a:pPr algn="ctr" defTabSz="806886">
+                <a:buClr>
+                  <a:srgbClr val="000000"/>
+                </a:buClr>
+              </a:pPr>
+              <a:endParaRPr sz="1588" kern="0">
+                <a:solidFill>
+                  <a:srgbClr val="FFFFFF"/>
+                </a:solidFill>
+                <a:latin typeface="Flama Condensed Light" panose="02000000000000000000"/>
+                <a:ea typeface="Calibri"/>
+                <a:cs typeface="Calibri"/>
+                <a:sym typeface="Calibri"/>
+              </a:endParaRPr>
+            </a:p>
+          </p:txBody>
+        </p:sp>
+        <p:sp>
+          <p:nvSpPr>
+            <p:cNvPr id="40" name="Google Shape;109;p15">
+              <a:extLst>
+                <a:ext uri="{FF2B5EF4-FFF2-40B4-BE49-F238E27FC236}">
+                  <a16:creationId xmlns:a16="http://schemas.microsoft.com/office/drawing/2014/main" id="{5FB114F5-EEF4-42E8-8E57-0331F12792E4}"/>
+                </a:ext>
+              </a:extLst>
+            </p:cNvPr>
+            <p:cNvSpPr/>
+            <p:nvPr/>
+          </p:nvSpPr>
+          <p:spPr>
+            <a:xfrm>
+              <a:off x="7510938" y="3861118"/>
+              <a:ext cx="1466100" cy="523200"/>
+            </a:xfrm>
+            <a:prstGeom prst="rect">
+              <a:avLst/>
+            </a:prstGeom>
+            <a:solidFill>
+              <a:schemeClr val="lt1"/>
+            </a:solidFill>
+            <a:ln w="12700" cap="flat" cmpd="sng">
+              <a:solidFill>
+                <a:srgbClr val="42719B"/>
+              </a:solidFill>
+              <a:prstDash val="solid"/>
+              <a:miter lim="800000"/>
+              <a:headEnd type="none" w="sm" len="sm"/>
+              <a:tailEnd type="none" w="sm" len="sm"/>
+            </a:ln>
+          </p:spPr>
+          <p:txBody>
+            <a:bodyPr spcFirstLastPara="1" wrap="square" lIns="80669" tIns="40324" rIns="80669" bIns="40324" anchor="ctr" anchorCtr="0">
+              <a:noAutofit/>
+            </a:bodyPr>
+            <a:lstStyle/>
+            <a:p>
+              <a:pPr algn="ctr" defTabSz="806886">
+                <a:buClr>
+                  <a:srgbClr val="000000"/>
+                </a:buClr>
+              </a:pPr>
+              <a:r>
+                <a:rPr lang="es-CO" sz="1588" kern="0">
+                  <a:solidFill>
+                    <a:srgbClr val="C00000"/>
+                  </a:solidFill>
+                  <a:latin typeface="Flama Condensed Light" panose="02000000000000000000"/>
+                  <a:ea typeface="Calibri"/>
+                  <a:cs typeface="Calibri"/>
+                  <a:sym typeface="Calibri"/>
+                </a:rPr>
+                <a:t>Clase 1</a:t>
+              </a:r>
+              <a:endParaRPr sz="1588" kern="0">
+                <a:solidFill>
+                  <a:srgbClr val="C00000"/>
+                </a:solidFill>
+                <a:latin typeface="Flama Condensed Light" panose="02000000000000000000"/>
+                <a:ea typeface="Calibri"/>
+                <a:cs typeface="Calibri"/>
+                <a:sym typeface="Calibri"/>
+              </a:endParaRPr>
+            </a:p>
+          </p:txBody>
+        </p:sp>
+        <p:sp>
+          <p:nvSpPr>
+            <p:cNvPr id="41" name="Google Shape;110;p15">
+              <a:extLst>
+                <a:ext uri="{FF2B5EF4-FFF2-40B4-BE49-F238E27FC236}">
+                  <a16:creationId xmlns:a16="http://schemas.microsoft.com/office/drawing/2014/main" id="{AC1CA4D8-8837-4E89-9093-A963F9AE7FAA}"/>
+                </a:ext>
+              </a:extLst>
+            </p:cNvPr>
+            <p:cNvSpPr/>
+            <p:nvPr/>
+          </p:nvSpPr>
+          <p:spPr>
+            <a:xfrm>
+              <a:off x="11173546" y="3897442"/>
+              <a:ext cx="1466100" cy="523200"/>
+            </a:xfrm>
+            <a:prstGeom prst="rect">
+              <a:avLst/>
+            </a:prstGeom>
+            <a:solidFill>
+              <a:schemeClr val="lt1"/>
+            </a:solidFill>
+            <a:ln w="12700" cap="flat" cmpd="sng">
+              <a:solidFill>
+                <a:srgbClr val="42719B"/>
+              </a:solidFill>
+              <a:prstDash val="solid"/>
+              <a:miter lim="800000"/>
+              <a:headEnd type="none" w="sm" len="sm"/>
+              <a:tailEnd type="none" w="sm" len="sm"/>
+            </a:ln>
+          </p:spPr>
+          <p:txBody>
+            <a:bodyPr spcFirstLastPara="1" wrap="square" lIns="80669" tIns="40324" rIns="80669" bIns="40324" anchor="ctr" anchorCtr="0">
+              <a:noAutofit/>
+            </a:bodyPr>
+            <a:lstStyle/>
+            <a:p>
+              <a:pPr algn="ctr" defTabSz="806886">
+                <a:buClr>
+                  <a:srgbClr val="000000"/>
+                </a:buClr>
+              </a:pPr>
+              <a:r>
+                <a:rPr lang="es-CO" sz="1588" kern="0">
+                  <a:solidFill>
+                    <a:srgbClr val="C00000"/>
+                  </a:solidFill>
+                  <a:latin typeface="Flama Condensed Light" panose="02000000000000000000"/>
+                  <a:ea typeface="Calibri"/>
+                  <a:cs typeface="Calibri"/>
+                  <a:sym typeface="Calibri"/>
+                </a:rPr>
+                <a:t>Clase 2</a:t>
+              </a:r>
+              <a:endParaRPr sz="1588" kern="0">
+                <a:solidFill>
+                  <a:srgbClr val="C00000"/>
+                </a:solidFill>
+                <a:latin typeface="Flama Condensed Light" panose="02000000000000000000"/>
+                <a:ea typeface="Calibri"/>
+                <a:cs typeface="Calibri"/>
+                <a:sym typeface="Calibri"/>
+              </a:endParaRPr>
+            </a:p>
+          </p:txBody>
+        </p:sp>
+        <p:sp>
+          <p:nvSpPr>
+            <p:cNvPr id="42" name="Google Shape;111;p15">
+              <a:extLst>
+                <a:ext uri="{FF2B5EF4-FFF2-40B4-BE49-F238E27FC236}">
+                  <a16:creationId xmlns:a16="http://schemas.microsoft.com/office/drawing/2014/main" id="{53D88DCA-C930-4473-8DA5-E0CFFACC2F5F}"/>
+                </a:ext>
+              </a:extLst>
+            </p:cNvPr>
+            <p:cNvSpPr/>
+            <p:nvPr/>
+          </p:nvSpPr>
+          <p:spPr>
+            <a:xfrm>
+              <a:off x="9008896" y="4006531"/>
+              <a:ext cx="268014" cy="305023"/>
+            </a:xfrm>
+            <a:prstGeom prst="flowChartDecision">
+              <a:avLst/>
+            </a:prstGeom>
+            <a:solidFill>
+              <a:schemeClr val="accent1">
+                <a:lumMod val="50000"/>
+              </a:schemeClr>
+            </a:solidFill>
+            <a:ln w="12700" cap="flat" cmpd="sng">
+              <a:solidFill>
+                <a:srgbClr val="42719B"/>
+              </a:solidFill>
+              <a:prstDash val="solid"/>
+              <a:miter lim="800000"/>
+              <a:headEnd type="none" w="sm" len="sm"/>
+              <a:tailEnd type="none" w="sm" len="sm"/>
+            </a:ln>
+          </p:spPr>
+          <p:txBody>
+            <a:bodyPr spcFirstLastPara="1" wrap="square" lIns="80669" tIns="40324" rIns="80669" bIns="40324" anchor="ctr" anchorCtr="0">
+              <a:noAutofit/>
+            </a:bodyPr>
+            <a:lstStyle/>
+            <a:p>
+              <a:pPr algn="ctr" defTabSz="806886">
+                <a:buClr>
+                  <a:srgbClr val="000000"/>
+                </a:buClr>
+              </a:pPr>
+              <a:endParaRPr sz="1588" kern="0">
+                <a:solidFill>
+                  <a:srgbClr val="FFFFFF"/>
+                </a:solidFill>
+                <a:latin typeface="Flama Condensed Light" panose="02000000000000000000"/>
+                <a:ea typeface="Calibri"/>
+                <a:cs typeface="Calibri"/>
+                <a:sym typeface="Calibri"/>
+              </a:endParaRPr>
+            </a:p>
+          </p:txBody>
+        </p:sp>
+        <p:cxnSp>
+          <p:nvCxnSpPr>
+            <p:cNvPr id="43" name="Google Shape;112;p15">
+              <a:extLst>
+                <a:ext uri="{FF2B5EF4-FFF2-40B4-BE49-F238E27FC236}">
+                  <a16:creationId xmlns:a16="http://schemas.microsoft.com/office/drawing/2014/main" id="{DEC33B4B-A145-4A6F-9130-B80459057D44}"/>
+                </a:ext>
+              </a:extLst>
+            </p:cNvPr>
+            <p:cNvCxnSpPr>
+              <a:cxnSpLocks/>
+              <a:stCxn id="41" idx="1"/>
+              <a:endCxn id="42" idx="3"/>
+            </p:cNvCxnSpPr>
+            <p:nvPr/>
+          </p:nvCxnSpPr>
+          <p:spPr>
+            <a:xfrm flipH="1">
+              <a:off x="9276910" y="4159042"/>
+              <a:ext cx="1896636" cy="1"/>
+            </a:xfrm>
+            <a:prstGeom prst="straightConnector1">
+              <a:avLst/>
+            </a:prstGeom>
+            <a:noFill/>
+            <a:ln w="9525" cap="flat" cmpd="sng">
+              <a:solidFill>
+                <a:schemeClr val="accent1"/>
+              </a:solidFill>
+              <a:prstDash val="solid"/>
+              <a:miter lim="800000"/>
+              <a:headEnd type="arrow" w="sm" len="sm"/>
+              <a:tailEnd type="none" w="sm" len="sm"/>
+            </a:ln>
+          </p:spPr>
+        </p:cxnSp>
+        <p:sp>
+          <p:nvSpPr>
+            <p:cNvPr id="12" name="CuadroTexto 11">
+              <a:extLst>
+                <a:ext uri="{FF2B5EF4-FFF2-40B4-BE49-F238E27FC236}">
+                  <a16:creationId xmlns:a16="http://schemas.microsoft.com/office/drawing/2014/main" id="{1299D73E-FF3A-4236-98D7-9B6990742C8A}"/>
+                </a:ext>
+              </a:extLst>
+            </p:cNvPr>
+            <p:cNvSpPr txBox="1"/>
+            <p:nvPr/>
+          </p:nvSpPr>
+          <p:spPr>
+            <a:xfrm>
+              <a:off x="8056268" y="4619979"/>
+              <a:ext cx="4682022" cy="381588"/>
+            </a:xfrm>
+            <a:prstGeom prst="rect">
+              <a:avLst/>
+            </a:prstGeom>
+            <a:noFill/>
+          </p:spPr>
+          <p:txBody>
+            <a:bodyPr wrap="none" rtlCol="0">
+              <a:spAutoFit/>
+            </a:bodyPr>
+            <a:lstStyle/>
+            <a:p>
+              <a:r>
+                <a:rPr lang="es-ES" sz="1588" dirty="0">
+                  <a:latin typeface="Flama Condensed Light" panose="02000000000000000000"/>
+                </a:rPr>
+                <a:t>La clase2 “solo existe” como parte de la Clase1. </a:t>
+              </a:r>
+              <a:endParaRPr lang="es-419" sz="1588" dirty="0">
+                <a:latin typeface="Flama Condensed Light" panose="02000000000000000000"/>
+              </a:endParaRPr>
+            </a:p>
+          </p:txBody>
+        </p:sp>
+        <p:cxnSp>
+          <p:nvCxnSpPr>
+            <p:cNvPr id="45" name="Google Shape;112;p15">
+              <a:extLst>
+                <a:ext uri="{FF2B5EF4-FFF2-40B4-BE49-F238E27FC236}">
+                  <a16:creationId xmlns:a16="http://schemas.microsoft.com/office/drawing/2014/main" id="{294ADCE5-6CAE-4325-8A14-FA6B309C51FE}"/>
+                </a:ext>
+              </a:extLst>
+            </p:cNvPr>
+            <p:cNvCxnSpPr>
+              <a:cxnSpLocks/>
+            </p:cNvCxnSpPr>
+            <p:nvPr/>
+          </p:nvCxnSpPr>
+          <p:spPr>
+            <a:xfrm flipH="1">
+              <a:off x="9255321" y="2927749"/>
+              <a:ext cx="1896636" cy="1"/>
+            </a:xfrm>
+            <a:prstGeom prst="straightConnector1">
+              <a:avLst/>
+            </a:prstGeom>
+            <a:noFill/>
+            <a:ln w="9525" cap="flat" cmpd="sng">
+              <a:solidFill>
+                <a:schemeClr val="accent1"/>
+              </a:solidFill>
+              <a:prstDash val="solid"/>
+              <a:miter lim="800000"/>
+              <a:headEnd type="arrow" w="sm" len="sm"/>
+              <a:tailEnd type="none" w="sm" len="sm"/>
+            </a:ln>
+          </p:spPr>
+        </p:cxnSp>
+        <p:sp>
+          <p:nvSpPr>
+            <p:cNvPr id="46" name="CuadroTexto 45">
+              <a:extLst>
+                <a:ext uri="{FF2B5EF4-FFF2-40B4-BE49-F238E27FC236}">
+                  <a16:creationId xmlns:a16="http://schemas.microsoft.com/office/drawing/2014/main" id="{820F674B-61A3-4D8D-A42B-97BB1B4E1721}"/>
+                </a:ext>
+              </a:extLst>
+            </p:cNvPr>
+            <p:cNvSpPr txBox="1"/>
+            <p:nvPr/>
+          </p:nvSpPr>
+          <p:spPr>
+            <a:xfrm>
+              <a:off x="8056268" y="3226642"/>
+              <a:ext cx="4257486" cy="381588"/>
+            </a:xfrm>
+            <a:prstGeom prst="rect">
+              <a:avLst/>
+            </a:prstGeom>
+            <a:noFill/>
+          </p:spPr>
+          <p:txBody>
+            <a:bodyPr wrap="none" rtlCol="0">
+              <a:spAutoFit/>
+            </a:bodyPr>
+            <a:lstStyle/>
+            <a:p>
+              <a:r>
+                <a:rPr lang="es-ES" sz="1588" dirty="0">
+                  <a:latin typeface="Flama Condensed Light" panose="02000000000000000000"/>
+                </a:rPr>
+                <a:t>La clase2 puede existir aparte de la Clase1. </a:t>
+              </a:r>
+              <a:endParaRPr lang="es-419" sz="1588" dirty="0">
+                <a:latin typeface="Flama Condensed Light" panose="02000000000000000000"/>
+              </a:endParaRPr>
+            </a:p>
+          </p:txBody>
+        </p:sp>
+      </p:grpSp>
+      <p:grpSp>
+        <p:nvGrpSpPr>
+          <p:cNvPr id="15" name="Grupo 14">
+            <a:extLst>
+              <a:ext uri="{FF2B5EF4-FFF2-40B4-BE49-F238E27FC236}">
+                <a16:creationId xmlns:a16="http://schemas.microsoft.com/office/drawing/2014/main" id="{3284838D-D67B-4158-9BD2-E1C750D1D13E}"/>
+              </a:ext>
+            </a:extLst>
+          </p:cNvPr>
+          <p:cNvGrpSpPr/>
           <p:nvPr/>
-        </p:nvSpPr>
-        <p:spPr>
+        </p:nvGrpSpPr>
+        <p:grpSpPr>
           <a:xfrm>
-            <a:off x="7492687" y="3955675"/>
-            <a:ext cx="1201765" cy="787500"/>
+            <a:off x="6315550" y="4808141"/>
+            <a:ext cx="5421985" cy="1537427"/>
+            <a:chOff x="7390720" y="5408323"/>
+            <a:chExt cx="6144916" cy="1742417"/>
           </a:xfrm>
-          <a:prstGeom prst="rect">
-            <a:avLst/>
-          </a:prstGeom>
-          <a:noFill/>
-          <a:ln>
+        </p:grpSpPr>
+        <p:sp>
+          <p:nvSpPr>
+            <p:cNvPr id="99" name="Google Shape;99;p15"/>
+            <p:cNvSpPr txBox="1"/>
+            <p:nvPr/>
+          </p:nvSpPr>
+          <p:spPr>
+            <a:xfrm>
+              <a:off x="8130720" y="6087925"/>
+              <a:ext cx="1466099" cy="400200"/>
+            </a:xfrm>
+            <a:prstGeom prst="rect">
+              <a:avLst/>
+            </a:prstGeom>
             <a:noFill/>
-          </a:ln>
-        </p:spPr>
-        <p:txBody>
-          <a:bodyPr spcFirstLastPara="1" wrap="square" lIns="80669" tIns="40324" rIns="80669" bIns="40324" anchor="t" anchorCtr="0">
-            <a:noAutofit/>
-          </a:bodyPr>
-          <a:lstStyle/>
-          <a:p>
-            <a:pPr defTabSz="806867">
-              <a:buClr>
-                <a:srgbClr val="000000"/>
-              </a:buClr>
-            </a:pPr>
-            <a:r>
-              <a:rPr lang="es-CO" sz="1765" kern="0">
-                <a:solidFill>
+            <a:ln>
+              <a:noFill/>
+            </a:ln>
+          </p:spPr>
+          <p:txBody>
+            <a:bodyPr spcFirstLastPara="1" wrap="square" lIns="80669" tIns="40324" rIns="80669" bIns="40324" anchor="t" anchorCtr="0">
+              <a:noAutofit/>
+            </a:bodyPr>
+            <a:lstStyle/>
+            <a:p>
+              <a:pPr defTabSz="806886">
+                <a:buClr>
                   <a:srgbClr val="000000"/>
-                </a:solidFill>
-                <a:latin typeface="Calibri"/>
-                <a:ea typeface="Calibri"/>
-                <a:cs typeface="Calibri"/>
-                <a:sym typeface="Calibri"/>
-              </a:rPr>
-              <a:t>Agregación</a:t>
-            </a:r>
-            <a:endParaRPr sz="1765" kern="0">
+                </a:buClr>
+              </a:pPr>
+              <a:r>
+                <a:rPr lang="es-CO" sz="1765" kern="0" dirty="0">
+                  <a:solidFill>
+                    <a:srgbClr val="000000"/>
+                  </a:solidFill>
+                  <a:latin typeface="Flama Condensed Light" panose="02000000000000000000"/>
+                  <a:ea typeface="Calibri"/>
+                  <a:cs typeface="Calibri"/>
+                  <a:sym typeface="Calibri"/>
+                </a:rPr>
+                <a:t>“Es – Un(a)”</a:t>
+              </a:r>
+              <a:endParaRPr sz="1765" kern="0" dirty="0">
+                <a:solidFill>
+                  <a:srgbClr val="000000"/>
+                </a:solidFill>
+                <a:latin typeface="Flama Condensed Light" panose="02000000000000000000"/>
+                <a:ea typeface="Calibri"/>
+                <a:cs typeface="Calibri"/>
+                <a:sym typeface="Calibri"/>
+              </a:endParaRPr>
+            </a:p>
+          </p:txBody>
+        </p:sp>
+        <p:sp>
+          <p:nvSpPr>
+            <p:cNvPr id="103" name="Google Shape;103;p15"/>
+            <p:cNvSpPr txBox="1"/>
+            <p:nvPr/>
+          </p:nvSpPr>
+          <p:spPr>
+            <a:xfrm>
+              <a:off x="7390720" y="5408323"/>
+              <a:ext cx="4801200" cy="523200"/>
+            </a:xfrm>
+            <a:prstGeom prst="rect">
+              <a:avLst/>
+            </a:prstGeom>
+            <a:noFill/>
+            <a:ln>
+              <a:noFill/>
+            </a:ln>
+          </p:spPr>
+          <p:txBody>
+            <a:bodyPr spcFirstLastPara="1" wrap="square" lIns="80669" tIns="40324" rIns="80669" bIns="40324" anchor="t" anchorCtr="0">
+              <a:noAutofit/>
+            </a:bodyPr>
+            <a:lstStyle/>
+            <a:p>
+              <a:pPr defTabSz="806886">
+                <a:buClr>
+                  <a:srgbClr val="000000"/>
+                </a:buClr>
+              </a:pPr>
+              <a:r>
+                <a:rPr lang="es-CO" sz="2471" kern="0" dirty="0">
+                  <a:solidFill>
+                    <a:srgbClr val="000000"/>
+                  </a:solidFill>
+                  <a:latin typeface="Flama Condensed Light" panose="02000000000000000000"/>
+                  <a:ea typeface="Calibri"/>
+                  <a:cs typeface="Calibri"/>
+                  <a:sym typeface="Calibri"/>
+                </a:rPr>
+                <a:t>Herencia</a:t>
+              </a:r>
+              <a:endParaRPr sz="2471" kern="0" dirty="0">
+                <a:solidFill>
+                  <a:srgbClr val="000000"/>
+                </a:solidFill>
+                <a:latin typeface="Flama Condensed Light" panose="02000000000000000000"/>
+                <a:ea typeface="Calibri"/>
+                <a:cs typeface="Calibri"/>
+                <a:sym typeface="Calibri"/>
+              </a:endParaRPr>
+            </a:p>
+          </p:txBody>
+        </p:sp>
+        <p:sp>
+          <p:nvSpPr>
+            <p:cNvPr id="117" name="Google Shape;117;p15"/>
+            <p:cNvSpPr/>
+            <p:nvPr/>
+          </p:nvSpPr>
+          <p:spPr>
+            <a:xfrm>
+              <a:off x="8945180" y="5412576"/>
+              <a:ext cx="1466100" cy="523200"/>
+            </a:xfrm>
+            <a:prstGeom prst="rect">
+              <a:avLst/>
+            </a:prstGeom>
+            <a:solidFill>
+              <a:schemeClr val="lt1"/>
+            </a:solidFill>
+            <a:ln w="12700" cap="flat" cmpd="sng">
               <a:solidFill>
-                <a:srgbClr val="000000"/>
+                <a:srgbClr val="42719B"/>
               </a:solidFill>
-              <a:latin typeface="Calibri"/>
-              <a:ea typeface="Calibri"/>
-              <a:cs typeface="Calibri"/>
-              <a:sym typeface="Calibri"/>
-            </a:endParaRPr>
-          </a:p>
-          <a:p>
-            <a:pPr defTabSz="806867">
-              <a:buClr>
-                <a:srgbClr val="000000"/>
-              </a:buClr>
-            </a:pPr>
-            <a:r>
-              <a:rPr lang="es-CO" sz="1412" kern="0">
-                <a:solidFill>
+              <a:prstDash val="solid"/>
+              <a:miter lim="800000"/>
+              <a:headEnd type="none" w="sm" len="sm"/>
+              <a:tailEnd type="none" w="sm" len="sm"/>
+            </a:ln>
+          </p:spPr>
+          <p:txBody>
+            <a:bodyPr spcFirstLastPara="1" wrap="square" lIns="80669" tIns="40324" rIns="80669" bIns="40324" anchor="ctr" anchorCtr="0">
+              <a:noAutofit/>
+            </a:bodyPr>
+            <a:lstStyle/>
+            <a:p>
+              <a:pPr algn="ctr" defTabSz="806886">
+                <a:buClr>
                   <a:srgbClr val="000000"/>
-                </a:solidFill>
-                <a:latin typeface="Calibri"/>
-                <a:ea typeface="Calibri"/>
-                <a:cs typeface="Calibri"/>
-                <a:sym typeface="Calibri"/>
-              </a:rPr>
-              <a:t>“Tiene Un(a)”</a:t>
-            </a:r>
-            <a:endParaRPr sz="1235" kern="0">
+                </a:buClr>
+              </a:pPr>
+              <a:r>
+                <a:rPr lang="es-CO" sz="1588" kern="0">
+                  <a:solidFill>
+                    <a:srgbClr val="C00000"/>
+                  </a:solidFill>
+                  <a:latin typeface="Flama Condensed Light" panose="02000000000000000000"/>
+                  <a:ea typeface="Calibri"/>
+                  <a:cs typeface="Calibri"/>
+                  <a:sym typeface="Calibri"/>
+                </a:rPr>
+                <a:t>Clase 1</a:t>
+              </a:r>
+              <a:endParaRPr sz="1588" kern="0">
+                <a:solidFill>
+                  <a:srgbClr val="C00000"/>
+                </a:solidFill>
+                <a:latin typeface="Flama Condensed Light" panose="02000000000000000000"/>
+                <a:ea typeface="Calibri"/>
+                <a:cs typeface="Calibri"/>
+                <a:sym typeface="Calibri"/>
+              </a:endParaRPr>
+            </a:p>
+          </p:txBody>
+        </p:sp>
+        <p:sp>
+          <p:nvSpPr>
+            <p:cNvPr id="118" name="Google Shape;118;p15"/>
+            <p:cNvSpPr/>
+            <p:nvPr/>
+          </p:nvSpPr>
+          <p:spPr>
+            <a:xfrm>
+              <a:off x="8945180" y="6627540"/>
+              <a:ext cx="1466100" cy="523200"/>
+            </a:xfrm>
+            <a:prstGeom prst="rect">
+              <a:avLst/>
+            </a:prstGeom>
+            <a:solidFill>
+              <a:schemeClr val="lt1"/>
+            </a:solidFill>
+            <a:ln w="12700" cap="flat" cmpd="sng">
               <a:solidFill>
-                <a:srgbClr val="000000"/>
+                <a:srgbClr val="42719B"/>
               </a:solidFill>
-              <a:latin typeface="Arial"/>
-              <a:cs typeface="Arial"/>
-              <a:sym typeface="Arial"/>
-            </a:endParaRPr>
-          </a:p>
-          <a:p>
-            <a:pPr defTabSz="806867">
-              <a:buClr>
-                <a:srgbClr val="000000"/>
-              </a:buClr>
-            </a:pPr>
-            <a:r>
-              <a:rPr lang="es-CO" sz="1412" kern="0">
-                <a:solidFill>
+              <a:prstDash val="solid"/>
+              <a:miter lim="800000"/>
+              <a:headEnd type="none" w="sm" len="sm"/>
+              <a:tailEnd type="none" w="sm" len="sm"/>
+            </a:ln>
+          </p:spPr>
+          <p:txBody>
+            <a:bodyPr spcFirstLastPara="1" wrap="square" lIns="80669" tIns="40324" rIns="80669" bIns="40324" anchor="ctr" anchorCtr="0">
+              <a:noAutofit/>
+            </a:bodyPr>
+            <a:lstStyle/>
+            <a:p>
+              <a:pPr algn="ctr" defTabSz="806886">
+                <a:buClr>
                   <a:srgbClr val="000000"/>
-                </a:solidFill>
-                <a:latin typeface="Calibri"/>
-                <a:ea typeface="Calibri"/>
-                <a:cs typeface="Calibri"/>
-                <a:sym typeface="Calibri"/>
-              </a:rPr>
-              <a:t>“Posee Un(a)”</a:t>
-            </a:r>
-            <a:endParaRPr sz="1412" kern="0">
+                </a:buClr>
+              </a:pPr>
+              <a:r>
+                <a:rPr lang="es-CO" sz="1588" kern="0">
+                  <a:solidFill>
+                    <a:srgbClr val="C00000"/>
+                  </a:solidFill>
+                  <a:latin typeface="Calibri"/>
+                  <a:ea typeface="Calibri"/>
+                  <a:cs typeface="Calibri"/>
+                  <a:sym typeface="Calibri"/>
+                </a:rPr>
+                <a:t>Clase 2</a:t>
+              </a:r>
+              <a:endParaRPr sz="1588" kern="0">
+                <a:solidFill>
+                  <a:srgbClr val="C00000"/>
+                </a:solidFill>
+                <a:latin typeface="Calibri"/>
+                <a:ea typeface="Calibri"/>
+                <a:cs typeface="Calibri"/>
+                <a:sym typeface="Calibri"/>
+              </a:endParaRPr>
+            </a:p>
+          </p:txBody>
+        </p:sp>
+        <p:sp>
+          <p:nvSpPr>
+            <p:cNvPr id="119" name="Google Shape;119;p15"/>
+            <p:cNvSpPr/>
+            <p:nvPr/>
+          </p:nvSpPr>
+          <p:spPr>
+            <a:xfrm>
+              <a:off x="9596819" y="5935795"/>
+              <a:ext cx="204900" cy="235800"/>
+            </a:xfrm>
+            <a:prstGeom prst="triangle">
+              <a:avLst>
+                <a:gd name="adj" fmla="val 50000"/>
+              </a:avLst>
+            </a:prstGeom>
+            <a:noFill/>
+            <a:ln w="12700" cap="flat" cmpd="sng">
               <a:solidFill>
-                <a:srgbClr val="000000"/>
+                <a:srgbClr val="42719B"/>
               </a:solidFill>
-              <a:latin typeface="Calibri"/>
-              <a:ea typeface="Calibri"/>
-              <a:cs typeface="Calibri"/>
-              <a:sym typeface="Calibri"/>
-            </a:endParaRPr>
-          </a:p>
-        </p:txBody>
-      </p:sp>
-      <p:sp>
-        <p:nvSpPr>
-          <p:cNvPr id="102" name="Google Shape;102;p15"/>
-          <p:cNvSpPr txBox="1"/>
-          <p:nvPr/>
-        </p:nvSpPr>
-        <p:spPr>
-          <a:xfrm>
-            <a:off x="9456259" y="4013967"/>
-            <a:ext cx="1348147" cy="353118"/>
-          </a:xfrm>
-          <a:prstGeom prst="rect">
-            <a:avLst/>
-          </a:prstGeom>
-          <a:noFill/>
-          <a:ln>
+              <a:prstDash val="solid"/>
+              <a:miter lim="800000"/>
+              <a:headEnd type="none" w="sm" len="sm"/>
+              <a:tailEnd type="none" w="sm" len="sm"/>
+            </a:ln>
+          </p:spPr>
+          <p:txBody>
+            <a:bodyPr spcFirstLastPara="1" wrap="square" lIns="80669" tIns="40324" rIns="80669" bIns="40324" anchor="ctr" anchorCtr="0">
+              <a:noAutofit/>
+            </a:bodyPr>
+            <a:lstStyle/>
+            <a:p>
+              <a:pPr algn="ctr" defTabSz="806886">
+                <a:buClr>
+                  <a:srgbClr val="000000"/>
+                </a:buClr>
+              </a:pPr>
+              <a:endParaRPr sz="1588" kern="0">
+                <a:solidFill>
+                  <a:srgbClr val="FFFFFF"/>
+                </a:solidFill>
+                <a:latin typeface="Flama Condensed Light" panose="02000000000000000000"/>
+                <a:ea typeface="Calibri"/>
+                <a:cs typeface="Calibri"/>
+                <a:sym typeface="Calibri"/>
+              </a:endParaRPr>
+            </a:p>
+          </p:txBody>
+        </p:sp>
+        <p:cxnSp>
+          <p:nvCxnSpPr>
+            <p:cNvPr id="120" name="Google Shape;120;p15"/>
+            <p:cNvCxnSpPr>
+              <a:stCxn id="118" idx="0"/>
+              <a:endCxn id="119" idx="3"/>
+            </p:cNvCxnSpPr>
+            <p:nvPr/>
+          </p:nvCxnSpPr>
+          <p:spPr>
+            <a:xfrm rot="10800000" flipH="1">
+              <a:off x="9678230" y="6171540"/>
+              <a:ext cx="21000" cy="456000"/>
+            </a:xfrm>
+            <a:prstGeom prst="straightConnector1">
+              <a:avLst/>
+            </a:prstGeom>
             <a:noFill/>
-          </a:ln>
-        </p:spPr>
-        <p:txBody>
-          <a:bodyPr spcFirstLastPara="1" wrap="square" lIns="80669" tIns="40324" rIns="80669" bIns="40324" anchor="t" anchorCtr="0">
-            <a:noAutofit/>
-          </a:bodyPr>
-          <a:lstStyle/>
-          <a:p>
-            <a:pPr defTabSz="806867">
-              <a:buClr>
-                <a:srgbClr val="000000"/>
-              </a:buClr>
-            </a:pPr>
-            <a:r>
-              <a:rPr lang="es-CO" sz="1765" kern="0">
-                <a:solidFill>
-                  <a:srgbClr val="000000"/>
-                </a:solidFill>
-                <a:latin typeface="Calibri"/>
-                <a:ea typeface="Calibri"/>
-                <a:cs typeface="Calibri"/>
-                <a:sym typeface="Calibri"/>
-              </a:rPr>
-              <a:t>Composición</a:t>
-            </a:r>
-            <a:endParaRPr sz="1765" kern="0">
+            <a:ln w="9525" cap="flat" cmpd="sng">
               <a:solidFill>
-                <a:srgbClr val="000000"/>
+                <a:schemeClr val="accent1"/>
               </a:solidFill>
-              <a:latin typeface="Calibri"/>
-              <a:ea typeface="Calibri"/>
-              <a:cs typeface="Calibri"/>
-              <a:sym typeface="Calibri"/>
-            </a:endParaRPr>
-          </a:p>
-        </p:txBody>
-      </p:sp>
-      <p:sp>
-        <p:nvSpPr>
-          <p:cNvPr id="103" name="Google Shape;103;p15"/>
-          <p:cNvSpPr txBox="1"/>
-          <p:nvPr/>
-        </p:nvSpPr>
-        <p:spPr>
-          <a:xfrm>
-            <a:off x="519731" y="4496213"/>
-            <a:ext cx="4236353" cy="841765"/>
-          </a:xfrm>
-          <a:prstGeom prst="rect">
-            <a:avLst/>
-          </a:prstGeom>
-          <a:noFill/>
-          <a:ln>
+              <a:prstDash val="solid"/>
+              <a:miter lim="800000"/>
+              <a:headEnd type="none" w="sm" len="sm"/>
+              <a:tailEnd type="none" w="sm" len="sm"/>
+            </a:ln>
+          </p:spPr>
+        </p:cxnSp>
+        <p:sp>
+          <p:nvSpPr>
+            <p:cNvPr id="47" name="CuadroTexto 46">
+              <a:extLst>
+                <a:ext uri="{FF2B5EF4-FFF2-40B4-BE49-F238E27FC236}">
+                  <a16:creationId xmlns:a16="http://schemas.microsoft.com/office/drawing/2014/main" id="{CAC3BDD8-CC6D-43E5-8003-6120A27A0829}"/>
+                </a:ext>
+              </a:extLst>
+            </p:cNvPr>
+            <p:cNvSpPr txBox="1"/>
+            <p:nvPr/>
+          </p:nvSpPr>
+          <p:spPr>
+            <a:xfrm>
+              <a:off x="10576769" y="5934215"/>
+              <a:ext cx="2958867" cy="658531"/>
+            </a:xfrm>
+            <a:prstGeom prst="rect">
+              <a:avLst/>
+            </a:prstGeom>
             <a:noFill/>
-          </a:ln>
-        </p:spPr>
-        <p:txBody>
-          <a:bodyPr spcFirstLastPara="1" wrap="square" lIns="80669" tIns="40324" rIns="80669" bIns="40324" anchor="t" anchorCtr="0">
-            <a:noAutofit/>
-          </a:bodyPr>
-          <a:lstStyle/>
-          <a:p>
-            <a:pPr defTabSz="806867">
-              <a:buClr>
-                <a:srgbClr val="000000"/>
-              </a:buClr>
-            </a:pPr>
-            <a:r>
-              <a:rPr lang="es-CO" sz="2471" kern="0" dirty="0">
-                <a:solidFill>
-                  <a:srgbClr val="000000"/>
-                </a:solidFill>
-                <a:latin typeface="Calibri"/>
-                <a:ea typeface="Calibri"/>
-                <a:cs typeface="Calibri"/>
-                <a:sym typeface="Calibri"/>
-              </a:rPr>
-              <a:t>Herencia</a:t>
-            </a:r>
-            <a:endParaRPr sz="2471" kern="0" dirty="0">
-              <a:solidFill>
-                <a:srgbClr val="000000"/>
-              </a:solidFill>
-              <a:latin typeface="Calibri"/>
-              <a:ea typeface="Calibri"/>
-              <a:cs typeface="Calibri"/>
-              <a:sym typeface="Calibri"/>
-            </a:endParaRPr>
-          </a:p>
-        </p:txBody>
-      </p:sp>
-      <p:sp>
-        <p:nvSpPr>
-          <p:cNvPr id="104" name="Google Shape;104;p15"/>
-          <p:cNvSpPr txBox="1"/>
-          <p:nvPr/>
-        </p:nvSpPr>
-        <p:spPr>
-          <a:xfrm>
-            <a:off x="412535" y="1768451"/>
-            <a:ext cx="2696559" cy="1222147"/>
-          </a:xfrm>
-          <a:prstGeom prst="rect">
-            <a:avLst/>
-          </a:prstGeom>
-          <a:noFill/>
-          <a:ln>
-            <a:noFill/>
-          </a:ln>
-        </p:spPr>
-        <p:txBody>
-          <a:bodyPr spcFirstLastPara="1" wrap="square" lIns="80669" tIns="40324" rIns="80669" bIns="40324" anchor="t" anchorCtr="0">
-            <a:noAutofit/>
-          </a:bodyPr>
-          <a:lstStyle/>
-          <a:p>
-            <a:pPr defTabSz="806867">
-              <a:buClr>
-                <a:srgbClr val="000000"/>
-              </a:buClr>
-            </a:pPr>
-            <a:r>
-              <a:rPr lang="es-CO" sz="2471" kern="0">
-                <a:solidFill>
-                  <a:srgbClr val="000000"/>
-                </a:solidFill>
-                <a:latin typeface="Calibri"/>
-                <a:ea typeface="Calibri"/>
-                <a:cs typeface="Calibri"/>
-                <a:sym typeface="Calibri"/>
-              </a:rPr>
-              <a:t>Referencias a objetos de otras clases</a:t>
-            </a:r>
-            <a:endParaRPr sz="2471" kern="0">
-              <a:solidFill>
-                <a:srgbClr val="000000"/>
-              </a:solidFill>
-              <a:latin typeface="Calibri"/>
-              <a:ea typeface="Calibri"/>
-              <a:cs typeface="Calibri"/>
-              <a:sym typeface="Calibri"/>
-            </a:endParaRPr>
-          </a:p>
-        </p:txBody>
-      </p:sp>
-      <p:sp>
-        <p:nvSpPr>
-          <p:cNvPr id="105" name="Google Shape;105;p15"/>
-          <p:cNvSpPr/>
-          <p:nvPr/>
-        </p:nvSpPr>
-        <p:spPr>
-          <a:xfrm>
-            <a:off x="3252797" y="2043169"/>
-            <a:ext cx="1293618" cy="461647"/>
-          </a:xfrm>
-          <a:prstGeom prst="rect">
-            <a:avLst/>
-          </a:prstGeom>
-          <a:solidFill>
-            <a:schemeClr val="lt1"/>
-          </a:solidFill>
-          <a:ln w="12700" cap="flat" cmpd="sng">
-            <a:solidFill>
-              <a:srgbClr val="42719B"/>
-            </a:solidFill>
-            <a:prstDash val="solid"/>
-            <a:miter lim="800000"/>
-            <a:headEnd type="none" w="sm" len="sm"/>
-            <a:tailEnd type="none" w="sm" len="sm"/>
-          </a:ln>
-        </p:spPr>
-        <p:txBody>
-          <a:bodyPr spcFirstLastPara="1" wrap="square" lIns="80669" tIns="40324" rIns="80669" bIns="40324" anchor="ctr" anchorCtr="0">
-            <a:noAutofit/>
-          </a:bodyPr>
-          <a:lstStyle/>
-          <a:p>
-            <a:pPr algn="ctr" defTabSz="806867">
-              <a:buClr>
-                <a:srgbClr val="000000"/>
-              </a:buClr>
-            </a:pPr>
-            <a:r>
-              <a:rPr lang="es-CO" sz="1588" kern="0">
-                <a:solidFill>
-                  <a:srgbClr val="C00000"/>
-                </a:solidFill>
-                <a:latin typeface="Calibri"/>
-                <a:ea typeface="Calibri"/>
-                <a:cs typeface="Calibri"/>
-                <a:sym typeface="Calibri"/>
-              </a:rPr>
-              <a:t>Clase 1</a:t>
-            </a:r>
-            <a:endParaRPr sz="1588" kern="0">
-              <a:solidFill>
-                <a:srgbClr val="C00000"/>
-              </a:solidFill>
-              <a:latin typeface="Calibri"/>
-              <a:ea typeface="Calibri"/>
-              <a:cs typeface="Calibri"/>
-              <a:sym typeface="Calibri"/>
-            </a:endParaRPr>
-          </a:p>
-        </p:txBody>
-      </p:sp>
-      <p:sp>
-        <p:nvSpPr>
-          <p:cNvPr id="106" name="Google Shape;106;p15"/>
-          <p:cNvSpPr/>
-          <p:nvPr/>
-        </p:nvSpPr>
-        <p:spPr>
-          <a:xfrm>
-            <a:off x="6225061" y="2043169"/>
-            <a:ext cx="1293618" cy="461647"/>
-          </a:xfrm>
-          <a:prstGeom prst="rect">
-            <a:avLst/>
-          </a:prstGeom>
-          <a:solidFill>
-            <a:schemeClr val="lt1"/>
-          </a:solidFill>
-          <a:ln w="12700" cap="flat" cmpd="sng">
-            <a:solidFill>
-              <a:srgbClr val="42719B"/>
-            </a:solidFill>
-            <a:prstDash val="solid"/>
-            <a:miter lim="800000"/>
-            <a:headEnd type="none" w="sm" len="sm"/>
-            <a:tailEnd type="none" w="sm" len="sm"/>
-          </a:ln>
-        </p:spPr>
-        <p:txBody>
-          <a:bodyPr spcFirstLastPara="1" wrap="square" lIns="80669" tIns="40324" rIns="80669" bIns="40324" anchor="ctr" anchorCtr="0">
-            <a:noAutofit/>
-          </a:bodyPr>
-          <a:lstStyle/>
-          <a:p>
-            <a:pPr algn="ctr" defTabSz="806867">
-              <a:buClr>
-                <a:srgbClr val="000000"/>
-              </a:buClr>
-            </a:pPr>
-            <a:r>
-              <a:rPr lang="es-CO" sz="1588" kern="0">
-                <a:solidFill>
-                  <a:srgbClr val="C00000"/>
-                </a:solidFill>
-                <a:latin typeface="Calibri"/>
-                <a:ea typeface="Calibri"/>
-                <a:cs typeface="Calibri"/>
-                <a:sym typeface="Calibri"/>
-              </a:rPr>
-              <a:t>Clase 2</a:t>
-            </a:r>
-            <a:endParaRPr sz="1588" kern="0">
-              <a:solidFill>
-                <a:srgbClr val="C00000"/>
-              </a:solidFill>
-              <a:latin typeface="Calibri"/>
-              <a:ea typeface="Calibri"/>
-              <a:cs typeface="Calibri"/>
-              <a:sym typeface="Calibri"/>
-            </a:endParaRPr>
-          </a:p>
-        </p:txBody>
-      </p:sp>
-      <p:cxnSp>
-        <p:nvCxnSpPr>
-          <p:cNvPr id="107" name="Google Shape;107;p15"/>
-          <p:cNvCxnSpPr>
-            <a:stCxn id="105" idx="3"/>
-            <a:endCxn id="106" idx="1"/>
-          </p:cNvCxnSpPr>
-          <p:nvPr/>
-        </p:nvCxnSpPr>
-        <p:spPr>
-          <a:xfrm>
-            <a:off x="4546414" y="2273993"/>
-            <a:ext cx="1678765" cy="0"/>
-          </a:xfrm>
-          <a:prstGeom prst="straightConnector1">
-            <a:avLst/>
-          </a:prstGeom>
-          <a:noFill/>
-          <a:ln w="9525" cap="flat" cmpd="sng">
-            <a:solidFill>
-              <a:schemeClr val="accent1"/>
-            </a:solidFill>
-            <a:prstDash val="solid"/>
-            <a:miter lim="800000"/>
-            <a:headEnd type="none" w="sm" len="sm"/>
-            <a:tailEnd type="none" w="sm" len="sm"/>
-          </a:ln>
-        </p:spPr>
-      </p:cxnSp>
-      <p:sp>
-        <p:nvSpPr>
-          <p:cNvPr id="108" name="Google Shape;108;p15"/>
-          <p:cNvSpPr txBox="1"/>
-          <p:nvPr/>
-        </p:nvSpPr>
-        <p:spPr>
-          <a:xfrm>
-            <a:off x="4887518" y="1945791"/>
-            <a:ext cx="1045588" cy="325853"/>
-          </a:xfrm>
-          <a:prstGeom prst="rect">
-            <a:avLst/>
-          </a:prstGeom>
-          <a:noFill/>
-          <a:ln>
-            <a:noFill/>
-          </a:ln>
-        </p:spPr>
-        <p:txBody>
-          <a:bodyPr spcFirstLastPara="1" wrap="square" lIns="80669" tIns="40324" rIns="80669" bIns="40324" anchor="t" anchorCtr="0">
-            <a:noAutofit/>
-          </a:bodyPr>
-          <a:lstStyle/>
-          <a:p>
-            <a:pPr defTabSz="806867">
-              <a:buClr>
-                <a:srgbClr val="000000"/>
-              </a:buClr>
-            </a:pPr>
-            <a:r>
-              <a:rPr lang="es-CO" sz="1588" kern="0">
-                <a:solidFill>
-                  <a:srgbClr val="000000"/>
-                </a:solidFill>
-                <a:latin typeface="Calibri"/>
-                <a:ea typeface="Calibri"/>
-                <a:cs typeface="Calibri"/>
-                <a:sym typeface="Calibri"/>
-              </a:rPr>
-              <a:t>Asociación</a:t>
-            </a:r>
-            <a:endParaRPr sz="1588" kern="0">
-              <a:solidFill>
-                <a:srgbClr val="000000"/>
-              </a:solidFill>
-              <a:latin typeface="Calibri"/>
-              <a:ea typeface="Calibri"/>
-              <a:cs typeface="Calibri"/>
-              <a:sym typeface="Calibri"/>
-            </a:endParaRPr>
-          </a:p>
-        </p:txBody>
-      </p:sp>
-      <p:sp>
-        <p:nvSpPr>
-          <p:cNvPr id="109" name="Google Shape;109;p15"/>
-          <p:cNvSpPr/>
-          <p:nvPr/>
-        </p:nvSpPr>
-        <p:spPr>
-          <a:xfrm>
-            <a:off x="8210063" y="3194018"/>
-            <a:ext cx="1293618" cy="461647"/>
-          </a:xfrm>
-          <a:prstGeom prst="rect">
-            <a:avLst/>
-          </a:prstGeom>
-          <a:solidFill>
-            <a:schemeClr val="lt1"/>
-          </a:solidFill>
-          <a:ln w="12700" cap="flat" cmpd="sng">
-            <a:solidFill>
-              <a:srgbClr val="42719B"/>
-            </a:solidFill>
-            <a:prstDash val="solid"/>
-            <a:miter lim="800000"/>
-            <a:headEnd type="none" w="sm" len="sm"/>
-            <a:tailEnd type="none" w="sm" len="sm"/>
-          </a:ln>
-        </p:spPr>
-        <p:txBody>
-          <a:bodyPr spcFirstLastPara="1" wrap="square" lIns="80669" tIns="40324" rIns="80669" bIns="40324" anchor="ctr" anchorCtr="0">
-            <a:noAutofit/>
-          </a:bodyPr>
-          <a:lstStyle/>
-          <a:p>
-            <a:pPr algn="ctr" defTabSz="806867">
-              <a:buClr>
-                <a:srgbClr val="000000"/>
-              </a:buClr>
-            </a:pPr>
-            <a:r>
-              <a:rPr lang="es-CO" sz="1588" kern="0">
-                <a:solidFill>
-                  <a:srgbClr val="C00000"/>
-                </a:solidFill>
-                <a:latin typeface="Calibri"/>
-                <a:ea typeface="Calibri"/>
-                <a:cs typeface="Calibri"/>
-                <a:sym typeface="Calibri"/>
-              </a:rPr>
-              <a:t>Clase 1</a:t>
-            </a:r>
-            <a:endParaRPr sz="1588" kern="0">
-              <a:solidFill>
-                <a:srgbClr val="C00000"/>
-              </a:solidFill>
-              <a:latin typeface="Calibri"/>
-              <a:ea typeface="Calibri"/>
-              <a:cs typeface="Calibri"/>
-              <a:sym typeface="Calibri"/>
-            </a:endParaRPr>
-          </a:p>
-        </p:txBody>
-      </p:sp>
-      <p:sp>
-        <p:nvSpPr>
-          <p:cNvPr id="110" name="Google Shape;110;p15"/>
-          <p:cNvSpPr/>
-          <p:nvPr/>
-        </p:nvSpPr>
-        <p:spPr>
-          <a:xfrm>
-            <a:off x="8210062" y="4967135"/>
-            <a:ext cx="1293618" cy="461647"/>
-          </a:xfrm>
-          <a:prstGeom prst="rect">
-            <a:avLst/>
-          </a:prstGeom>
-          <a:solidFill>
-            <a:schemeClr val="lt1"/>
-          </a:solidFill>
-          <a:ln w="12700" cap="flat" cmpd="sng">
-            <a:solidFill>
-              <a:srgbClr val="42719B"/>
-            </a:solidFill>
-            <a:prstDash val="solid"/>
-            <a:miter lim="800000"/>
-            <a:headEnd type="none" w="sm" len="sm"/>
-            <a:tailEnd type="none" w="sm" len="sm"/>
-          </a:ln>
-        </p:spPr>
-        <p:txBody>
-          <a:bodyPr spcFirstLastPara="1" wrap="square" lIns="80669" tIns="40324" rIns="80669" bIns="40324" anchor="ctr" anchorCtr="0">
-            <a:noAutofit/>
-          </a:bodyPr>
-          <a:lstStyle/>
-          <a:p>
-            <a:pPr algn="ctr" defTabSz="806867">
-              <a:buClr>
-                <a:srgbClr val="000000"/>
-              </a:buClr>
-            </a:pPr>
-            <a:r>
-              <a:rPr lang="es-CO" sz="1588" kern="0">
-                <a:solidFill>
-                  <a:srgbClr val="C00000"/>
-                </a:solidFill>
-                <a:latin typeface="Calibri"/>
-                <a:ea typeface="Calibri"/>
-                <a:cs typeface="Calibri"/>
-                <a:sym typeface="Calibri"/>
-              </a:rPr>
-              <a:t>Clase 2</a:t>
-            </a:r>
-            <a:endParaRPr sz="1588" kern="0">
-              <a:solidFill>
-                <a:srgbClr val="C00000"/>
-              </a:solidFill>
-              <a:latin typeface="Calibri"/>
-              <a:ea typeface="Calibri"/>
-              <a:cs typeface="Calibri"/>
-              <a:sym typeface="Calibri"/>
-            </a:endParaRPr>
-          </a:p>
-        </p:txBody>
-      </p:sp>
-      <p:sp>
-        <p:nvSpPr>
-          <p:cNvPr id="111" name="Google Shape;111;p15"/>
-          <p:cNvSpPr/>
-          <p:nvPr/>
-        </p:nvSpPr>
-        <p:spPr>
-          <a:xfrm>
-            <a:off x="8738671" y="3655683"/>
-            <a:ext cx="236483" cy="269138"/>
-          </a:xfrm>
-          <a:prstGeom prst="flowChartDecision">
-            <a:avLst/>
-          </a:prstGeom>
-          <a:solidFill>
-            <a:schemeClr val="lt1"/>
-          </a:solidFill>
-          <a:ln w="12700" cap="flat" cmpd="sng">
-            <a:solidFill>
-              <a:srgbClr val="42719B"/>
-            </a:solidFill>
-            <a:prstDash val="solid"/>
-            <a:miter lim="800000"/>
-            <a:headEnd type="none" w="sm" len="sm"/>
-            <a:tailEnd type="none" w="sm" len="sm"/>
-          </a:ln>
-        </p:spPr>
-        <p:txBody>
-          <a:bodyPr spcFirstLastPara="1" wrap="square" lIns="80669" tIns="40324" rIns="80669" bIns="40324" anchor="ctr" anchorCtr="0">
-            <a:noAutofit/>
-          </a:bodyPr>
-          <a:lstStyle/>
-          <a:p>
-            <a:pPr algn="ctr" defTabSz="806867">
-              <a:buClr>
-                <a:srgbClr val="000000"/>
-              </a:buClr>
-            </a:pPr>
-            <a:endParaRPr sz="1588" kern="0">
-              <a:solidFill>
-                <a:srgbClr val="FFFFFF"/>
-              </a:solidFill>
-              <a:latin typeface="Calibri"/>
-              <a:ea typeface="Calibri"/>
-              <a:cs typeface="Calibri"/>
-              <a:sym typeface="Calibri"/>
-            </a:endParaRPr>
-          </a:p>
-        </p:txBody>
-      </p:sp>
-      <p:cxnSp>
-        <p:nvCxnSpPr>
-          <p:cNvPr id="112" name="Google Shape;112;p15"/>
-          <p:cNvCxnSpPr>
-            <a:stCxn id="110" idx="0"/>
-            <a:endCxn id="111" idx="2"/>
-          </p:cNvCxnSpPr>
-          <p:nvPr/>
-        </p:nvCxnSpPr>
-        <p:spPr>
-          <a:xfrm rot="10800000">
-            <a:off x="8856871" y="3924723"/>
-            <a:ext cx="0" cy="1042412"/>
-          </a:xfrm>
-          <a:prstGeom prst="straightConnector1">
-            <a:avLst/>
-          </a:prstGeom>
-          <a:noFill/>
-          <a:ln w="9525" cap="flat" cmpd="sng">
-            <a:solidFill>
-              <a:schemeClr val="accent1"/>
-            </a:solidFill>
-            <a:prstDash val="solid"/>
-            <a:miter lim="800000"/>
-            <a:headEnd type="none" w="sm" len="sm"/>
-            <a:tailEnd type="none" w="sm" len="sm"/>
-          </a:ln>
-        </p:spPr>
-      </p:cxnSp>
-      <p:sp>
-        <p:nvSpPr>
-          <p:cNvPr id="113" name="Google Shape;113;p15"/>
-          <p:cNvSpPr/>
-          <p:nvPr/>
-        </p:nvSpPr>
-        <p:spPr>
-          <a:xfrm>
-            <a:off x="10275870" y="3194018"/>
-            <a:ext cx="1293618" cy="461647"/>
-          </a:xfrm>
-          <a:prstGeom prst="rect">
-            <a:avLst/>
-          </a:prstGeom>
-          <a:solidFill>
-            <a:schemeClr val="lt1"/>
-          </a:solidFill>
-          <a:ln w="12700" cap="flat" cmpd="sng">
-            <a:solidFill>
-              <a:srgbClr val="42719B"/>
-            </a:solidFill>
-            <a:prstDash val="solid"/>
-            <a:miter lim="800000"/>
-            <a:headEnd type="none" w="sm" len="sm"/>
-            <a:tailEnd type="none" w="sm" len="sm"/>
-          </a:ln>
-        </p:spPr>
-        <p:txBody>
-          <a:bodyPr spcFirstLastPara="1" wrap="square" lIns="80669" tIns="40324" rIns="80669" bIns="40324" anchor="ctr" anchorCtr="0">
-            <a:noAutofit/>
-          </a:bodyPr>
-          <a:lstStyle/>
-          <a:p>
-            <a:pPr algn="ctr" defTabSz="806867">
-              <a:buClr>
-                <a:srgbClr val="000000"/>
-              </a:buClr>
-            </a:pPr>
-            <a:r>
-              <a:rPr lang="es-CO" sz="1588" kern="0">
-                <a:solidFill>
-                  <a:srgbClr val="C00000"/>
-                </a:solidFill>
-                <a:latin typeface="Calibri"/>
-                <a:ea typeface="Calibri"/>
-                <a:cs typeface="Calibri"/>
-                <a:sym typeface="Calibri"/>
-              </a:rPr>
-              <a:t>Clase 1</a:t>
-            </a:r>
-            <a:endParaRPr sz="1588" kern="0">
-              <a:solidFill>
-                <a:srgbClr val="C00000"/>
-              </a:solidFill>
-              <a:latin typeface="Calibri"/>
-              <a:ea typeface="Calibri"/>
-              <a:cs typeface="Calibri"/>
-              <a:sym typeface="Calibri"/>
-            </a:endParaRPr>
-          </a:p>
-        </p:txBody>
-      </p:sp>
-      <p:sp>
-        <p:nvSpPr>
-          <p:cNvPr id="114" name="Google Shape;114;p15"/>
-          <p:cNvSpPr/>
-          <p:nvPr/>
-        </p:nvSpPr>
-        <p:spPr>
-          <a:xfrm>
-            <a:off x="10275870" y="4981043"/>
-            <a:ext cx="1293618" cy="461647"/>
-          </a:xfrm>
-          <a:prstGeom prst="rect">
-            <a:avLst/>
-          </a:prstGeom>
-          <a:solidFill>
-            <a:schemeClr val="lt1"/>
-          </a:solidFill>
-          <a:ln w="12700" cap="flat" cmpd="sng">
-            <a:solidFill>
-              <a:srgbClr val="42719B"/>
-            </a:solidFill>
-            <a:prstDash val="solid"/>
-            <a:miter lim="800000"/>
-            <a:headEnd type="none" w="sm" len="sm"/>
-            <a:tailEnd type="none" w="sm" len="sm"/>
-          </a:ln>
-        </p:spPr>
-        <p:txBody>
-          <a:bodyPr spcFirstLastPara="1" wrap="square" lIns="80669" tIns="40324" rIns="80669" bIns="40324" anchor="ctr" anchorCtr="0">
-            <a:noAutofit/>
-          </a:bodyPr>
-          <a:lstStyle/>
-          <a:p>
-            <a:pPr algn="ctr" defTabSz="806867">
-              <a:buClr>
-                <a:srgbClr val="000000"/>
-              </a:buClr>
-            </a:pPr>
-            <a:r>
-              <a:rPr lang="es-CO" sz="1588" kern="0">
-                <a:solidFill>
-                  <a:srgbClr val="C00000"/>
-                </a:solidFill>
-                <a:latin typeface="Calibri"/>
-                <a:ea typeface="Calibri"/>
-                <a:cs typeface="Calibri"/>
-                <a:sym typeface="Calibri"/>
-              </a:rPr>
-              <a:t>Clase 2</a:t>
-            </a:r>
-            <a:endParaRPr sz="1588" kern="0">
-              <a:solidFill>
-                <a:srgbClr val="C00000"/>
-              </a:solidFill>
-              <a:latin typeface="Calibri"/>
-              <a:ea typeface="Calibri"/>
-              <a:cs typeface="Calibri"/>
-              <a:sym typeface="Calibri"/>
-            </a:endParaRPr>
-          </a:p>
-        </p:txBody>
-      </p:sp>
-      <p:sp>
-        <p:nvSpPr>
-          <p:cNvPr id="115" name="Google Shape;115;p15"/>
-          <p:cNvSpPr/>
-          <p:nvPr/>
-        </p:nvSpPr>
-        <p:spPr>
-          <a:xfrm>
-            <a:off x="10804478" y="3655683"/>
-            <a:ext cx="236483" cy="269138"/>
-          </a:xfrm>
-          <a:prstGeom prst="flowChartDecision">
-            <a:avLst/>
-          </a:prstGeom>
-          <a:solidFill>
-            <a:schemeClr val="dk1"/>
-          </a:solidFill>
-          <a:ln w="12700" cap="flat" cmpd="sng">
-            <a:solidFill>
-              <a:srgbClr val="42719B"/>
-            </a:solidFill>
-            <a:prstDash val="solid"/>
-            <a:miter lim="800000"/>
-            <a:headEnd type="none" w="sm" len="sm"/>
-            <a:tailEnd type="none" w="sm" len="sm"/>
-          </a:ln>
-        </p:spPr>
-        <p:txBody>
-          <a:bodyPr spcFirstLastPara="1" wrap="square" lIns="80669" tIns="40324" rIns="80669" bIns="40324" anchor="ctr" anchorCtr="0">
-            <a:noAutofit/>
-          </a:bodyPr>
-          <a:lstStyle/>
-          <a:p>
-            <a:pPr algn="ctr" defTabSz="806867">
-              <a:buClr>
-                <a:srgbClr val="000000"/>
-              </a:buClr>
-            </a:pPr>
-            <a:endParaRPr sz="1588" kern="0">
-              <a:solidFill>
-                <a:srgbClr val="FFFFFF"/>
-              </a:solidFill>
-              <a:latin typeface="Calibri"/>
-              <a:ea typeface="Calibri"/>
-              <a:cs typeface="Calibri"/>
-              <a:sym typeface="Calibri"/>
-            </a:endParaRPr>
-          </a:p>
-        </p:txBody>
-      </p:sp>
-      <p:cxnSp>
-        <p:nvCxnSpPr>
-          <p:cNvPr id="116" name="Google Shape;116;p15"/>
-          <p:cNvCxnSpPr>
-            <a:stCxn id="114" idx="0"/>
-            <a:endCxn id="115" idx="2"/>
-          </p:cNvCxnSpPr>
-          <p:nvPr/>
-        </p:nvCxnSpPr>
-        <p:spPr>
-          <a:xfrm rot="10800000">
-            <a:off x="10922679" y="3924867"/>
-            <a:ext cx="0" cy="1056176"/>
-          </a:xfrm>
-          <a:prstGeom prst="straightConnector1">
-            <a:avLst/>
-          </a:prstGeom>
-          <a:noFill/>
-          <a:ln w="9525" cap="flat" cmpd="sng">
-            <a:solidFill>
-              <a:schemeClr val="accent1"/>
-            </a:solidFill>
-            <a:prstDash val="solid"/>
-            <a:miter lim="800000"/>
-            <a:headEnd type="none" w="sm" len="sm"/>
-            <a:tailEnd type="none" w="sm" len="sm"/>
-          </a:ln>
-        </p:spPr>
-      </p:cxnSp>
-      <p:sp>
-        <p:nvSpPr>
-          <p:cNvPr id="117" name="Google Shape;117;p15"/>
-          <p:cNvSpPr/>
-          <p:nvPr/>
-        </p:nvSpPr>
-        <p:spPr>
-          <a:xfrm>
-            <a:off x="5031295" y="4035213"/>
-            <a:ext cx="1293618" cy="461647"/>
-          </a:xfrm>
-          <a:prstGeom prst="rect">
-            <a:avLst/>
-          </a:prstGeom>
-          <a:solidFill>
-            <a:schemeClr val="lt1"/>
-          </a:solidFill>
-          <a:ln w="12700" cap="flat" cmpd="sng">
-            <a:solidFill>
-              <a:srgbClr val="42719B"/>
-            </a:solidFill>
-            <a:prstDash val="solid"/>
-            <a:miter lim="800000"/>
-            <a:headEnd type="none" w="sm" len="sm"/>
-            <a:tailEnd type="none" w="sm" len="sm"/>
-          </a:ln>
-        </p:spPr>
-        <p:txBody>
-          <a:bodyPr spcFirstLastPara="1" wrap="square" lIns="80669" tIns="40324" rIns="80669" bIns="40324" anchor="ctr" anchorCtr="0">
-            <a:noAutofit/>
-          </a:bodyPr>
-          <a:lstStyle/>
-          <a:p>
-            <a:pPr algn="ctr" defTabSz="806867">
-              <a:buClr>
-                <a:srgbClr val="000000"/>
-              </a:buClr>
-            </a:pPr>
-            <a:r>
-              <a:rPr lang="es-CO" sz="1588" kern="0">
-                <a:solidFill>
-                  <a:srgbClr val="C00000"/>
-                </a:solidFill>
-                <a:latin typeface="Calibri"/>
-                <a:ea typeface="Calibri"/>
-                <a:cs typeface="Calibri"/>
-                <a:sym typeface="Calibri"/>
-              </a:rPr>
-              <a:t>Clase 1</a:t>
-            </a:r>
-            <a:endParaRPr sz="1588" kern="0">
-              <a:solidFill>
-                <a:srgbClr val="C00000"/>
-              </a:solidFill>
-              <a:latin typeface="Calibri"/>
-              <a:ea typeface="Calibri"/>
-              <a:cs typeface="Calibri"/>
-              <a:sym typeface="Calibri"/>
-            </a:endParaRPr>
-          </a:p>
-        </p:txBody>
-      </p:sp>
-      <p:sp>
-        <p:nvSpPr>
-          <p:cNvPr id="118" name="Google Shape;118;p15"/>
-          <p:cNvSpPr/>
-          <p:nvPr/>
-        </p:nvSpPr>
-        <p:spPr>
-          <a:xfrm>
-            <a:off x="5031295" y="5107240"/>
-            <a:ext cx="1293618" cy="461647"/>
-          </a:xfrm>
-          <a:prstGeom prst="rect">
-            <a:avLst/>
-          </a:prstGeom>
-          <a:solidFill>
-            <a:schemeClr val="lt1"/>
-          </a:solidFill>
-          <a:ln w="12700" cap="flat" cmpd="sng">
-            <a:solidFill>
-              <a:srgbClr val="42719B"/>
-            </a:solidFill>
-            <a:prstDash val="solid"/>
-            <a:miter lim="800000"/>
-            <a:headEnd type="none" w="sm" len="sm"/>
-            <a:tailEnd type="none" w="sm" len="sm"/>
-          </a:ln>
-        </p:spPr>
-        <p:txBody>
-          <a:bodyPr spcFirstLastPara="1" wrap="square" lIns="80669" tIns="40324" rIns="80669" bIns="40324" anchor="ctr" anchorCtr="0">
-            <a:noAutofit/>
-          </a:bodyPr>
-          <a:lstStyle/>
-          <a:p>
-            <a:pPr algn="ctr" defTabSz="806867">
-              <a:buClr>
-                <a:srgbClr val="000000"/>
-              </a:buClr>
-            </a:pPr>
-            <a:r>
-              <a:rPr lang="es-CO" sz="1588" kern="0">
-                <a:solidFill>
-                  <a:srgbClr val="C00000"/>
-                </a:solidFill>
-                <a:latin typeface="Calibri"/>
-                <a:ea typeface="Calibri"/>
-                <a:cs typeface="Calibri"/>
-                <a:sym typeface="Calibri"/>
-              </a:rPr>
-              <a:t>Clase 2</a:t>
-            </a:r>
-            <a:endParaRPr sz="1588" kern="0">
-              <a:solidFill>
-                <a:srgbClr val="C00000"/>
-              </a:solidFill>
-              <a:latin typeface="Calibri"/>
-              <a:ea typeface="Calibri"/>
-              <a:cs typeface="Calibri"/>
-              <a:sym typeface="Calibri"/>
-            </a:endParaRPr>
-          </a:p>
-        </p:txBody>
-      </p:sp>
-      <p:sp>
-        <p:nvSpPr>
-          <p:cNvPr id="119" name="Google Shape;119;p15"/>
-          <p:cNvSpPr/>
-          <p:nvPr/>
-        </p:nvSpPr>
-        <p:spPr>
-          <a:xfrm>
-            <a:off x="5606271" y="4496877"/>
-            <a:ext cx="180794" cy="208059"/>
-          </a:xfrm>
-          <a:prstGeom prst="triangle">
-            <a:avLst>
-              <a:gd name="adj" fmla="val 50000"/>
-            </a:avLst>
-          </a:prstGeom>
-          <a:noFill/>
-          <a:ln w="12700" cap="flat" cmpd="sng">
-            <a:solidFill>
-              <a:srgbClr val="42719B"/>
-            </a:solidFill>
-            <a:prstDash val="solid"/>
-            <a:miter lim="800000"/>
-            <a:headEnd type="none" w="sm" len="sm"/>
-            <a:tailEnd type="none" w="sm" len="sm"/>
-          </a:ln>
-        </p:spPr>
-        <p:txBody>
-          <a:bodyPr spcFirstLastPara="1" wrap="square" lIns="80669" tIns="40324" rIns="80669" bIns="40324" anchor="ctr" anchorCtr="0">
-            <a:noAutofit/>
-          </a:bodyPr>
-          <a:lstStyle/>
-          <a:p>
-            <a:pPr algn="ctr" defTabSz="806867">
-              <a:buClr>
-                <a:srgbClr val="000000"/>
-              </a:buClr>
-            </a:pPr>
-            <a:endParaRPr sz="1588" kern="0">
-              <a:solidFill>
-                <a:srgbClr val="FFFFFF"/>
-              </a:solidFill>
-              <a:latin typeface="Calibri"/>
-              <a:ea typeface="Calibri"/>
-              <a:cs typeface="Calibri"/>
-              <a:sym typeface="Calibri"/>
-            </a:endParaRPr>
-          </a:p>
-        </p:txBody>
-      </p:sp>
-      <p:cxnSp>
-        <p:nvCxnSpPr>
-          <p:cNvPr id="120" name="Google Shape;120;p15"/>
-          <p:cNvCxnSpPr>
-            <a:stCxn id="118" idx="0"/>
-            <a:endCxn id="119" idx="3"/>
-          </p:cNvCxnSpPr>
-          <p:nvPr/>
-        </p:nvCxnSpPr>
-        <p:spPr>
-          <a:xfrm rot="10800000" flipH="1">
-            <a:off x="5678104" y="4704887"/>
-            <a:ext cx="18529" cy="402353"/>
-          </a:xfrm>
-          <a:prstGeom prst="straightConnector1">
-            <a:avLst/>
-          </a:prstGeom>
-          <a:noFill/>
-          <a:ln w="9525" cap="flat" cmpd="sng">
-            <a:solidFill>
-              <a:schemeClr val="accent1"/>
-            </a:solidFill>
-            <a:prstDash val="solid"/>
-            <a:miter lim="800000"/>
-            <a:headEnd type="none" w="sm" len="sm"/>
-            <a:tailEnd type="none" w="sm" len="sm"/>
-          </a:ln>
-        </p:spPr>
-      </p:cxnSp>
+          </p:spPr>
+          <p:txBody>
+            <a:bodyPr wrap="square" rtlCol="0">
+              <a:spAutoFit/>
+            </a:bodyPr>
+            <a:lstStyle/>
+            <a:p>
+              <a:r>
+                <a:rPr lang="es-ES" sz="1588" dirty="0">
+                  <a:latin typeface="Flama Condensed Light" panose="02000000000000000000"/>
+                </a:rPr>
+                <a:t>La Clase2 es una subclase de la Clase1. </a:t>
+              </a:r>
+              <a:endParaRPr lang="es-419" sz="1588" dirty="0">
+                <a:latin typeface="Flama Condensed Light" panose="02000000000000000000"/>
+              </a:endParaRPr>
+            </a:p>
+          </p:txBody>
+        </p:sp>
+      </p:grpSp>
     </p:spTree>
     <p:extLst>
       <p:ext uri="{BB962C8B-B14F-4D97-AF65-F5344CB8AC3E}">
-        <p14:creationId xmlns:p14="http://schemas.microsoft.com/office/powerpoint/2010/main" val="3400544891"/>
+        <p14:creationId xmlns:p14="http://schemas.microsoft.com/office/powerpoint/2010/main" val="270206410"/>
       </p:ext>
     </p:extLst>
   </p:cSld>

</xml_diff>